<commit_message>
[RU] translation of Policies
Including diagrams

Signed-off-by: Anton Ievlev <anthony.ievlev@gmail.com>
</commit_message>
<xml_diff>
--- a/docs/locale/ru_RU/source/policies/Fabric_Policy_Hierarchy.pptx
+++ b/docs/locale/ru_RU/source/policies/Fabric_Policy_Hierarchy.pptx
@@ -879,35 +879,36 @@
         <a:bodyPr/>
         <a:lstStyle/>
         <a:p>
+          <a:pPr algn="ctr" rtl="0"/>
           <a:r>
-            <a:rPr lang="en-US" dirty="0" err="1"/>
+            <a:rPr lang="ru-Ru" b="0" i="0" u="none" baseline="0"/>
             <a:t>configtx.yaml</a:t>
           </a:r>
-          <a:endParaRPr lang="en-US" dirty="0"/>
+          <a:endParaRPr lang="ru-Ru" dirty="0"/>
         </a:p>
         <a:p>
-          <a:endParaRPr lang="en-US" dirty="0"/>
+          <a:endParaRPr lang="ru-Ru" dirty="0"/>
         </a:p>
         <a:p>
-          <a:endParaRPr lang="en-US" dirty="0"/>
+          <a:endParaRPr lang="ru-Ru" dirty="0"/>
         </a:p>
         <a:p>
-          <a:endParaRPr lang="en-US" dirty="0"/>
+          <a:endParaRPr lang="ru-Ru" dirty="0"/>
         </a:p>
         <a:p>
-          <a:endParaRPr lang="en-US" dirty="0"/>
+          <a:endParaRPr lang="ru-Ru" dirty="0"/>
         </a:p>
         <a:p>
-          <a:endParaRPr lang="en-US" dirty="0"/>
+          <a:endParaRPr lang="ru-Ru" dirty="0"/>
         </a:p>
         <a:p>
-          <a:endParaRPr lang="en-US" dirty="0"/>
+          <a:endParaRPr lang="ru-Ru" dirty="0"/>
         </a:p>
         <a:p>
-          <a:endParaRPr lang="en-US" dirty="0"/>
+          <a:endParaRPr lang="ru-Ru" dirty="0"/>
         </a:p>
         <a:p>
-          <a:endParaRPr lang="en-US" dirty="0"/>
+          <a:endParaRPr lang="ru-Ru" dirty="0"/>
         </a:p>
       </dgm:t>
     </dgm:pt>
@@ -918,7 +919,7 @@
         <a:bodyPr/>
         <a:lstStyle/>
         <a:p>
-          <a:endParaRPr lang="en-US"/>
+          <a:endParaRPr lang="ru-Ru"/>
         </a:p>
       </dgm:t>
     </dgm:pt>
@@ -929,7 +930,7 @@
         <a:bodyPr/>
         <a:lstStyle/>
         <a:p>
-          <a:endParaRPr lang="en-US"/>
+          <a:endParaRPr lang="ru-Ru"/>
         </a:p>
       </dgm:t>
     </dgm:pt>
@@ -940,17 +941,14 @@
         <a:bodyPr/>
         <a:lstStyle/>
         <a:p>
+          <a:pPr algn="ctr" rtl="0"/>
           <a:r>
-            <a:rPr lang="en-US" dirty="0" err="1"/>
-            <a:t>configtxgen</a:t>
-          </a:r>
-          <a:r>
-            <a:rPr lang="en-US" dirty="0"/>
-            <a:t> tool</a:t>
+            <a:rPr lang="ru-Ru" b="0" i="0" u="none" baseline="0"/>
+            <a:t>инструмент configtxgen</a:t>
           </a:r>
         </a:p>
         <a:p>
-          <a:endParaRPr lang="en-US" dirty="0"/>
+          <a:endParaRPr lang="ru-Ru" dirty="0"/>
         </a:p>
       </dgm:t>
     </dgm:pt>
@@ -961,7 +959,7 @@
         <a:bodyPr/>
         <a:lstStyle/>
         <a:p>
-          <a:endParaRPr lang="en-US"/>
+          <a:endParaRPr lang="ru-Ru"/>
         </a:p>
       </dgm:t>
     </dgm:pt>
@@ -972,7 +970,7 @@
         <a:bodyPr/>
         <a:lstStyle/>
         <a:p>
-          <a:endParaRPr lang="en-US"/>
+          <a:endParaRPr lang="ru-Ru"/>
         </a:p>
       </dgm:t>
     </dgm:pt>
@@ -983,42 +981,44 @@
         <a:bodyPr/>
         <a:lstStyle/>
         <a:p>
+          <a:pPr algn="ctr" rtl="0"/>
           <a:r>
-            <a:rPr lang="en-US" dirty="0" err="1"/>
-            <a:t>genesis.block</a:t>
+            <a:rPr lang="ru-Ru" b="0" i="0" u="none" baseline="0"/>
+            <a:t>первичный блок genesis.block</a:t>
           </a:r>
-          <a:endParaRPr lang="en-US" dirty="0"/>
+          <a:endParaRPr lang="ru-Ru" dirty="0"/>
         </a:p>
         <a:p>
-          <a:endParaRPr lang="en-US" dirty="0"/>
+          <a:endParaRPr lang="ru-Ru" dirty="0"/>
         </a:p>
         <a:p>
-          <a:endParaRPr lang="en-US" dirty="0"/>
+          <a:endParaRPr lang="ru-Ru" dirty="0"/>
         </a:p>
         <a:p>
-          <a:endParaRPr lang="en-US" dirty="0"/>
+          <a:endParaRPr lang="ru-Ru" dirty="0"/>
         </a:p>
         <a:p>
-          <a:endParaRPr lang="en-US" dirty="0"/>
+          <a:endParaRPr lang="ru-Ru" dirty="0"/>
         </a:p>
         <a:p>
-          <a:endParaRPr lang="en-US" dirty="0"/>
+          <a:endParaRPr lang="ru-Ru" dirty="0"/>
         </a:p>
         <a:p>
-          <a:endParaRPr lang="en-US" dirty="0"/>
+          <a:endParaRPr lang="ru-Ru" dirty="0"/>
         </a:p>
         <a:p>
-          <a:endParaRPr lang="en-US" dirty="0"/>
+          <a:endParaRPr lang="ru-Ru" dirty="0"/>
         </a:p>
         <a:p>
-          <a:endParaRPr lang="en-US" dirty="0"/>
+          <a:endParaRPr lang="ru-Ru" dirty="0"/>
         </a:p>
         <a:p>
-          <a:endParaRPr lang="en-US" dirty="0"/>
+          <a:endParaRPr lang="ru-Ru" dirty="0"/>
         </a:p>
         <a:p>
+          <a:pPr algn="ctr" rtl="0"/>
           <a:r>
-            <a:rPr lang="en-US" dirty="0"/>
+            <a:rPr lang="ru-Ru" b="0" i="0" u="none" baseline="0"/>
             <a:t> </a:t>
           </a:r>
         </a:p>
@@ -1031,7 +1031,7 @@
         <a:bodyPr/>
         <a:lstStyle/>
         <a:p>
-          <a:endParaRPr lang="en-US"/>
+          <a:endParaRPr lang="ru-Ru"/>
         </a:p>
       </dgm:t>
     </dgm:pt>
@@ -1042,7 +1042,7 @@
         <a:bodyPr/>
         <a:lstStyle/>
         <a:p>
-          <a:endParaRPr lang="en-US"/>
+          <a:endParaRPr lang="ru-Ru"/>
         </a:p>
       </dgm:t>
     </dgm:pt>
@@ -1062,14 +1062,35 @@
         </dgm:presLayoutVars>
       </dgm:prSet>
       <dgm:spPr/>
+      <dgm:t>
+        <a:bodyPr/>
+        <a:lstStyle/>
+        <a:p>
+          <a:endParaRPr lang="ru-RU"/>
+        </a:p>
+      </dgm:t>
     </dgm:pt>
     <dgm:pt modelId="{FDBC50BA-5B0B-D840-9875-0BB27D476504}" type="pres">
       <dgm:prSet presAssocID="{48ABCE8D-ED8E-C148-B5EF-4CA47EF3F851}" presName="sibTrans" presStyleLbl="sibTrans2D1" presStyleIdx="0" presStyleCnt="2"/>
       <dgm:spPr/>
+      <dgm:t>
+        <a:bodyPr/>
+        <a:lstStyle/>
+        <a:p>
+          <a:endParaRPr lang="ru-RU"/>
+        </a:p>
+      </dgm:t>
     </dgm:pt>
     <dgm:pt modelId="{D1F2C96C-5B61-BC4E-8C9D-D6AD7E359E53}" type="pres">
       <dgm:prSet presAssocID="{48ABCE8D-ED8E-C148-B5EF-4CA47EF3F851}" presName="connectorText" presStyleLbl="sibTrans2D1" presStyleIdx="0" presStyleCnt="2"/>
       <dgm:spPr/>
+      <dgm:t>
+        <a:bodyPr/>
+        <a:lstStyle/>
+        <a:p>
+          <a:endParaRPr lang="ru-RU"/>
+        </a:p>
+      </dgm:t>
     </dgm:pt>
     <dgm:pt modelId="{0215057D-1011-9141-8AB3-721FA6ACC70D}" type="pres">
       <dgm:prSet presAssocID="{F1701819-3A2F-8A44-9499-9935EFC5614B}" presName="node" presStyleLbl="node1" presStyleIdx="1" presStyleCnt="3">
@@ -1078,14 +1099,35 @@
         </dgm:presLayoutVars>
       </dgm:prSet>
       <dgm:spPr/>
+      <dgm:t>
+        <a:bodyPr/>
+        <a:lstStyle/>
+        <a:p>
+          <a:endParaRPr lang="ru-RU"/>
+        </a:p>
+      </dgm:t>
     </dgm:pt>
     <dgm:pt modelId="{40D2CA6D-50A8-A74F-A2E9-22453F43FB96}" type="pres">
       <dgm:prSet presAssocID="{60154467-B5BF-564D-B6B1-97BE8CA1C55F}" presName="sibTrans" presStyleLbl="sibTrans2D1" presStyleIdx="1" presStyleCnt="2"/>
       <dgm:spPr/>
+      <dgm:t>
+        <a:bodyPr/>
+        <a:lstStyle/>
+        <a:p>
+          <a:endParaRPr lang="ru-RU"/>
+        </a:p>
+      </dgm:t>
     </dgm:pt>
     <dgm:pt modelId="{8F48EB89-DD03-B04D-B884-839DC6E6CB24}" type="pres">
       <dgm:prSet presAssocID="{60154467-B5BF-564D-B6B1-97BE8CA1C55F}" presName="connectorText" presStyleLbl="sibTrans2D1" presStyleIdx="1" presStyleCnt="2"/>
       <dgm:spPr/>
+      <dgm:t>
+        <a:bodyPr/>
+        <a:lstStyle/>
+        <a:p>
+          <a:endParaRPr lang="ru-RU"/>
+        </a:p>
+      </dgm:t>
     </dgm:pt>
     <dgm:pt modelId="{C941C808-D015-3B4F-939E-364F92A3E6F0}" type="pres">
       <dgm:prSet presAssocID="{10CA4083-CD4E-7D49-AF89-B24671ED1A42}" presName="node" presStyleLbl="node1" presStyleIdx="2" presStyleCnt="3" custScaleY="256522">
@@ -1094,20 +1136,27 @@
         </dgm:presLayoutVars>
       </dgm:prSet>
       <dgm:spPr/>
+      <dgm:t>
+        <a:bodyPr/>
+        <a:lstStyle/>
+        <a:p>
+          <a:endParaRPr lang="ru-RU"/>
+        </a:p>
+      </dgm:t>
     </dgm:pt>
   </dgm:ptLst>
   <dgm:cxnLst>
-    <dgm:cxn modelId="{093C400E-5F37-2547-8C54-C1F52CBBA070}" type="presOf" srcId="{60154467-B5BF-564D-B6B1-97BE8CA1C55F}" destId="{40D2CA6D-50A8-A74F-A2E9-22453F43FB96}" srcOrd="0" destOrd="0" presId="urn:microsoft.com/office/officeart/2005/8/layout/process1"/>
-    <dgm:cxn modelId="{F24B6E14-8625-7B40-8C1B-F6836412D454}" type="presOf" srcId="{10CA4083-CD4E-7D49-AF89-B24671ED1A42}" destId="{C941C808-D015-3B4F-939E-364F92A3E6F0}" srcOrd="0" destOrd="0" presId="urn:microsoft.com/office/officeart/2005/8/layout/process1"/>
+    <dgm:cxn modelId="{7F272494-3BBE-5445-8C1D-66D81AAC1866}" srcId="{BE673A56-5302-2646-A931-B4563F920AA2}" destId="{F1701819-3A2F-8A44-9499-9935EFC5614B}" srcOrd="1" destOrd="0" parTransId="{AD4D22E9-7D19-1F48-B46B-3D931272077D}" sibTransId="{60154467-B5BF-564D-B6B1-97BE8CA1C55F}"/>
     <dgm:cxn modelId="{923D5031-A676-6E45-800C-155CE4DA623A}" type="presOf" srcId="{60154467-B5BF-564D-B6B1-97BE8CA1C55F}" destId="{8F48EB89-DD03-B04D-B884-839DC6E6CB24}" srcOrd="1" destOrd="0" presId="urn:microsoft.com/office/officeart/2005/8/layout/process1"/>
+    <dgm:cxn modelId="{F1DD46A0-6B5D-824E-B2E0-75ABA82E2CA3}" srcId="{BE673A56-5302-2646-A931-B4563F920AA2}" destId="{10CA4083-CD4E-7D49-AF89-B24671ED1A42}" srcOrd="2" destOrd="0" parTransId="{156EA72E-6EA4-834D-A772-EE6731484063}" sibTransId="{960F0342-972B-864C-B472-7A1273F82461}"/>
+    <dgm:cxn modelId="{CBAA2989-0974-2B44-AA6E-C280DEB63641}" type="presOf" srcId="{F1701819-3A2F-8A44-9499-9935EFC5614B}" destId="{0215057D-1011-9141-8AB3-721FA6ACC70D}" srcOrd="0" destOrd="0" presId="urn:microsoft.com/office/officeart/2005/8/layout/process1"/>
     <dgm:cxn modelId="{2B2EF439-74D0-AC4E-B6A6-E1CE9F47CC93}" type="presOf" srcId="{B3469028-716C-8B49-8C22-B413E070994C}" destId="{D554ED56-22DA-A74E-807B-C8CA1903140E}" srcOrd="0" destOrd="0" presId="urn:microsoft.com/office/officeart/2005/8/layout/process1"/>
     <dgm:cxn modelId="{DEDB0370-F0D4-2246-BB0B-0896EF04B9B9}" type="presOf" srcId="{48ABCE8D-ED8E-C148-B5EF-4CA47EF3F851}" destId="{D1F2C96C-5B61-BC4E-8C9D-D6AD7E359E53}" srcOrd="1" destOrd="0" presId="urn:microsoft.com/office/officeart/2005/8/layout/process1"/>
-    <dgm:cxn modelId="{CBAA2989-0974-2B44-AA6E-C280DEB63641}" type="presOf" srcId="{F1701819-3A2F-8A44-9499-9935EFC5614B}" destId="{0215057D-1011-9141-8AB3-721FA6ACC70D}" srcOrd="0" destOrd="0" presId="urn:microsoft.com/office/officeart/2005/8/layout/process1"/>
-    <dgm:cxn modelId="{7F272494-3BBE-5445-8C1D-66D81AAC1866}" srcId="{BE673A56-5302-2646-A931-B4563F920AA2}" destId="{F1701819-3A2F-8A44-9499-9935EFC5614B}" srcOrd="1" destOrd="0" parTransId="{AD4D22E9-7D19-1F48-B46B-3D931272077D}" sibTransId="{60154467-B5BF-564D-B6B1-97BE8CA1C55F}"/>
-    <dgm:cxn modelId="{F1DD46A0-6B5D-824E-B2E0-75ABA82E2CA3}" srcId="{BE673A56-5302-2646-A931-B4563F920AA2}" destId="{10CA4083-CD4E-7D49-AF89-B24671ED1A42}" srcOrd="2" destOrd="0" parTransId="{156EA72E-6EA4-834D-A772-EE6731484063}" sibTransId="{960F0342-972B-864C-B472-7A1273F82461}"/>
+    <dgm:cxn modelId="{CBCE28DC-3436-0D43-A541-5EBF00835ED9}" type="presOf" srcId="{BE673A56-5302-2646-A931-B4563F920AA2}" destId="{EC167190-A553-5447-BF03-2130DABA2344}" srcOrd="0" destOrd="0" presId="urn:microsoft.com/office/officeart/2005/8/layout/process1"/>
+    <dgm:cxn modelId="{F24B6E14-8625-7B40-8C1B-F6836412D454}" type="presOf" srcId="{10CA4083-CD4E-7D49-AF89-B24671ED1A42}" destId="{C941C808-D015-3B4F-939E-364F92A3E6F0}" srcOrd="0" destOrd="0" presId="urn:microsoft.com/office/officeart/2005/8/layout/process1"/>
+    <dgm:cxn modelId="{093C400E-5F37-2547-8C54-C1F52CBBA070}" type="presOf" srcId="{60154467-B5BF-564D-B6B1-97BE8CA1C55F}" destId="{40D2CA6D-50A8-A74F-A2E9-22453F43FB96}" srcOrd="0" destOrd="0" presId="urn:microsoft.com/office/officeart/2005/8/layout/process1"/>
+    <dgm:cxn modelId="{20EC75B0-1DE0-574E-B8E7-44653CF405EB}" srcId="{BE673A56-5302-2646-A931-B4563F920AA2}" destId="{B3469028-716C-8B49-8C22-B413E070994C}" srcOrd="0" destOrd="0" parTransId="{3E83B87B-0B81-2B4D-8E46-BB329B32696C}" sibTransId="{48ABCE8D-ED8E-C148-B5EF-4CA47EF3F851}"/>
     <dgm:cxn modelId="{C93DD8AA-5753-8049-B8F7-93A166ED778F}" type="presOf" srcId="{48ABCE8D-ED8E-C148-B5EF-4CA47EF3F851}" destId="{FDBC50BA-5B0B-D840-9875-0BB27D476504}" srcOrd="0" destOrd="0" presId="urn:microsoft.com/office/officeart/2005/8/layout/process1"/>
-    <dgm:cxn modelId="{20EC75B0-1DE0-574E-B8E7-44653CF405EB}" srcId="{BE673A56-5302-2646-A931-B4563F920AA2}" destId="{B3469028-716C-8B49-8C22-B413E070994C}" srcOrd="0" destOrd="0" parTransId="{3E83B87B-0B81-2B4D-8E46-BB329B32696C}" sibTransId="{48ABCE8D-ED8E-C148-B5EF-4CA47EF3F851}"/>
-    <dgm:cxn modelId="{CBCE28DC-3436-0D43-A541-5EBF00835ED9}" type="presOf" srcId="{BE673A56-5302-2646-A931-B4563F920AA2}" destId="{EC167190-A553-5447-BF03-2130DABA2344}" srcOrd="0" destOrd="0" presId="urn:microsoft.com/office/officeart/2005/8/layout/process1"/>
     <dgm:cxn modelId="{2AE33AE5-91B3-494C-94FE-39436A28CF64}" type="presParOf" srcId="{EC167190-A553-5447-BF03-2130DABA2344}" destId="{D554ED56-22DA-A74E-807B-C8CA1903140E}" srcOrd="0" destOrd="0" presId="urn:microsoft.com/office/officeart/2005/8/layout/process1"/>
     <dgm:cxn modelId="{018A6943-F753-3442-87B8-FFF1B1F6F768}" type="presParOf" srcId="{EC167190-A553-5447-BF03-2130DABA2344}" destId="{FDBC50BA-5B0B-D840-9875-0BB27D476504}" srcOrd="1" destOrd="0" presId="urn:microsoft.com/office/officeart/2005/8/layout/process1"/>
     <dgm:cxn modelId="{09467641-2CC1-A14B-BF10-55EED5E30F64}" type="presParOf" srcId="{FDBC50BA-5B0B-D840-9875-0BB27D476504}" destId="{D1F2C96C-5B61-BC4E-8C9D-D6AD7E359E53}" srcOrd="0" destOrd="0" presId="urn:microsoft.com/office/officeart/2005/8/layout/process1"/>
@@ -1191,7 +1240,7 @@
         </a:bodyPr>
         <a:lstStyle/>
         <a:p>
-          <a:pPr marL="0" lvl="0" indent="0" algn="ctr" defTabSz="800100">
+          <a:pPr lvl="0" algn="ctr" defTabSz="800100" rtl="0">
             <a:lnSpc>
               <a:spcPct val="90000"/>
             </a:lnSpc>
@@ -1201,16 +1250,15 @@
             <a:spcAft>
               <a:spcPct val="35000"/>
             </a:spcAft>
-            <a:buNone/>
           </a:pPr>
           <a:r>
-            <a:rPr lang="en-US" sz="1800" kern="1200" dirty="0" err="1"/>
+            <a:rPr lang="ru-Ru" sz="1800" b="0" i="0" u="none" kern="1200" baseline="0"/>
             <a:t>configtx.yaml</a:t>
           </a:r>
-          <a:endParaRPr lang="en-US" sz="1800" kern="1200" dirty="0"/>
+          <a:endParaRPr lang="ru-Ru" sz="1800" kern="1200" dirty="0"/>
         </a:p>
         <a:p>
-          <a:pPr marL="0" lvl="0" indent="0" algn="ctr" defTabSz="800100">
+          <a:pPr lvl="0" defTabSz="800100">
             <a:lnSpc>
               <a:spcPct val="90000"/>
             </a:lnSpc>
@@ -1220,12 +1268,11 @@
             <a:spcAft>
               <a:spcPct val="35000"/>
             </a:spcAft>
-            <a:buNone/>
           </a:pPr>
-          <a:endParaRPr lang="en-US" sz="1800" kern="1200" dirty="0"/>
+          <a:endParaRPr lang="ru-Ru" sz="1800" kern="1200" dirty="0"/>
         </a:p>
         <a:p>
-          <a:pPr marL="0" lvl="0" indent="0" algn="ctr" defTabSz="800100">
+          <a:pPr lvl="0" defTabSz="800100">
             <a:lnSpc>
               <a:spcPct val="90000"/>
             </a:lnSpc>
@@ -1235,12 +1282,11 @@
             <a:spcAft>
               <a:spcPct val="35000"/>
             </a:spcAft>
-            <a:buNone/>
           </a:pPr>
-          <a:endParaRPr lang="en-US" sz="1800" kern="1200" dirty="0"/>
+          <a:endParaRPr lang="ru-Ru" sz="1800" kern="1200" dirty="0"/>
         </a:p>
         <a:p>
-          <a:pPr marL="0" lvl="0" indent="0" algn="ctr" defTabSz="800100">
+          <a:pPr lvl="0" defTabSz="800100">
             <a:lnSpc>
               <a:spcPct val="90000"/>
             </a:lnSpc>
@@ -1250,12 +1296,11 @@
             <a:spcAft>
               <a:spcPct val="35000"/>
             </a:spcAft>
-            <a:buNone/>
           </a:pPr>
-          <a:endParaRPr lang="en-US" sz="1800" kern="1200" dirty="0"/>
+          <a:endParaRPr lang="ru-Ru" sz="1800" kern="1200" dirty="0"/>
         </a:p>
         <a:p>
-          <a:pPr marL="0" lvl="0" indent="0" algn="ctr" defTabSz="800100">
+          <a:pPr lvl="0" defTabSz="800100">
             <a:lnSpc>
               <a:spcPct val="90000"/>
             </a:lnSpc>
@@ -1265,12 +1310,11 @@
             <a:spcAft>
               <a:spcPct val="35000"/>
             </a:spcAft>
-            <a:buNone/>
           </a:pPr>
-          <a:endParaRPr lang="en-US" sz="1800" kern="1200" dirty="0"/>
+          <a:endParaRPr lang="ru-Ru" sz="1800" kern="1200" dirty="0"/>
         </a:p>
         <a:p>
-          <a:pPr marL="0" lvl="0" indent="0" algn="ctr" defTabSz="800100">
+          <a:pPr lvl="0" defTabSz="800100">
             <a:lnSpc>
               <a:spcPct val="90000"/>
             </a:lnSpc>
@@ -1280,12 +1324,11 @@
             <a:spcAft>
               <a:spcPct val="35000"/>
             </a:spcAft>
-            <a:buNone/>
           </a:pPr>
-          <a:endParaRPr lang="en-US" sz="1800" kern="1200" dirty="0"/>
+          <a:endParaRPr lang="ru-Ru" sz="1800" kern="1200" dirty="0"/>
         </a:p>
         <a:p>
-          <a:pPr marL="0" lvl="0" indent="0" algn="ctr" defTabSz="800100">
+          <a:pPr lvl="0" defTabSz="800100">
             <a:lnSpc>
               <a:spcPct val="90000"/>
             </a:lnSpc>
@@ -1295,12 +1338,11 @@
             <a:spcAft>
               <a:spcPct val="35000"/>
             </a:spcAft>
-            <a:buNone/>
           </a:pPr>
-          <a:endParaRPr lang="en-US" sz="1800" kern="1200" dirty="0"/>
+          <a:endParaRPr lang="ru-Ru" sz="1800" kern="1200" dirty="0"/>
         </a:p>
         <a:p>
-          <a:pPr marL="0" lvl="0" indent="0" algn="ctr" defTabSz="800100">
+          <a:pPr lvl="0" defTabSz="800100">
             <a:lnSpc>
               <a:spcPct val="90000"/>
             </a:lnSpc>
@@ -1310,12 +1352,11 @@
             <a:spcAft>
               <a:spcPct val="35000"/>
             </a:spcAft>
-            <a:buNone/>
           </a:pPr>
-          <a:endParaRPr lang="en-US" sz="1800" kern="1200" dirty="0"/>
+          <a:endParaRPr lang="ru-Ru" sz="1800" kern="1200" dirty="0"/>
         </a:p>
         <a:p>
-          <a:pPr marL="0" lvl="0" indent="0" algn="ctr" defTabSz="800100">
+          <a:pPr lvl="0" defTabSz="800100">
             <a:lnSpc>
               <a:spcPct val="90000"/>
             </a:lnSpc>
@@ -1325,9 +1366,8 @@
             <a:spcAft>
               <a:spcPct val="35000"/>
             </a:spcAft>
-            <a:buNone/>
           </a:pPr>
-          <a:endParaRPr lang="en-US" sz="1800" kern="1200" dirty="0"/>
+          <a:endParaRPr lang="ru-Ru" sz="1800" kern="1200" dirty="0"/>
         </a:p>
       </dsp:txBody>
       <dsp:txXfrm>
@@ -1385,7 +1425,7 @@
         </a:bodyPr>
         <a:lstStyle/>
         <a:p>
-          <a:pPr marL="0" lvl="0" indent="0" algn="ctr" defTabSz="666750">
+          <a:pPr lvl="0" algn="ctr" defTabSz="666750">
             <a:lnSpc>
               <a:spcPct val="90000"/>
             </a:lnSpc>
@@ -1395,9 +1435,8 @@
             <a:spcAft>
               <a:spcPct val="35000"/>
             </a:spcAft>
-            <a:buNone/>
           </a:pPr>
-          <a:endParaRPr lang="en-US" sz="1500" kern="1200"/>
+          <a:endParaRPr lang="ru-Ru" sz="1500" kern="1200"/>
         </a:p>
       </dsp:txBody>
       <dsp:txXfrm>
@@ -1462,7 +1501,7 @@
         </a:bodyPr>
         <a:lstStyle/>
         <a:p>
-          <a:pPr marL="0" lvl="0" indent="0" algn="ctr" defTabSz="800100">
+          <a:pPr lvl="0" algn="ctr" defTabSz="800100" rtl="0">
             <a:lnSpc>
               <a:spcPct val="90000"/>
             </a:lnSpc>
@@ -1472,19 +1511,14 @@
             <a:spcAft>
               <a:spcPct val="35000"/>
             </a:spcAft>
-            <a:buNone/>
           </a:pPr>
           <a:r>
-            <a:rPr lang="en-US" sz="1800" kern="1200" dirty="0" err="1"/>
-            <a:t>configtxgen</a:t>
-          </a:r>
-          <a:r>
-            <a:rPr lang="en-US" sz="1800" kern="1200" dirty="0"/>
-            <a:t> tool</a:t>
+            <a:rPr lang="ru-Ru" sz="1800" b="0" i="0" u="none" kern="1200" baseline="0"/>
+            <a:t>инструмент configtxgen</a:t>
           </a:r>
         </a:p>
         <a:p>
-          <a:pPr marL="0" lvl="0" indent="0" algn="ctr" defTabSz="800100">
+          <a:pPr lvl="0" defTabSz="800100">
             <a:lnSpc>
               <a:spcPct val="90000"/>
             </a:lnSpc>
@@ -1494,9 +1528,8 @@
             <a:spcAft>
               <a:spcPct val="35000"/>
             </a:spcAft>
-            <a:buNone/>
           </a:pPr>
-          <a:endParaRPr lang="en-US" sz="1800" kern="1200" dirty="0"/>
+          <a:endParaRPr lang="ru-Ru" sz="1800" kern="1200" dirty="0"/>
         </a:p>
       </dsp:txBody>
       <dsp:txXfrm>
@@ -1554,7 +1587,7 @@
         </a:bodyPr>
         <a:lstStyle/>
         <a:p>
-          <a:pPr marL="0" lvl="0" indent="0" algn="ctr" defTabSz="666750">
+          <a:pPr lvl="0" algn="ctr" defTabSz="666750">
             <a:lnSpc>
               <a:spcPct val="90000"/>
             </a:lnSpc>
@@ -1564,9 +1597,8 @@
             <a:spcAft>
               <a:spcPct val="35000"/>
             </a:spcAft>
-            <a:buNone/>
           </a:pPr>
-          <a:endParaRPr lang="en-US" sz="1500" kern="1200"/>
+          <a:endParaRPr lang="ru-Ru" sz="1500" kern="1200"/>
         </a:p>
       </dsp:txBody>
       <dsp:txXfrm>
@@ -1631,7 +1663,7 @@
         </a:bodyPr>
         <a:lstStyle/>
         <a:p>
-          <a:pPr marL="0" lvl="0" indent="0" algn="ctr" defTabSz="800100">
+          <a:pPr lvl="0" algn="ctr" defTabSz="800100" rtl="0">
             <a:lnSpc>
               <a:spcPct val="90000"/>
             </a:lnSpc>
@@ -1641,16 +1673,15 @@
             <a:spcAft>
               <a:spcPct val="35000"/>
             </a:spcAft>
-            <a:buNone/>
           </a:pPr>
           <a:r>
-            <a:rPr lang="en-US" sz="1800" kern="1200" dirty="0" err="1"/>
-            <a:t>genesis.block</a:t>
+            <a:rPr lang="ru-Ru" sz="1800" b="0" i="0" u="none" kern="1200" baseline="0"/>
+            <a:t>первичный блок genesis.block</a:t>
           </a:r>
-          <a:endParaRPr lang="en-US" sz="1800" kern="1200" dirty="0"/>
+          <a:endParaRPr lang="ru-Ru" sz="1800" kern="1200" dirty="0"/>
         </a:p>
         <a:p>
-          <a:pPr marL="0" lvl="0" indent="0" algn="ctr" defTabSz="800100">
+          <a:pPr lvl="0" defTabSz="800100">
             <a:lnSpc>
               <a:spcPct val="90000"/>
             </a:lnSpc>
@@ -1660,12 +1691,11 @@
             <a:spcAft>
               <a:spcPct val="35000"/>
             </a:spcAft>
-            <a:buNone/>
           </a:pPr>
-          <a:endParaRPr lang="en-US" sz="1800" kern="1200" dirty="0"/>
+          <a:endParaRPr lang="ru-Ru" sz="1800" kern="1200" dirty="0"/>
         </a:p>
         <a:p>
-          <a:pPr marL="0" lvl="0" indent="0" algn="ctr" defTabSz="800100">
+          <a:pPr lvl="0" defTabSz="800100">
             <a:lnSpc>
               <a:spcPct val="90000"/>
             </a:lnSpc>
@@ -1675,12 +1705,11 @@
             <a:spcAft>
               <a:spcPct val="35000"/>
             </a:spcAft>
-            <a:buNone/>
           </a:pPr>
-          <a:endParaRPr lang="en-US" sz="1800" kern="1200" dirty="0"/>
+          <a:endParaRPr lang="ru-Ru" sz="1800" kern="1200" dirty="0"/>
         </a:p>
         <a:p>
-          <a:pPr marL="0" lvl="0" indent="0" algn="ctr" defTabSz="800100">
+          <a:pPr lvl="0" defTabSz="800100">
             <a:lnSpc>
               <a:spcPct val="90000"/>
             </a:lnSpc>
@@ -1690,12 +1719,11 @@
             <a:spcAft>
               <a:spcPct val="35000"/>
             </a:spcAft>
-            <a:buNone/>
           </a:pPr>
-          <a:endParaRPr lang="en-US" sz="1800" kern="1200" dirty="0"/>
+          <a:endParaRPr lang="ru-Ru" sz="1800" kern="1200" dirty="0"/>
         </a:p>
         <a:p>
-          <a:pPr marL="0" lvl="0" indent="0" algn="ctr" defTabSz="800100">
+          <a:pPr lvl="0" defTabSz="800100">
             <a:lnSpc>
               <a:spcPct val="90000"/>
             </a:lnSpc>
@@ -1705,12 +1733,11 @@
             <a:spcAft>
               <a:spcPct val="35000"/>
             </a:spcAft>
-            <a:buNone/>
           </a:pPr>
-          <a:endParaRPr lang="en-US" sz="1800" kern="1200" dirty="0"/>
+          <a:endParaRPr lang="ru-Ru" sz="1800" kern="1200" dirty="0"/>
         </a:p>
         <a:p>
-          <a:pPr marL="0" lvl="0" indent="0" algn="ctr" defTabSz="800100">
+          <a:pPr lvl="0" defTabSz="800100">
             <a:lnSpc>
               <a:spcPct val="90000"/>
             </a:lnSpc>
@@ -1720,12 +1747,11 @@
             <a:spcAft>
               <a:spcPct val="35000"/>
             </a:spcAft>
-            <a:buNone/>
           </a:pPr>
-          <a:endParaRPr lang="en-US" sz="1800" kern="1200" dirty="0"/>
+          <a:endParaRPr lang="ru-Ru" sz="1800" kern="1200" dirty="0"/>
         </a:p>
         <a:p>
-          <a:pPr marL="0" lvl="0" indent="0" algn="ctr" defTabSz="800100">
+          <a:pPr lvl="0" defTabSz="800100">
             <a:lnSpc>
               <a:spcPct val="90000"/>
             </a:lnSpc>
@@ -1735,12 +1761,11 @@
             <a:spcAft>
               <a:spcPct val="35000"/>
             </a:spcAft>
-            <a:buNone/>
           </a:pPr>
-          <a:endParaRPr lang="en-US" sz="1800" kern="1200" dirty="0"/>
+          <a:endParaRPr lang="ru-Ru" sz="1800" kern="1200" dirty="0"/>
         </a:p>
         <a:p>
-          <a:pPr marL="0" lvl="0" indent="0" algn="ctr" defTabSz="800100">
+          <a:pPr lvl="0" defTabSz="800100">
             <a:lnSpc>
               <a:spcPct val="90000"/>
             </a:lnSpc>
@@ -1750,12 +1775,11 @@
             <a:spcAft>
               <a:spcPct val="35000"/>
             </a:spcAft>
-            <a:buNone/>
           </a:pPr>
-          <a:endParaRPr lang="en-US" sz="1800" kern="1200" dirty="0"/>
+          <a:endParaRPr lang="ru-Ru" sz="1800" kern="1200" dirty="0"/>
         </a:p>
         <a:p>
-          <a:pPr marL="0" lvl="0" indent="0" algn="ctr" defTabSz="800100">
+          <a:pPr lvl="0" defTabSz="800100">
             <a:lnSpc>
               <a:spcPct val="90000"/>
             </a:lnSpc>
@@ -1765,12 +1789,11 @@
             <a:spcAft>
               <a:spcPct val="35000"/>
             </a:spcAft>
-            <a:buNone/>
           </a:pPr>
-          <a:endParaRPr lang="en-US" sz="1800" kern="1200" dirty="0"/>
+          <a:endParaRPr lang="ru-Ru" sz="1800" kern="1200" dirty="0"/>
         </a:p>
         <a:p>
-          <a:pPr marL="0" lvl="0" indent="0" algn="ctr" defTabSz="800100">
+          <a:pPr lvl="0" defTabSz="800100">
             <a:lnSpc>
               <a:spcPct val="90000"/>
             </a:lnSpc>
@@ -1780,12 +1803,11 @@
             <a:spcAft>
               <a:spcPct val="35000"/>
             </a:spcAft>
-            <a:buNone/>
           </a:pPr>
-          <a:endParaRPr lang="en-US" sz="1800" kern="1200" dirty="0"/>
+          <a:endParaRPr lang="ru-Ru" sz="1800" kern="1200" dirty="0"/>
         </a:p>
         <a:p>
-          <a:pPr marL="0" lvl="0" indent="0" algn="ctr" defTabSz="800100">
+          <a:pPr lvl="0" algn="ctr" defTabSz="800100" rtl="0">
             <a:lnSpc>
               <a:spcPct val="90000"/>
             </a:lnSpc>
@@ -1795,10 +1817,9 @@
             <a:spcAft>
               <a:spcPct val="35000"/>
             </a:spcAft>
-            <a:buNone/>
           </a:pPr>
           <a:r>
-            <a:rPr lang="en-US" sz="1800" kern="1200" dirty="0"/>
+            <a:rPr lang="ru-Ru" sz="1800" b="0" i="0" u="none" kern="1200" baseline="0"/>
             <a:t> </a:t>
           </a:r>
         </a:p>
@@ -3139,7 +3160,7 @@
           <a:p>
             <a:fld id="{56AAEC7F-4E29-6542-B6A8-2778CF3AB49D}" type="datetimeFigureOut">
               <a:rPr lang="en-US" smtClean="0"/>
-              <a:t>4/19/19</a:t>
+              <a:t>12/10/2020</a:t>
             </a:fld>
             <a:endParaRPr lang="en-US"/>
           </a:p>
@@ -3337,7 +3358,7 @@
           <a:p>
             <a:fld id="{56AAEC7F-4E29-6542-B6A8-2778CF3AB49D}" type="datetimeFigureOut">
               <a:rPr lang="en-US" smtClean="0"/>
-              <a:t>4/19/19</a:t>
+              <a:t>12/10/2020</a:t>
             </a:fld>
             <a:endParaRPr lang="en-US"/>
           </a:p>
@@ -3545,7 +3566,7 @@
           <a:p>
             <a:fld id="{56AAEC7F-4E29-6542-B6A8-2778CF3AB49D}" type="datetimeFigureOut">
               <a:rPr lang="en-US" smtClean="0"/>
-              <a:t>4/19/19</a:t>
+              <a:t>12/10/2020</a:t>
             </a:fld>
             <a:endParaRPr lang="en-US"/>
           </a:p>
@@ -3743,7 +3764,7 @@
           <a:p>
             <a:fld id="{56AAEC7F-4E29-6542-B6A8-2778CF3AB49D}" type="datetimeFigureOut">
               <a:rPr lang="en-US" smtClean="0"/>
-              <a:t>4/19/19</a:t>
+              <a:t>12/10/2020</a:t>
             </a:fld>
             <a:endParaRPr lang="en-US"/>
           </a:p>
@@ -4018,7 +4039,7 @@
           <a:p>
             <a:fld id="{56AAEC7F-4E29-6542-B6A8-2778CF3AB49D}" type="datetimeFigureOut">
               <a:rPr lang="en-US" smtClean="0"/>
-              <a:t>4/19/19</a:t>
+              <a:t>12/10/2020</a:t>
             </a:fld>
             <a:endParaRPr lang="en-US"/>
           </a:p>
@@ -4283,7 +4304,7 @@
           <a:p>
             <a:fld id="{56AAEC7F-4E29-6542-B6A8-2778CF3AB49D}" type="datetimeFigureOut">
               <a:rPr lang="en-US" smtClean="0"/>
-              <a:t>4/19/19</a:t>
+              <a:t>12/10/2020</a:t>
             </a:fld>
             <a:endParaRPr lang="en-US"/>
           </a:p>
@@ -4695,7 +4716,7 @@
           <a:p>
             <a:fld id="{56AAEC7F-4E29-6542-B6A8-2778CF3AB49D}" type="datetimeFigureOut">
               <a:rPr lang="en-US" smtClean="0"/>
-              <a:t>4/19/19</a:t>
+              <a:t>12/10/2020</a:t>
             </a:fld>
             <a:endParaRPr lang="en-US"/>
           </a:p>
@@ -4836,7 +4857,7 @@
           <a:p>
             <a:fld id="{56AAEC7F-4E29-6542-B6A8-2778CF3AB49D}" type="datetimeFigureOut">
               <a:rPr lang="en-US" smtClean="0"/>
-              <a:t>4/19/19</a:t>
+              <a:t>12/10/2020</a:t>
             </a:fld>
             <a:endParaRPr lang="en-US"/>
           </a:p>
@@ -4949,7 +4970,7 @@
           <a:p>
             <a:fld id="{56AAEC7F-4E29-6542-B6A8-2778CF3AB49D}" type="datetimeFigureOut">
               <a:rPr lang="en-US" smtClean="0"/>
-              <a:t>4/19/19</a:t>
+              <a:t>12/10/2020</a:t>
             </a:fld>
             <a:endParaRPr lang="en-US"/>
           </a:p>
@@ -5260,7 +5281,7 @@
           <a:p>
             <a:fld id="{56AAEC7F-4E29-6542-B6A8-2778CF3AB49D}" type="datetimeFigureOut">
               <a:rPr lang="en-US" smtClean="0"/>
-              <a:t>4/19/19</a:t>
+              <a:t>12/10/2020</a:t>
             </a:fld>
             <a:endParaRPr lang="en-US"/>
           </a:p>
@@ -5548,7 +5569,7 @@
           <a:p>
             <a:fld id="{56AAEC7F-4E29-6542-B6A8-2778CF3AB49D}" type="datetimeFigureOut">
               <a:rPr lang="en-US" smtClean="0"/>
-              <a:t>4/19/19</a:t>
+              <a:t>12/10/2020</a:t>
             </a:fld>
             <a:endParaRPr lang="en-US"/>
           </a:p>
@@ -5789,7 +5810,7 @@
           <a:p>
             <a:fld id="{56AAEC7F-4E29-6542-B6A8-2778CF3AB49D}" type="datetimeFigureOut">
               <a:rPr lang="en-US" smtClean="0"/>
-              <a:t>4/19/19</a:t>
+              <a:t>12/10/2020</a:t>
             </a:fld>
             <a:endParaRPr lang="en-US"/>
           </a:p>
@@ -6268,7 +6289,7 @@
                         <a:tabLst/>
                         <a:defRPr/>
                       </a:pPr>
-                      <a:endParaRPr lang="en-US" sz="1400" b="1" dirty="0"/>
+                      <a:endParaRPr lang="ru-Ru" sz="1400" b="1" dirty="0"/>
                     </a:p>
                   </a:txBody>
                   <a:tcPr>
@@ -6322,29 +6343,29 @@
                     <a:bodyPr/>
                     <a:lstStyle/>
                     <a:p>
-                      <a:endParaRPr lang="en-US" sz="1400" dirty="0"/>
+                      <a:endParaRPr lang="ru-Ru" sz="1400" dirty="0"/>
                     </a:p>
                     <a:p>
-                      <a:endParaRPr lang="en-US" sz="1400" dirty="0"/>
+                      <a:endParaRPr lang="ru-Ru" sz="1400" dirty="0"/>
                     </a:p>
                     <a:p>
-                      <a:pPr marL="0" indent="0" algn="ctr">
+                      <a:pPr marL="0" indent="0" algn="ctr" rtl="0">
                         <a:buFont typeface="Arial" panose="020B0604020202020204" pitchFamily="34" charset="0"/>
                         <a:buNone/>
                         <a:tabLst/>
                       </a:pPr>
                       <a:r>
-                        <a:rPr lang="en-US" sz="2800" b="1" dirty="0"/>
-                        <a:t>System Channel</a:t>
+                        <a:rPr lang="ru-Ru" sz="2800" b="1" i="0" u="none" baseline="0"/>
+                        <a:t>Системный канал</a:t>
                       </a:r>
                     </a:p>
                     <a:p>
-                      <a:pPr marL="0" indent="0" algn="ctr">
+                      <a:pPr marL="0" indent="0" algn="ctr" rtl="0">
                         <a:buFont typeface="Arial" panose="020B0604020202020204" pitchFamily="34" charset="0"/>
                         <a:buNone/>
                         <a:tabLst/>
                       </a:pPr>
-                      <a:endParaRPr lang="en-US" dirty="0"/>
+                      <a:endParaRPr lang="ru-Ru" dirty="0"/>
                     </a:p>
                   </a:txBody>
                   <a:tcPr>
@@ -6421,7 +6442,7 @@
                         <a:tabLst/>
                         <a:defRPr/>
                       </a:pPr>
-                      <a:endParaRPr lang="en-US" sz="1400" b="1" dirty="0"/>
+                      <a:endParaRPr lang="ru-Ru" sz="1400" b="1" dirty="0"/>
                     </a:p>
                   </a:txBody>
                   <a:tcPr>
@@ -6492,7 +6513,7 @@
                         <a:tabLst/>
                         <a:defRPr/>
                       </a:pPr>
-                      <a:endParaRPr lang="en-US" sz="1400" dirty="0"/>
+                      <a:endParaRPr lang="ru-Ru" sz="1400" dirty="0"/>
                     </a:p>
                     <a:p>
                       <a:pPr marL="0" marR="0" lvl="0" indent="0" algn="ctr" defTabSz="457200" rtl="0" eaLnBrk="1" fontAlgn="auto" latinLnBrk="0" hangingPunct="1">
@@ -6513,8 +6534,8 @@
                         <a:defRPr/>
                       </a:pPr>
                       <a:r>
-                        <a:rPr lang="en-US" sz="2800" b="1" dirty="0"/>
-                        <a:t>Application Channel</a:t>
+                        <a:rPr lang="ru-Ru" sz="2800" b="1" i="0" u="none" baseline="0"/>
+                        <a:t>Канал приложения</a:t>
                       </a:r>
                     </a:p>
                   </a:txBody>
@@ -6575,8 +6596,8 @@
                     <a:bodyPr/>
                     <a:lstStyle/>
                     <a:p>
-                      <a:pPr algn="ctr"/>
-                      <a:endParaRPr lang="en-US" sz="1400" b="1" dirty="0"/>
+                      <a:pPr algn="ctr" rtl="0"/>
+                      <a:endParaRPr lang="ru-Ru" sz="1400" b="1" dirty="0"/>
                     </a:p>
                   </a:txBody>
                   <a:tcPr>
@@ -6647,7 +6668,7 @@
                         <a:tabLst/>
                         <a:defRPr/>
                       </a:pPr>
-                      <a:endParaRPr lang="en-US" sz="1400" b="1" dirty="0"/>
+                      <a:endParaRPr lang="ru-Ru" sz="1400" b="1" dirty="0"/>
                     </a:p>
                     <a:p>
                       <a:pPr marL="0" marR="0" lvl="0" indent="0" algn="ctr" defTabSz="914400" rtl="0" eaLnBrk="1" fontAlgn="auto" latinLnBrk="0" hangingPunct="1">
@@ -6667,7 +6688,7 @@
                         <a:tabLst/>
                         <a:defRPr/>
                       </a:pPr>
-                      <a:endParaRPr lang="en-US" sz="1400" b="1" dirty="0"/>
+                      <a:endParaRPr lang="ru-Ru" sz="1400" b="1" dirty="0"/>
                     </a:p>
                     <a:p>
                       <a:pPr marL="0" marR="0" lvl="0" indent="0" algn="ctr" defTabSz="914400" rtl="0" eaLnBrk="1" fontAlgn="auto" latinLnBrk="0" hangingPunct="1">
@@ -6688,8 +6709,8 @@
                         <a:defRPr/>
                       </a:pPr>
                       <a:r>
-                        <a:rPr lang="en-US" sz="2800" b="1" dirty="0"/>
-                        <a:t>Access Control Lists (ACLs)  and smart contracts</a:t>
+                        <a:rPr lang="ru-Ru" sz="2800" b="1" i="0" u="none" baseline="0"/>
+                        <a:t>Списки контроля доступа (ACL) и смарт-контракты</a:t>
                       </a:r>
                     </a:p>
                     <a:p>
@@ -6710,7 +6731,7 @@
                         <a:tabLst/>
                         <a:defRPr/>
                       </a:pPr>
-                      <a:endParaRPr lang="en-US" sz="1800" b="1" dirty="0"/>
+                      <a:endParaRPr lang="ru-Ru" sz="1800" b="1" dirty="0"/>
                     </a:p>
                   </a:txBody>
                   <a:tcPr>
@@ -6794,12 +6815,13 @@
           <a:bodyPr/>
           <a:lstStyle/>
           <a:p>
+            <a:pPr algn="r" rtl="0"/>
             <a:fld id="{08BF69C1-739F-1B47-B5E3-FA651BCAB105}" type="slidenum">
-              <a:rPr lang="en-US" smtClean="0"/>
+              <a:rPr/>
               <a:pPr/>
               <a:t>1</a:t>
             </a:fld>
-            <a:endParaRPr lang="en-US"/>
+            <a:endParaRPr lang="ru-Ru"/>
           </a:p>
         </p:txBody>
       </p:sp>
@@ -6993,12 +7015,12 @@
             </a:lvl9pPr>
           </a:lstStyle>
           <a:p>
-            <a:pPr marL="0" indent="0" algn="ctr">
+            <a:pPr marL="0" indent="0" algn="ctr" rtl="0">
               <a:buNone/>
             </a:pPr>
             <a:r>
-              <a:rPr lang="en-US" dirty="0"/>
-              <a:t>Hyperledger Fabric Policy Hierarchy</a:t>
+              <a:rPr lang="ru-Ru" b="0" i="0" u="none" baseline="0"/>
+              <a:t>Иерархия установленных правил Hyperledger Fabric</a:t>
             </a:r>
           </a:p>
         </p:txBody>
@@ -7144,7 +7166,7 @@
                         <a:tabLst/>
                         <a:defRPr/>
                       </a:pPr>
-                      <a:endParaRPr lang="en-US" sz="1400" b="1" dirty="0"/>
+                      <a:endParaRPr lang="ru-Ru" sz="1400" b="1" dirty="0"/>
                     </a:p>
                   </a:txBody>
                   <a:tcPr>
@@ -7208,7 +7230,7 @@
                         <a:tabLst/>
                         <a:defRPr/>
                       </a:pPr>
-                      <a:endParaRPr lang="en-US" sz="1400" b="1" dirty="0"/>
+                      <a:endParaRPr lang="ru-Ru" sz="1400" b="1" dirty="0"/>
                     </a:p>
                   </a:txBody>
                   <a:tcPr>
@@ -7272,7 +7294,7 @@
                         <a:tabLst/>
                         <a:defRPr/>
                       </a:pPr>
-                      <a:endParaRPr lang="en-US" sz="1400" b="1" dirty="0"/>
+                      <a:endParaRPr lang="ru-Ru" sz="1400" b="1" dirty="0"/>
                     </a:p>
                   </a:txBody>
                   <a:tcPr>
@@ -7336,7 +7358,7 @@
                         <a:tabLst/>
                         <a:defRPr/>
                       </a:pPr>
-                      <a:endParaRPr lang="en-US" sz="1400" b="1" dirty="0"/>
+                      <a:endParaRPr lang="ru-Ru" sz="1400" b="1" dirty="0"/>
                     </a:p>
                   </a:txBody>
                   <a:tcPr>
@@ -7400,7 +7422,7 @@
                         <a:tabLst/>
                         <a:defRPr/>
                       </a:pPr>
-                      <a:endParaRPr lang="en-US" sz="1400" b="1" dirty="0"/>
+                      <a:endParaRPr lang="ru-Ru" sz="1400" b="1" dirty="0"/>
                     </a:p>
                   </a:txBody>
                   <a:tcPr>
@@ -7464,7 +7486,7 @@
                         <a:tabLst/>
                         <a:defRPr/>
                       </a:pPr>
-                      <a:endParaRPr lang="en-US" sz="1400" b="1" dirty="0"/>
+                      <a:endParaRPr lang="ru-Ru" sz="1400" b="1" dirty="0"/>
                     </a:p>
                   </a:txBody>
                   <a:tcPr>
@@ -7528,7 +7550,7 @@
                         <a:tabLst/>
                         <a:defRPr/>
                       </a:pPr>
-                      <a:endParaRPr lang="en-US" sz="1400" b="1" dirty="0"/>
+                      <a:endParaRPr lang="ru-Ru" sz="1400" b="1" dirty="0"/>
                     </a:p>
                   </a:txBody>
                   <a:tcPr>
@@ -7592,7 +7614,7 @@
                         <a:tabLst/>
                         <a:defRPr/>
                       </a:pPr>
-                      <a:endParaRPr lang="en-US" sz="1400" b="1" dirty="0"/>
+                      <a:endParaRPr lang="ru-Ru" sz="1400" b="1" dirty="0"/>
                     </a:p>
                   </a:txBody>
                   <a:tcPr>
@@ -7663,7 +7685,7 @@
                         <a:tabLst/>
                         <a:defRPr/>
                       </a:pPr>
-                      <a:endParaRPr lang="en-US" sz="1400" b="1" i="1" dirty="0"/>
+                      <a:endParaRPr lang="ru-Ru" sz="1400" b="1" i="1" dirty="0"/>
                     </a:p>
                     <a:p>
                       <a:pPr marL="0" marR="0" lvl="0" indent="0" algn="ctr" defTabSz="914400" rtl="0" eaLnBrk="1" fontAlgn="auto" latinLnBrk="0" hangingPunct="1">
@@ -7684,8 +7706,8 @@
                         <a:defRPr/>
                       </a:pPr>
                       <a:r>
-                        <a:rPr lang="en-US" sz="1400" b="1" i="1" dirty="0"/>
-                        <a:t>Consortium Membership and blockchain structure</a:t>
+                        <a:rPr lang="ru-Ru" sz="1400" b="1" i="1" u="none" baseline="0"/>
+                        <a:t>Членство в консорциуме и структура блокчейна</a:t>
                       </a:r>
                     </a:p>
                   </a:txBody>
@@ -7739,11 +7761,11 @@
                     <a:bodyPr/>
                     <a:lstStyle/>
                     <a:p>
-                      <a:pPr marL="285750" indent="-285750">
+                      <a:pPr marL="285750" indent="-285750" algn="l" rtl="0">
                         <a:buFont typeface="Arial" panose="020B0604020202020204" pitchFamily="34" charset="0"/>
                         <a:buChar char="•"/>
                       </a:pPr>
-                      <a:endParaRPr lang="en-US" sz="1400" dirty="0"/>
+                      <a:endParaRPr lang="ru-Ru" sz="1400" dirty="0"/>
                     </a:p>
                   </a:txBody>
                   <a:tcPr>
@@ -7796,7 +7818,7 @@
                     <a:bodyPr/>
                     <a:lstStyle/>
                     <a:p>
-                      <a:endParaRPr lang="en-US"/>
+                      <a:endParaRPr lang="ru-Ru"/>
                     </a:p>
                   </a:txBody>
                   <a:tcPr/>
@@ -7806,7 +7828,7 @@
                     <a:bodyPr/>
                     <a:lstStyle/>
                     <a:p>
-                      <a:endParaRPr lang="en-US"/>
+                      <a:endParaRPr lang="ru-Ru"/>
                     </a:p>
                   </a:txBody>
                   <a:tcPr/>
@@ -7816,12 +7838,12 @@
                     <a:bodyPr/>
                     <a:lstStyle/>
                     <a:p>
-                      <a:pPr marL="0" indent="0" algn="ctr">
+                      <a:pPr marL="0" indent="0" algn="ctr" rtl="0">
                         <a:buFont typeface="Arial" panose="020B0604020202020204" pitchFamily="34" charset="0"/>
                         <a:buNone/>
                         <a:tabLst/>
                       </a:pPr>
-                      <a:endParaRPr lang="en-US" dirty="0"/>
+                      <a:endParaRPr lang="ru-Ru" dirty="0"/>
                     </a:p>
                   </a:txBody>
                   <a:tcPr>
@@ -7891,7 +7913,7 @@
                         <a:tabLst/>
                         <a:defRPr/>
                       </a:pPr>
-                      <a:endParaRPr lang="en-US" sz="1000" dirty="0"/>
+                      <a:endParaRPr lang="ru-Ru" sz="1000" dirty="0"/>
                     </a:p>
                   </a:txBody>
                   <a:tcPr>
@@ -7956,7 +7978,7 @@
                         <a:tabLst/>
                         <a:defRPr/>
                       </a:pPr>
-                      <a:endParaRPr lang="en-US" sz="1000" dirty="0"/>
+                      <a:endParaRPr lang="ru-Ru" sz="1000" dirty="0"/>
                     </a:p>
                   </a:txBody>
                   <a:tcPr>
@@ -8009,12 +8031,12 @@
                     <a:bodyPr/>
                     <a:lstStyle/>
                     <a:p>
-                      <a:pPr marL="0" indent="0" algn="ctr">
+                      <a:pPr marL="0" indent="0" algn="ctr" rtl="0">
                         <a:buFont typeface="Arial" panose="020B0604020202020204" pitchFamily="34" charset="0"/>
                         <a:buNone/>
                         <a:tabLst/>
                       </a:pPr>
-                      <a:endParaRPr lang="en-US" dirty="0"/>
+                      <a:endParaRPr lang="ru-Ru" dirty="0"/>
                     </a:p>
                   </a:txBody>
                   <a:tcPr>
@@ -8091,7 +8113,7 @@
                         <a:tabLst/>
                         <a:defRPr/>
                       </a:pPr>
-                      <a:endParaRPr lang="en-US" sz="1400" b="1" dirty="0"/>
+                      <a:endParaRPr lang="ru-Ru" sz="1400" b="1" dirty="0"/>
                     </a:p>
                   </a:txBody>
                   <a:tcPr>
@@ -8155,7 +8177,7 @@
                         <a:tabLst/>
                         <a:defRPr/>
                       </a:pPr>
-                      <a:endParaRPr lang="en-US" sz="1400" b="1" dirty="0"/>
+                      <a:endParaRPr lang="ru-Ru" sz="1400" b="1" dirty="0"/>
                     </a:p>
                   </a:txBody>
                   <a:tcPr>
@@ -8219,7 +8241,7 @@
                         <a:tabLst/>
                         <a:defRPr/>
                       </a:pPr>
-                      <a:endParaRPr lang="en-US" sz="1400" b="1" dirty="0"/>
+                      <a:endParaRPr lang="ru-Ru" sz="1400" b="1" dirty="0"/>
                     </a:p>
                   </a:txBody>
                   <a:tcPr>
@@ -8283,7 +8305,7 @@
                         <a:tabLst/>
                         <a:defRPr/>
                       </a:pPr>
-                      <a:endParaRPr lang="en-US" sz="1400" b="1" dirty="0"/>
+                      <a:endParaRPr lang="ru-Ru" sz="1400" b="1" dirty="0"/>
                     </a:p>
                   </a:txBody>
                   <a:tcPr>
@@ -8347,7 +8369,7 @@
                         <a:tabLst/>
                         <a:defRPr/>
                       </a:pPr>
-                      <a:endParaRPr lang="en-US" sz="1400" b="1" dirty="0"/>
+                      <a:endParaRPr lang="ru-Ru" sz="1400" b="1" dirty="0"/>
                     </a:p>
                   </a:txBody>
                   <a:tcPr>
@@ -8411,7 +8433,7 @@
                         <a:tabLst/>
                         <a:defRPr/>
                       </a:pPr>
-                      <a:endParaRPr lang="en-US" sz="1400" b="1" dirty="0"/>
+                      <a:endParaRPr lang="ru-Ru" sz="1400" b="1" dirty="0"/>
                     </a:p>
                   </a:txBody>
                   <a:tcPr>
@@ -8475,7 +8497,7 @@
                         <a:tabLst/>
                         <a:defRPr/>
                       </a:pPr>
-                      <a:endParaRPr lang="en-US" sz="1400" b="1" dirty="0"/>
+                      <a:endParaRPr lang="ru-Ru" sz="1400" b="1" dirty="0"/>
                     </a:p>
                   </a:txBody>
                   <a:tcPr>
@@ -8539,7 +8561,7 @@
                         <a:tabLst/>
                         <a:defRPr/>
                       </a:pPr>
-                      <a:endParaRPr lang="en-US" sz="1400" b="1" dirty="0"/>
+                      <a:endParaRPr lang="ru-Ru" sz="1400" b="1" dirty="0"/>
                     </a:p>
                   </a:txBody>
                   <a:tcPr>
@@ -8610,7 +8632,7 @@
                         <a:tabLst/>
                         <a:defRPr/>
                       </a:pPr>
-                      <a:endParaRPr lang="en-US" sz="1400" b="1" dirty="0"/>
+                      <a:endParaRPr lang="ru-Ru" sz="1400" b="1" dirty="0"/>
                     </a:p>
                     <a:p>
                       <a:pPr marL="0" marR="0" lvl="0" indent="0" algn="ctr" defTabSz="457200" rtl="0" eaLnBrk="1" fontAlgn="auto" latinLnBrk="0" hangingPunct="1">
@@ -8631,8 +8653,8 @@
                         <a:defRPr/>
                       </a:pPr>
                       <a:r>
-                        <a:rPr lang="en-US" sz="1400" b="1" i="1" dirty="0"/>
-                        <a:t>Transaction networks, business logic</a:t>
+                        <a:rPr lang="ru-Ru" sz="1400" b="1" i="1" u="none" baseline="0"/>
+                        <a:t>Сети транзакций, бизнес-логика</a:t>
                       </a:r>
                     </a:p>
                     <a:p>
@@ -8653,7 +8675,7 @@
                         <a:tabLst/>
                         <a:defRPr/>
                       </a:pPr>
-                      <a:endParaRPr lang="en-US" sz="1400" dirty="0"/>
+                      <a:endParaRPr lang="ru-Ru" sz="1400" dirty="0"/>
                     </a:p>
                   </a:txBody>
                   <a:tcPr>
@@ -8723,7 +8745,7 @@
                         <a:tabLst/>
                         <a:defRPr/>
                       </a:pPr>
-                      <a:endParaRPr lang="en-US" sz="1800" b="1" dirty="0"/>
+                      <a:endParaRPr lang="ru-Ru" sz="1800" b="1" dirty="0"/>
                     </a:p>
                   </a:txBody>
                   <a:tcPr>
@@ -8793,7 +8815,7 @@
                         <a:tabLst/>
                         <a:defRPr/>
                       </a:pPr>
-                      <a:endParaRPr lang="en-US" sz="1800" b="1" dirty="0"/>
+                      <a:endParaRPr lang="ru-Ru" sz="1800" b="1" dirty="0"/>
                     </a:p>
                   </a:txBody>
                   <a:tcPr>
@@ -8858,7 +8880,7 @@
                         <a:tabLst/>
                         <a:defRPr/>
                       </a:pPr>
-                      <a:endParaRPr lang="en-US" sz="1800" b="1" dirty="0"/>
+                      <a:endParaRPr lang="ru-Ru" sz="1800" b="1" dirty="0"/>
                     </a:p>
                   </a:txBody>
                   <a:tcPr>
@@ -8906,11 +8928,11 @@
                     <a:bodyPr/>
                     <a:lstStyle/>
                     <a:p>
-                      <a:pPr marL="285750" indent="-285750">
+                      <a:pPr marL="285750" indent="-285750" algn="l" rtl="0">
                         <a:buFont typeface="Arial" panose="020B0604020202020204" pitchFamily="34" charset="0"/>
                         <a:buChar char="•"/>
                       </a:pPr>
-                      <a:endParaRPr lang="en-US" sz="1400" dirty="0"/>
+                      <a:endParaRPr lang="ru-Ru" sz="1400" dirty="0"/>
                     </a:p>
                   </a:txBody>
                   <a:tcPr>
@@ -8963,7 +8985,7 @@
                     <a:bodyPr/>
                     <a:lstStyle/>
                     <a:p>
-                      <a:endParaRPr lang="en-US"/>
+                      <a:endParaRPr lang="ru-Ru"/>
                     </a:p>
                   </a:txBody>
                   <a:tcPr/>
@@ -8973,7 +8995,7 @@
                     <a:bodyPr/>
                     <a:lstStyle/>
                     <a:p>
-                      <a:endParaRPr lang="en-US"/>
+                      <a:endParaRPr lang="ru-Ru"/>
                     </a:p>
                   </a:txBody>
                   <a:tcPr/>
@@ -9000,7 +9022,7 @@
                         <a:tabLst/>
                         <a:defRPr/>
                       </a:pPr>
-                      <a:endParaRPr lang="en-US" sz="1800" b="1" dirty="0"/>
+                      <a:endParaRPr lang="ru-Ru" sz="1800" b="1" dirty="0"/>
                     </a:p>
                   </a:txBody>
                   <a:tcPr>
@@ -9060,8 +9082,8 @@
                     <a:bodyPr/>
                     <a:lstStyle/>
                     <a:p>
-                      <a:pPr algn="ctr"/>
-                      <a:endParaRPr lang="en-US" sz="1400" b="1" dirty="0"/>
+                      <a:pPr algn="ctr" rtl="0"/>
+                      <a:endParaRPr lang="ru-Ru" sz="1400" b="1" dirty="0"/>
                     </a:p>
                   </a:txBody>
                   <a:tcPr>
@@ -9108,8 +9130,8 @@
                     <a:bodyPr/>
                     <a:lstStyle/>
                     <a:p>
-                      <a:pPr algn="ctr"/>
-                      <a:endParaRPr lang="en-US" sz="1400" b="1" dirty="0"/>
+                      <a:pPr algn="ctr" rtl="0"/>
+                      <a:endParaRPr lang="ru-Ru" sz="1400" b="1" dirty="0"/>
                     </a:p>
                   </a:txBody>
                   <a:tcPr>
@@ -9156,8 +9178,8 @@
                     <a:bodyPr/>
                     <a:lstStyle/>
                     <a:p>
-                      <a:pPr algn="ctr"/>
-                      <a:endParaRPr lang="en-US" sz="1400" b="1" dirty="0"/>
+                      <a:pPr algn="ctr" rtl="0"/>
+                      <a:endParaRPr lang="ru-Ru" sz="1400" b="1" dirty="0"/>
                     </a:p>
                   </a:txBody>
                   <a:tcPr>
@@ -9204,8 +9226,8 @@
                     <a:bodyPr/>
                     <a:lstStyle/>
                     <a:p>
-                      <a:pPr algn="ctr"/>
-                      <a:endParaRPr lang="en-US" sz="1400" b="1" dirty="0"/>
+                      <a:pPr algn="ctr" rtl="0"/>
+                      <a:endParaRPr lang="ru-Ru" sz="1400" b="1" dirty="0"/>
                     </a:p>
                   </a:txBody>
                   <a:tcPr>
@@ -9252,8 +9274,8 @@
                     <a:bodyPr/>
                     <a:lstStyle/>
                     <a:p>
-                      <a:pPr algn="ctr"/>
-                      <a:endParaRPr lang="en-US" sz="1400" b="1" dirty="0"/>
+                      <a:pPr algn="ctr" rtl="0"/>
+                      <a:endParaRPr lang="ru-Ru" sz="1400" b="1" dirty="0"/>
                     </a:p>
                   </a:txBody>
                   <a:tcPr>
@@ -9300,7 +9322,7 @@
                     <a:bodyPr/>
                     <a:lstStyle/>
                     <a:p>
-                      <a:endParaRPr lang="en-US"/>
+                      <a:endParaRPr lang="ru-Ru"/>
                     </a:p>
                   </a:txBody>
                   <a:tcPr/>
@@ -9310,8 +9332,8 @@
                     <a:bodyPr/>
                     <a:lstStyle/>
                     <a:p>
-                      <a:pPr algn="ctr"/>
-                      <a:endParaRPr lang="en-US" sz="1400" b="1" dirty="0"/>
+                      <a:pPr algn="ctr" rtl="0"/>
+                      <a:endParaRPr lang="ru-Ru" sz="1400" b="1" dirty="0"/>
                     </a:p>
                   </a:txBody>
                   <a:tcPr>
@@ -9358,8 +9380,8 @@
                     <a:bodyPr/>
                     <a:lstStyle/>
                     <a:p>
-                      <a:pPr algn="ctr"/>
-                      <a:endParaRPr lang="en-US" sz="1400" b="1" dirty="0"/>
+                      <a:pPr algn="ctr" rtl="0"/>
+                      <a:endParaRPr lang="ru-Ru" sz="1400" b="1" dirty="0"/>
                     </a:p>
                   </a:txBody>
                   <a:tcPr>
@@ -9430,7 +9452,7 @@
                         <a:tabLst/>
                         <a:defRPr/>
                       </a:pPr>
-                      <a:endParaRPr lang="en-US" sz="1400" b="1" dirty="0"/>
+                      <a:endParaRPr lang="ru-Ru" sz="1400" b="1" dirty="0"/>
                     </a:p>
                     <a:p>
                       <a:pPr marL="0" marR="0" lvl="0" indent="0" algn="ctr" defTabSz="914400" rtl="0" eaLnBrk="1" fontAlgn="auto" latinLnBrk="0" hangingPunct="1">
@@ -9451,17 +9473,17 @@
                         <a:defRPr/>
                       </a:pPr>
                       <a:r>
-                        <a:rPr lang="en-US" sz="1400" b="1" i="1" dirty="0"/>
-                        <a:t>Transactions, data, and events</a:t>
+                        <a:rPr lang="ru-Ru" sz="1400" b="1" i="1" u="none" baseline="0"/>
+                        <a:t>Транзакции, данные и события</a:t>
                       </a:r>
                     </a:p>
                     <a:p>
-                      <a:pPr marL="0" indent="0" algn="ctr">
+                      <a:pPr marL="0" indent="0" algn="ctr" rtl="0">
                         <a:buFont typeface="Arial" panose="020B0604020202020204" pitchFamily="34" charset="0"/>
                         <a:buNone/>
                         <a:tabLst/>
                       </a:pPr>
-                      <a:endParaRPr lang="en-US" sz="1800" b="1" dirty="0"/>
+                      <a:endParaRPr lang="ru-Ru" sz="1800" b="1" dirty="0"/>
                     </a:p>
                   </a:txBody>
                   <a:tcPr>
@@ -9514,12 +9536,12 @@
                     <a:bodyPr/>
                     <a:lstStyle/>
                     <a:p>
-                      <a:pPr marL="174625" indent="-174625" algn="l">
+                      <a:pPr marL="174625" indent="-174625" algn="l" rtl="0">
                         <a:buFont typeface="Arial" panose="020B0604020202020204" pitchFamily="34" charset="0"/>
                         <a:buChar char="•"/>
                         <a:tabLst/>
                       </a:pPr>
-                      <a:endParaRPr lang="en-US" sz="1800" b="1" dirty="0"/>
+                      <a:endParaRPr lang="ru-Ru" sz="1800" b="1" dirty="0"/>
                     </a:p>
                   </a:txBody>
                   <a:tcPr>
@@ -9572,7 +9594,7 @@
                     <a:bodyPr/>
                     <a:lstStyle/>
                     <a:p>
-                      <a:endParaRPr lang="en-US"/>
+                      <a:endParaRPr lang="ru-Ru"/>
                     </a:p>
                   </a:txBody>
                   <a:tcPr/>
@@ -9582,7 +9604,7 @@
                     <a:bodyPr/>
                     <a:lstStyle/>
                     <a:p>
-                      <a:endParaRPr lang="en-US"/>
+                      <a:endParaRPr lang="ru-Ru"/>
                     </a:p>
                   </a:txBody>
                   <a:tcPr/>
@@ -9609,7 +9631,7 @@
                         <a:tabLst/>
                         <a:defRPr/>
                       </a:pPr>
-                      <a:endParaRPr lang="en-US" sz="1800" b="1" dirty="0"/>
+                      <a:endParaRPr lang="ru-Ru" sz="1800" b="1" dirty="0"/>
                     </a:p>
                   </a:txBody>
                   <a:tcPr>
@@ -9662,7 +9684,7 @@
                     <a:bodyPr/>
                     <a:lstStyle/>
                     <a:p>
-                      <a:endParaRPr lang="en-US"/>
+                      <a:endParaRPr lang="ru-Ru"/>
                     </a:p>
                   </a:txBody>
                   <a:tcPr/>
@@ -9672,7 +9694,7 @@
                     <a:bodyPr/>
                     <a:lstStyle/>
                     <a:p>
-                      <a:endParaRPr lang="en-US"/>
+                      <a:endParaRPr lang="ru-Ru"/>
                     </a:p>
                   </a:txBody>
                   <a:tcPr/>
@@ -9699,7 +9721,7 @@
                         <a:tabLst/>
                         <a:defRPr/>
                       </a:pPr>
-                      <a:endParaRPr lang="en-US" sz="1800" b="1" dirty="0"/>
+                      <a:endParaRPr lang="ru-Ru" sz="1800" b="1" dirty="0"/>
                     </a:p>
                   </a:txBody>
                   <a:tcPr>
@@ -9783,12 +9805,13 @@
           <a:bodyPr/>
           <a:lstStyle/>
           <a:p>
+            <a:pPr algn="r" rtl="0"/>
             <a:fld id="{08BF69C1-739F-1B47-B5E3-FA651BCAB105}" type="slidenum">
-              <a:rPr lang="en-US" smtClean="0"/>
+              <a:rPr/>
               <a:pPr/>
               <a:t>2</a:t>
             </a:fld>
-            <a:endParaRPr lang="en-US"/>
+            <a:endParaRPr lang="ru-Ru"/>
           </a:p>
         </p:txBody>
       </p:sp>
@@ -9808,8 +9831,8 @@
         </p:nvSpPr>
         <p:spPr>
           <a:xfrm>
-            <a:off x="2247607" y="72070"/>
-            <a:ext cx="7138422" cy="571500"/>
+            <a:off x="1913860" y="72070"/>
+            <a:ext cx="8293395" cy="571500"/>
           </a:xfrm>
           <a:prstGeom prst="rect">
             <a:avLst/>
@@ -9982,13 +10005,26 @@
             </a:lvl9pPr>
           </a:lstStyle>
           <a:p>
-            <a:pPr marL="0" indent="0" algn="ctr">
+            <a:pPr marL="0" indent="0" algn="ctr" rtl="0">
               <a:buNone/>
             </a:pPr>
             <a:r>
-              <a:rPr lang="en-US" dirty="0"/>
-              <a:t>Hyperledger Fabric Policy Hierarchy</a:t>
+              <a:rPr lang="ru-Ru" b="0" i="0" u="none" baseline="0" dirty="0"/>
+              <a:t>Иерархия установленных правил </a:t>
             </a:r>
+            <a:r>
+              <a:rPr lang="ru-Ru" b="0" i="0" u="none" baseline="0" dirty="0" err="1"/>
+              <a:t>Hyperledger</a:t>
+            </a:r>
+            <a:r>
+              <a:rPr lang="ru-Ru" b="0" i="0" u="none" baseline="0" dirty="0"/>
+              <a:t> </a:t>
+            </a:r>
+            <a:r>
+              <a:rPr lang="ru-Ru" b="0" i="0" u="none" baseline="0" dirty="0" err="1"/>
+              <a:t>Fabric</a:t>
+            </a:r>
+            <a:endParaRPr lang="ru-Ru" b="0" i="0" u="none" baseline="0" dirty="0"/>
           </a:p>
         </p:txBody>
       </p:sp>
@@ -10020,13 +10056,14 @@
           </a:bodyPr>
           <a:lstStyle/>
           <a:p>
+            <a:pPr algn="l" rtl="0"/>
             <a:r>
-              <a:rPr lang="en-US" b="1" dirty="0"/>
-              <a:t>ACLs and smart contracts</a:t>
+              <a:rPr lang="ru-Ru" b="1" i="0" u="none" baseline="0"/>
+              <a:t>ACL и смарт-контракты</a:t>
             </a:r>
           </a:p>
           <a:p>
-            <a:endParaRPr lang="en-US" dirty="0"/>
+            <a:endParaRPr lang="ru-Ru" dirty="0"/>
           </a:p>
         </p:txBody>
       </p:sp>
@@ -10058,13 +10095,14 @@
           </a:bodyPr>
           <a:lstStyle/>
           <a:p>
+            <a:pPr algn="l" rtl="0"/>
             <a:r>
-              <a:rPr lang="en-US" b="1" dirty="0"/>
-              <a:t>Application Channel</a:t>
+              <a:rPr lang="ru-Ru" b="1" i="0" u="none" baseline="0"/>
+              <a:t>Канал приложения</a:t>
             </a:r>
           </a:p>
           <a:p>
-            <a:endParaRPr lang="en-US" dirty="0"/>
+            <a:endParaRPr lang="ru-Ru" dirty="0"/>
           </a:p>
         </p:txBody>
       </p:sp>
@@ -10083,7 +10121,7 @@
         <p:spPr>
           <a:xfrm>
             <a:off x="5064369" y="643570"/>
-            <a:ext cx="1684301" cy="646331"/>
+            <a:ext cx="2165771" cy="646331"/>
           </a:xfrm>
           <a:prstGeom prst="rect">
             <a:avLst/>
@@ -10096,13 +10134,14 @@
           </a:bodyPr>
           <a:lstStyle/>
           <a:p>
+            <a:pPr algn="l" rtl="0"/>
             <a:r>
-              <a:rPr lang="en-US" b="1" dirty="0"/>
-              <a:t>System Channel</a:t>
+              <a:rPr lang="ru-Ru" b="1" i="0" u="none" baseline="0" dirty="0"/>
+              <a:t>Системный канал</a:t>
             </a:r>
           </a:p>
           <a:p>
-            <a:endParaRPr lang="en-US" dirty="0"/>
+            <a:endParaRPr lang="ru-Ru" dirty="0"/>
           </a:p>
         </p:txBody>
       </p:sp>
@@ -10247,7 +10286,7 @@
                         <a:tabLst/>
                         <a:defRPr/>
                       </a:pPr>
-                      <a:endParaRPr lang="en-US" sz="1400" b="1" dirty="0"/>
+                      <a:endParaRPr lang="ru-Ru" sz="1400" b="1" dirty="0"/>
                     </a:p>
                   </a:txBody>
                   <a:tcPr>
@@ -10311,7 +10350,7 @@
                         <a:tabLst/>
                         <a:defRPr/>
                       </a:pPr>
-                      <a:endParaRPr lang="en-US" sz="1400" b="1" dirty="0"/>
+                      <a:endParaRPr lang="ru-Ru" sz="1400" b="1" dirty="0"/>
                     </a:p>
                   </a:txBody>
                   <a:tcPr>
@@ -10375,7 +10414,7 @@
                         <a:tabLst/>
                         <a:defRPr/>
                       </a:pPr>
-                      <a:endParaRPr lang="en-US" sz="1400" b="1" dirty="0"/>
+                      <a:endParaRPr lang="ru-Ru" sz="1400" b="1" dirty="0"/>
                     </a:p>
                   </a:txBody>
                   <a:tcPr>
@@ -10439,7 +10478,7 @@
                         <a:tabLst/>
                         <a:defRPr/>
                       </a:pPr>
-                      <a:endParaRPr lang="en-US" sz="1400" b="1" dirty="0"/>
+                      <a:endParaRPr lang="ru-Ru" sz="1400" b="1" dirty="0"/>
                     </a:p>
                   </a:txBody>
                   <a:tcPr>
@@ -10503,7 +10542,7 @@
                         <a:tabLst/>
                         <a:defRPr/>
                       </a:pPr>
-                      <a:endParaRPr lang="en-US" sz="1400" b="1" dirty="0"/>
+                      <a:endParaRPr lang="ru-Ru" sz="1400" b="1" dirty="0"/>
                     </a:p>
                   </a:txBody>
                   <a:tcPr>
@@ -10567,7 +10606,7 @@
                         <a:tabLst/>
                         <a:defRPr/>
                       </a:pPr>
-                      <a:endParaRPr lang="en-US" sz="1400" b="1" dirty="0"/>
+                      <a:endParaRPr lang="ru-Ru" sz="1400" b="1" dirty="0"/>
                     </a:p>
                   </a:txBody>
                   <a:tcPr>
@@ -10631,7 +10670,7 @@
                         <a:tabLst/>
                         <a:defRPr/>
                       </a:pPr>
-                      <a:endParaRPr lang="en-US" sz="1400" b="1" dirty="0"/>
+                      <a:endParaRPr lang="ru-Ru" sz="1400" b="1" dirty="0"/>
                     </a:p>
                   </a:txBody>
                   <a:tcPr>
@@ -10695,7 +10734,7 @@
                         <a:tabLst/>
                         <a:defRPr/>
                       </a:pPr>
-                      <a:endParaRPr lang="en-US" sz="1400" b="1" dirty="0"/>
+                      <a:endParaRPr lang="ru-Ru" sz="1400" b="1" dirty="0"/>
                     </a:p>
                   </a:txBody>
                   <a:tcPr>
@@ -10766,7 +10805,7 @@
                         <a:tabLst/>
                         <a:defRPr/>
                       </a:pPr>
-                      <a:endParaRPr lang="en-US" sz="1400" b="1" dirty="0"/>
+                      <a:endParaRPr lang="ru-Ru" sz="1400" b="1" dirty="0"/>
                     </a:p>
                     <a:p>
                       <a:pPr marL="0" marR="0" lvl="0" indent="0" algn="l" defTabSz="914400" rtl="0" eaLnBrk="1" fontAlgn="auto" latinLnBrk="0" hangingPunct="1">
@@ -10787,16 +10826,16 @@
                         <a:defRPr/>
                       </a:pPr>
                       <a:r>
-                        <a:rPr lang="en-US" sz="1400" b="1" dirty="0"/>
-                        <a:t>Consortium Membership and blockchain structure</a:t>
+                        <a:rPr lang="ru-Ru" sz="1400" b="1" i="0" u="none" baseline="0"/>
+                        <a:t>Членство в консорциуме и структура блокчейна</a:t>
                       </a:r>
                     </a:p>
                     <a:p>
-                      <a:pPr marL="0" indent="0">
+                      <a:pPr marL="0" indent="0" algn="l" rtl="0">
                         <a:buFont typeface="Arial" panose="020B0604020202020204" pitchFamily="34" charset="0"/>
                         <a:buNone/>
                       </a:pPr>
-                      <a:endParaRPr lang="en-US" sz="1400" dirty="0"/>
+                      <a:endParaRPr lang="ru-Ru" sz="1400" dirty="0"/>
                     </a:p>
                   </a:txBody>
                   <a:tcPr>
@@ -10849,11 +10888,11 @@
                     <a:bodyPr/>
                     <a:lstStyle/>
                     <a:p>
-                      <a:pPr marL="285750" indent="-285750">
+                      <a:pPr marL="285750" indent="-285750" algn="l" rtl="0">
                         <a:buFont typeface="Arial" panose="020B0604020202020204" pitchFamily="34" charset="0"/>
                         <a:buChar char="•"/>
                       </a:pPr>
-                      <a:endParaRPr lang="en-US" sz="1400" dirty="0"/>
+                      <a:endParaRPr lang="ru-Ru" sz="1400" dirty="0"/>
                     </a:p>
                   </a:txBody>
                   <a:tcPr>
@@ -10906,7 +10945,7 @@
                     <a:bodyPr/>
                     <a:lstStyle/>
                     <a:p>
-                      <a:endParaRPr lang="en-US"/>
+                      <a:endParaRPr lang="ru-Ru"/>
                     </a:p>
                   </a:txBody>
                   <a:tcPr/>
@@ -10916,7 +10955,7 @@
                     <a:bodyPr/>
                     <a:lstStyle/>
                     <a:p>
-                      <a:endParaRPr lang="en-US"/>
+                      <a:endParaRPr lang="ru-Ru"/>
                     </a:p>
                   </a:txBody>
                   <a:tcPr/>
@@ -10926,12 +10965,12 @@
                     <a:bodyPr/>
                     <a:lstStyle/>
                     <a:p>
-                      <a:pPr marL="0" indent="0" algn="ctr">
+                      <a:pPr marL="0" indent="0" algn="ctr" rtl="0">
                         <a:buFont typeface="Arial" panose="020B0604020202020204" pitchFamily="34" charset="0"/>
                         <a:buNone/>
                         <a:tabLst/>
                       </a:pPr>
-                      <a:endParaRPr lang="en-US" dirty="0"/>
+                      <a:endParaRPr lang="ru-Ru" dirty="0"/>
                     </a:p>
                   </a:txBody>
                   <a:tcPr>
@@ -10984,12 +11023,12 @@
                     <a:bodyPr/>
                     <a:lstStyle/>
                     <a:p>
-                      <a:pPr marL="0" indent="0" algn="ctr">
+                      <a:pPr marL="0" indent="0" algn="ctr" rtl="0">
                         <a:buFont typeface="Arial" panose="020B0604020202020204" pitchFamily="34" charset="0"/>
                         <a:buNone/>
                         <a:tabLst/>
                       </a:pPr>
-                      <a:endParaRPr lang="en-US" dirty="0"/>
+                      <a:endParaRPr lang="ru-Ru" dirty="0"/>
                     </a:p>
                   </a:txBody>
                   <a:tcPr>
@@ -11054,7 +11093,7 @@
                         <a:tabLst/>
                         <a:defRPr/>
                       </a:pPr>
-                      <a:endParaRPr lang="en-US" sz="1000" dirty="0"/>
+                      <a:endParaRPr lang="ru-Ru" sz="1000" dirty="0"/>
                     </a:p>
                   </a:txBody>
                   <a:tcPr>
@@ -11107,12 +11146,12 @@
                     <a:bodyPr/>
                     <a:lstStyle/>
                     <a:p>
-                      <a:pPr marL="0" indent="0" algn="ctr">
+                      <a:pPr marL="0" indent="0" algn="ctr" rtl="0">
                         <a:buFont typeface="Arial" panose="020B0604020202020204" pitchFamily="34" charset="0"/>
                         <a:buNone/>
                         <a:tabLst/>
                       </a:pPr>
-                      <a:endParaRPr lang="en-US" dirty="0"/>
+                      <a:endParaRPr lang="ru-Ru" dirty="0"/>
                     </a:p>
                   </a:txBody>
                   <a:tcPr>
@@ -11189,7 +11228,7 @@
                         <a:tabLst/>
                         <a:defRPr/>
                       </a:pPr>
-                      <a:endParaRPr lang="en-US" sz="1400" b="1" dirty="0"/>
+                      <a:endParaRPr lang="ru-Ru" sz="1400" b="1" dirty="0"/>
                     </a:p>
                   </a:txBody>
                   <a:tcPr>
@@ -11253,7 +11292,7 @@
                         <a:tabLst/>
                         <a:defRPr/>
                       </a:pPr>
-                      <a:endParaRPr lang="en-US" sz="1400" b="1" dirty="0"/>
+                      <a:endParaRPr lang="ru-Ru" sz="1400" b="1" dirty="0"/>
                     </a:p>
                   </a:txBody>
                   <a:tcPr>
@@ -11317,7 +11356,7 @@
                         <a:tabLst/>
                         <a:defRPr/>
                       </a:pPr>
-                      <a:endParaRPr lang="en-US" sz="1400" b="1" dirty="0"/>
+                      <a:endParaRPr lang="ru-Ru" sz="1400" b="1" dirty="0"/>
                     </a:p>
                   </a:txBody>
                   <a:tcPr>
@@ -11381,7 +11420,7 @@
                         <a:tabLst/>
                         <a:defRPr/>
                       </a:pPr>
-                      <a:endParaRPr lang="en-US" sz="1400" b="1" dirty="0"/>
+                      <a:endParaRPr lang="ru-Ru" sz="1400" b="1" dirty="0"/>
                     </a:p>
                   </a:txBody>
                   <a:tcPr>
@@ -11445,7 +11484,7 @@
                         <a:tabLst/>
                         <a:defRPr/>
                       </a:pPr>
-                      <a:endParaRPr lang="en-US" sz="1400" b="1" dirty="0"/>
+                      <a:endParaRPr lang="ru-Ru" sz="1400" b="1" dirty="0"/>
                     </a:p>
                   </a:txBody>
                   <a:tcPr>
@@ -11509,7 +11548,7 @@
                         <a:tabLst/>
                         <a:defRPr/>
                       </a:pPr>
-                      <a:endParaRPr lang="en-US" sz="1400" b="1" dirty="0"/>
+                      <a:endParaRPr lang="ru-Ru" sz="1400" b="1" dirty="0"/>
                     </a:p>
                   </a:txBody>
                   <a:tcPr>
@@ -11573,7 +11612,7 @@
                         <a:tabLst/>
                         <a:defRPr/>
                       </a:pPr>
-                      <a:endParaRPr lang="en-US" sz="1400" b="1" dirty="0"/>
+                      <a:endParaRPr lang="ru-Ru" sz="1400" b="1" dirty="0"/>
                     </a:p>
                   </a:txBody>
                   <a:tcPr>
@@ -11637,7 +11676,7 @@
                         <a:tabLst/>
                         <a:defRPr/>
                       </a:pPr>
-                      <a:endParaRPr lang="en-US" sz="1400" b="1" dirty="0"/>
+                      <a:endParaRPr lang="ru-Ru" sz="1400" b="1" dirty="0"/>
                     </a:p>
                   </a:txBody>
                   <a:tcPr>
@@ -11708,7 +11747,7 @@
                         <a:tabLst/>
                         <a:defRPr/>
                       </a:pPr>
-                      <a:endParaRPr lang="en-US" sz="1400" dirty="0"/>
+                      <a:endParaRPr lang="ru-Ru" sz="1400" dirty="0"/>
                     </a:p>
                   </a:txBody>
                   <a:tcPr>
@@ -11778,7 +11817,7 @@
                         <a:tabLst/>
                         <a:defRPr/>
                       </a:pPr>
-                      <a:endParaRPr lang="en-US" sz="1800" b="1" dirty="0"/>
+                      <a:endParaRPr lang="ru-Ru" sz="1800" b="1" dirty="0"/>
                     </a:p>
                   </a:txBody>
                   <a:tcPr>
@@ -11848,7 +11887,7 @@
                         <a:tabLst/>
                         <a:defRPr/>
                       </a:pPr>
-                      <a:endParaRPr lang="en-US" sz="1800" b="1" dirty="0"/>
+                      <a:endParaRPr lang="ru-Ru" sz="1800" b="1" dirty="0"/>
                     </a:p>
                   </a:txBody>
                   <a:tcPr>
@@ -11913,7 +11952,7 @@
                         <a:tabLst/>
                         <a:defRPr/>
                       </a:pPr>
-                      <a:endParaRPr lang="en-US" sz="1800" b="1" dirty="0"/>
+                      <a:endParaRPr lang="ru-Ru" sz="1800" b="1" dirty="0"/>
                     </a:p>
                   </a:txBody>
                   <a:tcPr>
@@ -11961,9 +12000,10 @@
                     <a:bodyPr/>
                     <a:lstStyle/>
                     <a:p>
+                      <a:pPr algn="l" rtl="0"/>
                       <a:r>
-                        <a:rPr lang="en-US" sz="1400" b="1" dirty="0"/>
-                        <a:t>Transaction networks, business logic</a:t>
+                        <a:rPr lang="ru-Ru" sz="1400" b="1" i="0" u="none" baseline="0"/>
+                        <a:t>Сети транзакций, бизнес-логика</a:t>
                       </a:r>
                     </a:p>
                   </a:txBody>
@@ -12017,7 +12057,7 @@
                     <a:bodyPr/>
                     <a:lstStyle/>
                     <a:p>
-                      <a:endParaRPr lang="en-US"/>
+                      <a:endParaRPr lang="ru-Ru"/>
                     </a:p>
                   </a:txBody>
                   <a:tcPr/>
@@ -12027,7 +12067,7 @@
                     <a:bodyPr/>
                     <a:lstStyle/>
                     <a:p>
-                      <a:endParaRPr lang="en-US"/>
+                      <a:endParaRPr lang="ru-Ru"/>
                     </a:p>
                   </a:txBody>
                   <a:tcPr/>
@@ -12054,7 +12094,7 @@
                         <a:tabLst/>
                         <a:defRPr/>
                       </a:pPr>
-                      <a:endParaRPr lang="en-US" sz="1800" b="1" dirty="0"/>
+                      <a:endParaRPr lang="ru-Ru" sz="1800" b="1" dirty="0"/>
                     </a:p>
                   </a:txBody>
                   <a:tcPr>
@@ -12114,8 +12154,8 @@
                     <a:bodyPr/>
                     <a:lstStyle/>
                     <a:p>
-                      <a:pPr algn="ctr"/>
-                      <a:endParaRPr lang="en-US" sz="1400" b="1" dirty="0"/>
+                      <a:pPr algn="ctr" rtl="0"/>
+                      <a:endParaRPr lang="ru-Ru" sz="1400" b="1" dirty="0"/>
                     </a:p>
                   </a:txBody>
                   <a:tcPr>
@@ -12162,8 +12202,8 @@
                     <a:bodyPr/>
                     <a:lstStyle/>
                     <a:p>
-                      <a:pPr algn="ctr"/>
-                      <a:endParaRPr lang="en-US" sz="1400" b="1" dirty="0"/>
+                      <a:pPr algn="ctr" rtl="0"/>
+                      <a:endParaRPr lang="ru-Ru" sz="1400" b="1" dirty="0"/>
                     </a:p>
                   </a:txBody>
                   <a:tcPr>
@@ -12210,8 +12250,8 @@
                     <a:bodyPr/>
                     <a:lstStyle/>
                     <a:p>
-                      <a:pPr algn="ctr"/>
-                      <a:endParaRPr lang="en-US" sz="1400" b="1" dirty="0"/>
+                      <a:pPr algn="ctr" rtl="0"/>
+                      <a:endParaRPr lang="ru-Ru" sz="1400" b="1" dirty="0"/>
                     </a:p>
                   </a:txBody>
                   <a:tcPr>
@@ -12258,8 +12298,8 @@
                     <a:bodyPr/>
                     <a:lstStyle/>
                     <a:p>
-                      <a:pPr algn="ctr"/>
-                      <a:endParaRPr lang="en-US" sz="1400" b="1" dirty="0"/>
+                      <a:pPr algn="ctr" rtl="0"/>
+                      <a:endParaRPr lang="ru-Ru" sz="1400" b="1" dirty="0"/>
                     </a:p>
                   </a:txBody>
                   <a:tcPr>
@@ -12306,8 +12346,8 @@
                     <a:bodyPr/>
                     <a:lstStyle/>
                     <a:p>
-                      <a:pPr algn="ctr"/>
-                      <a:endParaRPr lang="en-US" sz="1400" b="1" dirty="0"/>
+                      <a:pPr algn="ctr" rtl="0"/>
+                      <a:endParaRPr lang="ru-Ru" sz="1400" b="1" dirty="0"/>
                     </a:p>
                   </a:txBody>
                   <a:tcPr>
@@ -12354,7 +12394,7 @@
                     <a:bodyPr/>
                     <a:lstStyle/>
                     <a:p>
-                      <a:endParaRPr lang="en-US"/>
+                      <a:endParaRPr lang="ru-Ru"/>
                     </a:p>
                   </a:txBody>
                   <a:tcPr/>
@@ -12364,8 +12404,8 @@
                     <a:bodyPr/>
                     <a:lstStyle/>
                     <a:p>
-                      <a:pPr algn="ctr"/>
-                      <a:endParaRPr lang="en-US" sz="1400" b="1" dirty="0"/>
+                      <a:pPr algn="ctr" rtl="0"/>
+                      <a:endParaRPr lang="ru-Ru" sz="1400" b="1" dirty="0"/>
                     </a:p>
                   </a:txBody>
                   <a:tcPr>
@@ -12412,8 +12452,8 @@
                     <a:bodyPr/>
                     <a:lstStyle/>
                     <a:p>
-                      <a:pPr algn="ctr"/>
-                      <a:endParaRPr lang="en-US" sz="1400" b="1" dirty="0"/>
+                      <a:pPr algn="ctr" rtl="0"/>
+                      <a:endParaRPr lang="ru-Ru" sz="1400" b="1" dirty="0"/>
                     </a:p>
                   </a:txBody>
                   <a:tcPr>
@@ -12467,12 +12507,12 @@
                     <a:bodyPr/>
                     <a:lstStyle/>
                     <a:p>
-                      <a:pPr marL="174625" indent="-174625" algn="l">
+                      <a:pPr marL="174625" indent="-174625" algn="l" rtl="0">
                         <a:buFont typeface="Arial" panose="020B0604020202020204" pitchFamily="34" charset="0"/>
                         <a:buChar char="•"/>
                         <a:tabLst/>
                       </a:pPr>
-                      <a:endParaRPr lang="en-US" sz="1800" b="1" dirty="0"/>
+                      <a:endParaRPr lang="ru-Ru" sz="1800" b="1" dirty="0"/>
                     </a:p>
                   </a:txBody>
                   <a:tcPr>
@@ -12525,12 +12565,12 @@
                     <a:bodyPr/>
                     <a:lstStyle/>
                     <a:p>
-                      <a:pPr marL="0" indent="0" algn="l">
+                      <a:pPr marL="0" indent="0" algn="l" rtl="0">
                         <a:buFont typeface="Arial" panose="020B0604020202020204" pitchFamily="34" charset="0"/>
                         <a:buNone/>
                         <a:tabLst/>
                       </a:pPr>
-                      <a:endParaRPr lang="en-US" sz="1800" b="1" dirty="0"/>
+                      <a:endParaRPr lang="ru-Ru" sz="1800" b="1" dirty="0"/>
                     </a:p>
                   </a:txBody>
                   <a:tcPr>
@@ -12583,7 +12623,7 @@
                     <a:bodyPr/>
                     <a:lstStyle/>
                     <a:p>
-                      <a:endParaRPr lang="en-US"/>
+                      <a:endParaRPr lang="ru-Ru"/>
                     </a:p>
                   </a:txBody>
                   <a:tcPr/>
@@ -12593,7 +12633,7 @@
                     <a:bodyPr/>
                     <a:lstStyle/>
                     <a:p>
-                      <a:endParaRPr lang="en-US"/>
+                      <a:endParaRPr lang="ru-Ru"/>
                     </a:p>
                   </a:txBody>
                   <a:tcPr/>
@@ -12620,7 +12660,7 @@
                         <a:tabLst/>
                         <a:defRPr/>
                       </a:pPr>
-                      <a:endParaRPr lang="en-US" sz="1800" b="1" dirty="0"/>
+                      <a:endParaRPr lang="ru-Ru" sz="1800" b="1" dirty="0"/>
                     </a:p>
                   </a:txBody>
                   <a:tcPr>
@@ -12673,7 +12713,7 @@
                     <a:bodyPr/>
                     <a:lstStyle/>
                     <a:p>
-                      <a:endParaRPr lang="en-US"/>
+                      <a:endParaRPr lang="ru-Ru"/>
                     </a:p>
                   </a:txBody>
                   <a:tcPr/>
@@ -12683,7 +12723,7 @@
                     <a:bodyPr/>
                     <a:lstStyle/>
                     <a:p>
-                      <a:endParaRPr lang="en-US"/>
+                      <a:endParaRPr lang="ru-Ru"/>
                     </a:p>
                   </a:txBody>
                   <a:tcPr/>
@@ -12710,7 +12750,7 @@
                         <a:tabLst/>
                         <a:defRPr/>
                       </a:pPr>
-                      <a:endParaRPr lang="en-US" sz="1800" b="1" dirty="0"/>
+                      <a:endParaRPr lang="ru-Ru" sz="1800" b="1" dirty="0"/>
                     </a:p>
                   </a:txBody>
                   <a:tcPr>
@@ -12794,12 +12834,13 @@
           <a:bodyPr/>
           <a:lstStyle/>
           <a:p>
+            <a:pPr algn="r" rtl="0"/>
             <a:fld id="{08BF69C1-739F-1B47-B5E3-FA651BCAB105}" type="slidenum">
-              <a:rPr lang="en-US" smtClean="0"/>
+              <a:rPr/>
               <a:pPr/>
               <a:t>3</a:t>
             </a:fld>
-            <a:endParaRPr lang="en-US"/>
+            <a:endParaRPr lang="ru-Ru"/>
           </a:p>
         </p:txBody>
       </p:sp>
@@ -12819,8 +12860,8 @@
         </p:nvSpPr>
         <p:spPr>
           <a:xfrm>
-            <a:off x="2247607" y="72070"/>
-            <a:ext cx="7138422" cy="571500"/>
+            <a:off x="1371600" y="72070"/>
+            <a:ext cx="8014429" cy="571500"/>
           </a:xfrm>
           <a:prstGeom prst="rect">
             <a:avLst/>
@@ -12993,13 +13034,26 @@
             </a:lvl9pPr>
           </a:lstStyle>
           <a:p>
-            <a:pPr marL="0" indent="0" algn="ctr">
+            <a:pPr marL="0" indent="0" algn="ctr" rtl="0">
               <a:buNone/>
             </a:pPr>
             <a:r>
-              <a:rPr lang="en-US" dirty="0"/>
-              <a:t>Hyperledger Fabric Policy Hierarchy</a:t>
+              <a:rPr lang="ru-Ru" b="0" i="0" u="none" baseline="0" dirty="0"/>
+              <a:t>Иерархия установленных правил </a:t>
             </a:r>
+            <a:r>
+              <a:rPr lang="ru-Ru" b="0" i="0" u="none" baseline="0" dirty="0" err="1"/>
+              <a:t>Hyperledger</a:t>
+            </a:r>
+            <a:r>
+              <a:rPr lang="ru-Ru" b="0" i="0" u="none" baseline="0" dirty="0"/>
+              <a:t> </a:t>
+            </a:r>
+            <a:r>
+              <a:rPr lang="ru-Ru" b="0" i="0" u="none" baseline="0" dirty="0" err="1"/>
+              <a:t>Fabric</a:t>
+            </a:r>
+            <a:endParaRPr lang="ru-Ru" b="0" i="0" u="none" baseline="0" dirty="0"/>
           </a:p>
         </p:txBody>
       </p:sp>
@@ -13031,13 +13085,14 @@
           </a:bodyPr>
           <a:lstStyle/>
           <a:p>
+            <a:pPr algn="l" rtl="0"/>
             <a:r>
-              <a:rPr lang="en-US" b="1" dirty="0"/>
-              <a:t>ACLs and smart contracts</a:t>
+              <a:rPr lang="ru-Ru" b="1" i="0" u="none" baseline="0"/>
+              <a:t>ACL и смарт-контракты</a:t>
             </a:r>
           </a:p>
           <a:p>
-            <a:endParaRPr lang="en-US" dirty="0"/>
+            <a:endParaRPr lang="ru-Ru" dirty="0"/>
           </a:p>
         </p:txBody>
       </p:sp>
@@ -13069,13 +13124,14 @@
           </a:bodyPr>
           <a:lstStyle/>
           <a:p>
+            <a:pPr algn="l" rtl="0"/>
             <a:r>
-              <a:rPr lang="en-US" b="1" dirty="0"/>
-              <a:t>Application Channel</a:t>
+              <a:rPr lang="ru-Ru" b="1" i="0" u="none" baseline="0" dirty="0"/>
+              <a:t>Канал приложения</a:t>
             </a:r>
           </a:p>
           <a:p>
-            <a:endParaRPr lang="en-US" dirty="0"/>
+            <a:endParaRPr lang="ru-Ru" dirty="0"/>
           </a:p>
         </p:txBody>
       </p:sp>
@@ -13094,7 +13150,7 @@
         <p:spPr>
           <a:xfrm>
             <a:off x="2924998" y="789643"/>
-            <a:ext cx="1684301" cy="369332"/>
+            <a:ext cx="2339441" cy="369332"/>
           </a:xfrm>
           <a:prstGeom prst="rect">
             <a:avLst/>
@@ -13107,9 +13163,10 @@
           </a:bodyPr>
           <a:lstStyle/>
           <a:p>
+            <a:pPr algn="l" rtl="0"/>
             <a:r>
-              <a:rPr lang="en-US" b="1" dirty="0"/>
-              <a:t>System Channel</a:t>
+              <a:rPr lang="ru-Ru" b="1" i="0" u="none" baseline="0" dirty="0"/>
+              <a:t>Системный канал</a:t>
             </a:r>
           </a:p>
         </p:txBody>
@@ -13159,8 +13216,8 @@
           <a:bodyPr rtlCol="0" anchor="ctr"/>
           <a:lstStyle/>
           <a:p>
-            <a:pPr algn="ctr"/>
-            <a:endParaRPr lang="en-US"/>
+            <a:pPr algn="ctr" rtl="0"/>
+            <a:endParaRPr lang="ru-Ru"/>
           </a:p>
         </p:txBody>
       </p:sp>
@@ -13397,7 +13454,7 @@
         <p:spPr>
           <a:xfrm>
             <a:off x="1145008" y="795407"/>
-            <a:ext cx="1545936" cy="923330"/>
+            <a:ext cx="1737340" cy="1200329"/>
           </a:xfrm>
           <a:prstGeom prst="rect">
             <a:avLst/>
@@ -13410,29 +13467,14 @@
           </a:bodyPr>
           <a:lstStyle/>
           <a:p>
+            <a:pPr algn="l" rtl="0"/>
             <a:r>
-              <a:rPr lang="en-US" b="1" dirty="0">
+              <a:rPr lang="ru-Ru" b="1" i="0" u="none" baseline="0" dirty="0">
                 <a:solidFill>
                   <a:srgbClr val="0164FF"/>
                 </a:solidFill>
               </a:rPr>
-              <a:t>What </a:t>
-            </a:r>
-            <a:r>
-              <a:rPr lang="en-US" b="1" dirty="0" err="1">
-                <a:solidFill>
-                  <a:srgbClr val="0164FF"/>
-                </a:solidFill>
-              </a:rPr>
-              <a:t>Orderer</a:t>
-            </a:r>
-            <a:r>
-              <a:rPr lang="en-US" b="1" dirty="0">
-                <a:solidFill>
-                  <a:srgbClr val="0164FF"/>
-                </a:solidFill>
-              </a:rPr>
-              <a:t> organizations govern</a:t>
+              <a:t>Чем управляют организации службы упорядочения</a:t>
             </a:r>
           </a:p>
         </p:txBody>
@@ -13465,23 +13507,25 @@
           </a:bodyPr>
           <a:lstStyle/>
           <a:p>
+            <a:pPr algn="l" rtl="0"/>
             <a:r>
-              <a:rPr lang="en-US" b="1" dirty="0">
+              <a:rPr lang="ru-Ru" b="1" i="0" u="none" baseline="0" dirty="0">
                 <a:solidFill>
                   <a:srgbClr val="0164FF"/>
                 </a:solidFill>
               </a:rPr>
-              <a:t>What</a:t>
+              <a:t>Чем</a:t>
             </a:r>
           </a:p>
           <a:p>
+            <a:pPr algn="l" rtl="0"/>
             <a:r>
-              <a:rPr lang="en-US" b="1" dirty="0">
+              <a:rPr lang="ru-Ru" b="1" i="0" u="none" baseline="0" dirty="0">
                 <a:solidFill>
                   <a:srgbClr val="0164FF"/>
                 </a:solidFill>
               </a:rPr>
-              <a:t>Consortium organizations govern</a:t>
+              <a:t>управляют организации консорциума</a:t>
             </a:r>
           </a:p>
         </p:txBody>
@@ -13514,9 +13558,10 @@
           </a:bodyPr>
           <a:lstStyle/>
           <a:p>
+            <a:pPr algn="l" rtl="0"/>
             <a:r>
-              <a:rPr lang="en-US" sz="1400" b="1" dirty="0"/>
-              <a:t>Transactions, data, and events</a:t>
+              <a:rPr lang="ru-Ru" sz="1400" b="1" i="0" u="none" baseline="0"/>
+              <a:t>Транзакции, данные и события</a:t>
             </a:r>
           </a:p>
         </p:txBody>
@@ -13573,7 +13618,7 @@
         </p:nvGraphicFramePr>
         <p:xfrm>
           <a:off x="3000871" y="789643"/>
-          <a:ext cx="5820502" cy="4006778"/>
+          <a:ext cx="5820502" cy="4153135"/>
         </p:xfrm>
         <a:graphic>
           <a:graphicData uri="http://schemas.openxmlformats.org/drawingml/2006/table">
@@ -13662,7 +13707,7 @@
                         <a:tabLst/>
                         <a:defRPr/>
                       </a:pPr>
-                      <a:endParaRPr lang="en-US" sz="1400" b="1" dirty="0"/>
+                      <a:endParaRPr lang="ru-Ru" sz="1400" b="1" dirty="0"/>
                     </a:p>
                   </a:txBody>
                   <a:tcPr>
@@ -13726,7 +13771,7 @@
                         <a:tabLst/>
                         <a:defRPr/>
                       </a:pPr>
-                      <a:endParaRPr lang="en-US" sz="1400" b="1" dirty="0"/>
+                      <a:endParaRPr lang="ru-Ru" sz="1400" b="1" dirty="0"/>
                     </a:p>
                   </a:txBody>
                   <a:tcPr>
@@ -13790,7 +13835,7 @@
                         <a:tabLst/>
                         <a:defRPr/>
                       </a:pPr>
-                      <a:endParaRPr lang="en-US" sz="1400" b="1" dirty="0"/>
+                      <a:endParaRPr lang="ru-Ru" sz="1400" b="1" dirty="0"/>
                     </a:p>
                   </a:txBody>
                   <a:tcPr>
@@ -13854,7 +13899,7 @@
                         <a:tabLst/>
                         <a:defRPr/>
                       </a:pPr>
-                      <a:endParaRPr lang="en-US" sz="1400" b="1" dirty="0"/>
+                      <a:endParaRPr lang="ru-Ru" sz="1400" b="1" dirty="0"/>
                     </a:p>
                   </a:txBody>
                   <a:tcPr>
@@ -13918,7 +13963,7 @@
                         <a:tabLst/>
                         <a:defRPr/>
                       </a:pPr>
-                      <a:endParaRPr lang="en-US" sz="1400" b="1" dirty="0"/>
+                      <a:endParaRPr lang="ru-Ru" sz="1400" b="1" dirty="0"/>
                     </a:p>
                   </a:txBody>
                   <a:tcPr>
@@ -13982,7 +14027,7 @@
                         <a:tabLst/>
                         <a:defRPr/>
                       </a:pPr>
-                      <a:endParaRPr lang="en-US" sz="1400" b="1" dirty="0"/>
+                      <a:endParaRPr lang="ru-Ru" sz="1400" b="1" dirty="0"/>
                     </a:p>
                   </a:txBody>
                   <a:tcPr>
@@ -14046,7 +14091,7 @@
                         <a:tabLst/>
                         <a:defRPr/>
                       </a:pPr>
-                      <a:endParaRPr lang="en-US" sz="1400" b="1" dirty="0"/>
+                      <a:endParaRPr lang="ru-Ru" sz="1400" b="1" dirty="0"/>
                     </a:p>
                   </a:txBody>
                   <a:tcPr>
@@ -14110,7 +14155,7 @@
                         <a:tabLst/>
                         <a:defRPr/>
                       </a:pPr>
-                      <a:endParaRPr lang="en-US" sz="1400" b="1" dirty="0"/>
+                      <a:endParaRPr lang="ru-Ru" sz="1400" b="1" dirty="0"/>
                     </a:p>
                   </a:txBody>
                   <a:tcPr>
@@ -14164,44 +14209,44 @@
                     <a:bodyPr/>
                     <a:lstStyle/>
                     <a:p>
-                      <a:pPr marL="285750" indent="-285750">
+                      <a:pPr marL="285750" indent="-285750" algn="l" rtl="0">
                         <a:buFont typeface="Arial" panose="020B0604020202020204" pitchFamily="34" charset="0"/>
                         <a:buChar char="•"/>
                       </a:pPr>
                       <a:r>
-                        <a:rPr lang="en-US" sz="1400" dirty="0"/>
-                        <a:t>Blockchain Structure</a:t>
+                        <a:rPr lang="ru-Ru" sz="1400" b="0" i="0" u="none" baseline="0"/>
+                        <a:t>Структура блокчейна</a:t>
                       </a:r>
                     </a:p>
                     <a:p>
-                      <a:pPr marL="285750" indent="-285750">
+                      <a:pPr marL="285750" indent="-285750" algn="l" rtl="0">
                         <a:buFont typeface="Arial" panose="020B0604020202020204" pitchFamily="34" charset="0"/>
                         <a:buChar char="•"/>
                       </a:pPr>
                       <a:r>
-                        <a:rPr lang="en-US" sz="1400" dirty="0"/>
-                        <a:t>Consensus</a:t>
+                        <a:rPr lang="ru-Ru" sz="1400" b="0" i="0" u="none" baseline="0"/>
+                        <a:t>Консенсус</a:t>
                       </a:r>
                     </a:p>
                     <a:p>
-                      <a:pPr marL="285750" indent="-285750">
+                      <a:pPr marL="285750" indent="-285750" algn="l" rtl="0">
                         <a:buFont typeface="Arial" panose="020B0604020202020204" pitchFamily="34" charset="0"/>
                         <a:buChar char="•"/>
                       </a:pPr>
                       <a:r>
-                        <a:rPr lang="en-US" sz="1400" dirty="0"/>
-                        <a:t>Consortium membership</a:t>
+                        <a:rPr lang="ru-Ru" sz="1400" b="0" i="0" u="none" baseline="0"/>
+                        <a:t>Членство в консорциуме</a:t>
                       </a:r>
                     </a:p>
                     <a:p>
-                      <a:pPr marL="285750" lvl="0" indent="-285750" defTabSz="457200">
+                      <a:pPr marL="285750" lvl="0" indent="-285750" algn="l" defTabSz="457200" rtl="0">
                         <a:buFont typeface="Arial" panose="020B0604020202020204" pitchFamily="34" charset="0"/>
                         <a:buChar char="•"/>
                         <a:defRPr/>
                       </a:pPr>
                       <a:r>
-                        <a:rPr lang="en-US" sz="1400" dirty="0"/>
-                        <a:t>Consortium Member Policies policies (Readers, Writers, Admins)</a:t>
+                        <a:rPr lang="ru-Ru" sz="1400" b="0" i="0" u="none" baseline="0"/>
+                        <a:t>Установленные правила членов консорциума («чтение», «запись», «администратор»)</a:t>
                       </a:r>
                     </a:p>
                   </a:txBody>
@@ -14255,11 +14300,11 @@
                     <a:bodyPr/>
                     <a:lstStyle/>
                     <a:p>
-                      <a:pPr marL="285750" indent="-285750">
+                      <a:pPr marL="285750" indent="-285750" algn="l" rtl="0">
                         <a:buFont typeface="Arial" panose="020B0604020202020204" pitchFamily="34" charset="0"/>
                         <a:buChar char="•"/>
                       </a:pPr>
-                      <a:endParaRPr lang="en-US" sz="1400" dirty="0"/>
+                      <a:endParaRPr lang="ru-Ru" sz="1400" dirty="0"/>
                     </a:p>
                   </a:txBody>
                   <a:tcPr>
@@ -14312,7 +14357,7 @@
                     <a:bodyPr/>
                     <a:lstStyle/>
                     <a:p>
-                      <a:endParaRPr lang="en-US"/>
+                      <a:endParaRPr lang="ru-Ru"/>
                     </a:p>
                   </a:txBody>
                   <a:tcPr/>
@@ -14322,7 +14367,7 @@
                     <a:bodyPr/>
                     <a:lstStyle/>
                     <a:p>
-                      <a:endParaRPr lang="en-US"/>
+                      <a:endParaRPr lang="ru-Ru"/>
                     </a:p>
                   </a:txBody>
                   <a:tcPr/>
@@ -14332,12 +14377,12 @@
                     <a:bodyPr/>
                     <a:lstStyle/>
                     <a:p>
-                      <a:pPr marL="0" indent="0" algn="ctr">
+                      <a:pPr marL="0" indent="0" algn="ctr" rtl="0">
                         <a:buFont typeface="Arial" panose="020B0604020202020204" pitchFamily="34" charset="0"/>
                         <a:buNone/>
                         <a:tabLst/>
                       </a:pPr>
-                      <a:endParaRPr lang="en-US" dirty="0"/>
+                      <a:endParaRPr lang="ru-Ru" dirty="0"/>
                     </a:p>
                   </a:txBody>
                   <a:tcPr>
@@ -14390,12 +14435,12 @@
                     <a:bodyPr/>
                     <a:lstStyle/>
                     <a:p>
-                      <a:pPr marL="0" indent="0" algn="ctr">
+                      <a:pPr marL="0" indent="0" algn="ctr" rtl="0">
                         <a:buFont typeface="Arial" panose="020B0604020202020204" pitchFamily="34" charset="0"/>
                         <a:buNone/>
                         <a:tabLst/>
                       </a:pPr>
-                      <a:endParaRPr lang="en-US" dirty="0"/>
+                      <a:endParaRPr lang="ru-Ru" dirty="0"/>
                     </a:p>
                   </a:txBody>
                   <a:tcPr>
@@ -14461,8 +14506,8 @@
                         <a:defRPr/>
                       </a:pPr>
                       <a:r>
-                        <a:rPr lang="en-US" sz="1000" dirty="0"/>
-                        <a:t>Channel modification</a:t>
+                        <a:rPr lang="ru-Ru" sz="1000" b="0" i="0" u="none" baseline="0"/>
+                        <a:t>Изменение канала</a:t>
                       </a:r>
                     </a:p>
                   </a:txBody>
@@ -14516,12 +14561,12 @@
                     <a:bodyPr/>
                     <a:lstStyle/>
                     <a:p>
-                      <a:pPr marL="0" indent="0" algn="ctr">
+                      <a:pPr marL="0" indent="0" algn="ctr" rtl="0">
                         <a:buFont typeface="Arial" panose="020B0604020202020204" pitchFamily="34" charset="0"/>
                         <a:buNone/>
                         <a:tabLst/>
                       </a:pPr>
-                      <a:endParaRPr lang="en-US" dirty="0"/>
+                      <a:endParaRPr lang="ru-Ru" dirty="0"/>
                     </a:p>
                   </a:txBody>
                   <a:tcPr>
@@ -14598,7 +14643,7 @@
                         <a:tabLst/>
                         <a:defRPr/>
                       </a:pPr>
-                      <a:endParaRPr lang="en-US" sz="1400" b="1" dirty="0"/>
+                      <a:endParaRPr lang="ru-Ru" sz="1400" b="1" dirty="0"/>
                     </a:p>
                   </a:txBody>
                   <a:tcPr>
@@ -14662,7 +14707,7 @@
                         <a:tabLst/>
                         <a:defRPr/>
                       </a:pPr>
-                      <a:endParaRPr lang="en-US" sz="1400" b="1" dirty="0"/>
+                      <a:endParaRPr lang="ru-Ru" sz="1400" b="1" dirty="0"/>
                     </a:p>
                   </a:txBody>
                   <a:tcPr>
@@ -14726,7 +14771,7 @@
                         <a:tabLst/>
                         <a:defRPr/>
                       </a:pPr>
-                      <a:endParaRPr lang="en-US" sz="1400" b="1" dirty="0"/>
+                      <a:endParaRPr lang="ru-Ru" sz="1400" b="1" dirty="0"/>
                     </a:p>
                   </a:txBody>
                   <a:tcPr>
@@ -14790,7 +14835,7 @@
                         <a:tabLst/>
                         <a:defRPr/>
                       </a:pPr>
-                      <a:endParaRPr lang="en-US" sz="1400" b="1" dirty="0"/>
+                      <a:endParaRPr lang="ru-Ru" sz="1400" b="1" dirty="0"/>
                     </a:p>
                   </a:txBody>
                   <a:tcPr>
@@ -14854,7 +14899,7 @@
                         <a:tabLst/>
                         <a:defRPr/>
                       </a:pPr>
-                      <a:endParaRPr lang="en-US" sz="1400" b="1" dirty="0"/>
+                      <a:endParaRPr lang="ru-Ru" sz="1400" b="1" dirty="0"/>
                     </a:p>
                   </a:txBody>
                   <a:tcPr>
@@ -14918,7 +14963,7 @@
                         <a:tabLst/>
                         <a:defRPr/>
                       </a:pPr>
-                      <a:endParaRPr lang="en-US" sz="1400" b="1" dirty="0"/>
+                      <a:endParaRPr lang="ru-Ru" sz="1400" b="1" dirty="0"/>
                     </a:p>
                   </a:txBody>
                   <a:tcPr>
@@ -14982,7 +15027,7 @@
                         <a:tabLst/>
                         <a:defRPr/>
                       </a:pPr>
-                      <a:endParaRPr lang="en-US" sz="1400" b="1" dirty="0"/>
+                      <a:endParaRPr lang="ru-Ru" sz="1400" b="1" dirty="0"/>
                     </a:p>
                   </a:txBody>
                   <a:tcPr>
@@ -15046,7 +15091,7 @@
                         <a:tabLst/>
                         <a:defRPr/>
                       </a:pPr>
-                      <a:endParaRPr lang="en-US" sz="1400" b="1" dirty="0"/>
+                      <a:endParaRPr lang="ru-Ru" sz="1400" b="1" dirty="0"/>
                     </a:p>
                   </a:txBody>
                   <a:tcPr>
@@ -15118,8 +15163,8 @@
                         <a:defRPr/>
                       </a:pPr>
                       <a:r>
-                        <a:rPr lang="en-US" sz="1400" dirty="0"/>
-                        <a:t>Consensus</a:t>
+                        <a:rPr lang="ru-Ru" sz="1400" b="0" i="0" u="none" baseline="0"/>
+                        <a:t>Консенсус</a:t>
                       </a:r>
                     </a:p>
                     <a:p>
@@ -15140,7 +15185,7 @@
                         <a:tabLst/>
                         <a:defRPr/>
                       </a:pPr>
-                      <a:endParaRPr lang="en-US" sz="1800" b="1" dirty="0"/>
+                      <a:endParaRPr lang="ru-Ru" sz="1800" b="1" dirty="0"/>
                     </a:p>
                   </a:txBody>
                   <a:tcPr>
@@ -15210,7 +15255,7 @@
                         <a:tabLst/>
                         <a:defRPr/>
                       </a:pPr>
-                      <a:endParaRPr lang="en-US" sz="1800" b="1" dirty="0"/>
+                      <a:endParaRPr lang="ru-Ru" sz="1800" b="1" dirty="0"/>
                     </a:p>
                   </a:txBody>
                   <a:tcPr>
@@ -15280,7 +15325,7 @@
                         <a:tabLst/>
                         <a:defRPr/>
                       </a:pPr>
-                      <a:endParaRPr lang="en-US" sz="1800" b="1" dirty="0"/>
+                      <a:endParaRPr lang="ru-Ru" sz="1800" b="1" dirty="0"/>
                     </a:p>
                   </a:txBody>
                   <a:tcPr>
@@ -15345,7 +15390,7 @@
                         <a:tabLst/>
                         <a:defRPr/>
                       </a:pPr>
-                      <a:endParaRPr lang="en-US" sz="1800" b="1" dirty="0"/>
+                      <a:endParaRPr lang="ru-Ru" sz="1800" b="1" dirty="0"/>
                     </a:p>
                   </a:txBody>
                   <a:tcPr>
@@ -15393,23 +15438,23 @@
                     <a:bodyPr/>
                     <a:lstStyle/>
                     <a:p>
-                      <a:pPr marL="285750" indent="-285750">
+                      <a:pPr marL="285750" indent="-285750" algn="l" rtl="0">
                         <a:buFont typeface="Arial" panose="020B0604020202020204" pitchFamily="34" charset="0"/>
                         <a:buChar char="•"/>
                       </a:pPr>
                       <a:r>
-                        <a:rPr lang="en-US" sz="1400" dirty="0"/>
-                        <a:t>Channel Membership</a:t>
+                        <a:rPr lang="ru-Ru" sz="1400" b="0" i="0" u="none" baseline="0"/>
+                        <a:t>Членство в канале</a:t>
                       </a:r>
                     </a:p>
                     <a:p>
-                      <a:pPr marL="285750" indent="-285750">
+                      <a:pPr marL="285750" indent="-285750" algn="l" rtl="0">
                         <a:buFont typeface="Arial" panose="020B0604020202020204" pitchFamily="34" charset="0"/>
                         <a:buChar char="•"/>
                       </a:pPr>
                       <a:r>
-                        <a:rPr lang="en-US" sz="1400" dirty="0"/>
-                        <a:t>Organization policies (Readers, Writers, Admins)</a:t>
+                        <a:rPr lang="ru-Ru" sz="1400" b="0" i="0" u="none" baseline="0"/>
+                        <a:t>Правила организации («чтение», «запись», «администратор»)</a:t>
                       </a:r>
                     </a:p>
                   </a:txBody>
@@ -15463,7 +15508,7 @@
                     <a:bodyPr/>
                     <a:lstStyle/>
                     <a:p>
-                      <a:endParaRPr lang="en-US"/>
+                      <a:endParaRPr lang="ru-Ru"/>
                     </a:p>
                   </a:txBody>
                   <a:tcPr/>
@@ -15473,7 +15518,7 @@
                     <a:bodyPr/>
                     <a:lstStyle/>
                     <a:p>
-                      <a:endParaRPr lang="en-US"/>
+                      <a:endParaRPr lang="ru-Ru"/>
                     </a:p>
                   </a:txBody>
                   <a:tcPr/>
@@ -15500,7 +15545,7 @@
                         <a:tabLst/>
                         <a:defRPr/>
                       </a:pPr>
-                      <a:endParaRPr lang="en-US" sz="1800" b="1" dirty="0"/>
+                      <a:endParaRPr lang="ru-Ru" sz="1800" b="1" dirty="0"/>
                     </a:p>
                   </a:txBody>
                   <a:tcPr>
@@ -15560,8 +15605,8 @@
                     <a:bodyPr/>
                     <a:lstStyle/>
                     <a:p>
-                      <a:pPr algn="ctr"/>
-                      <a:endParaRPr lang="en-US" sz="1400" b="1" dirty="0"/>
+                      <a:pPr algn="ctr" rtl="0"/>
+                      <a:endParaRPr lang="ru-Ru" sz="1400" b="1" dirty="0"/>
                     </a:p>
                   </a:txBody>
                   <a:tcPr>
@@ -15608,8 +15653,8 @@
                     <a:bodyPr/>
                     <a:lstStyle/>
                     <a:p>
-                      <a:pPr algn="ctr"/>
-                      <a:endParaRPr lang="en-US" sz="1400" b="1" dirty="0"/>
+                      <a:pPr algn="ctr" rtl="0"/>
+                      <a:endParaRPr lang="ru-Ru" sz="1400" b="1" dirty="0"/>
                     </a:p>
                   </a:txBody>
                   <a:tcPr>
@@ -15656,8 +15701,8 @@
                     <a:bodyPr/>
                     <a:lstStyle/>
                     <a:p>
-                      <a:pPr algn="ctr"/>
-                      <a:endParaRPr lang="en-US" sz="1400" b="1" dirty="0"/>
+                      <a:pPr algn="ctr" rtl="0"/>
+                      <a:endParaRPr lang="ru-Ru" sz="1400" b="1" dirty="0"/>
                     </a:p>
                   </a:txBody>
                   <a:tcPr>
@@ -15704,8 +15749,8 @@
                     <a:bodyPr/>
                     <a:lstStyle/>
                     <a:p>
-                      <a:pPr algn="ctr"/>
-                      <a:endParaRPr lang="en-US" sz="1400" b="1" dirty="0"/>
+                      <a:pPr algn="ctr" rtl="0"/>
+                      <a:endParaRPr lang="ru-Ru" sz="1400" b="1" dirty="0"/>
                     </a:p>
                   </a:txBody>
                   <a:tcPr>
@@ -15752,8 +15797,8 @@
                     <a:bodyPr/>
                     <a:lstStyle/>
                     <a:p>
-                      <a:pPr algn="ctr"/>
-                      <a:endParaRPr lang="en-US" sz="1400" b="1" dirty="0"/>
+                      <a:pPr algn="ctr" rtl="0"/>
+                      <a:endParaRPr lang="ru-Ru" sz="1400" b="1" dirty="0"/>
                     </a:p>
                   </a:txBody>
                   <a:tcPr>
@@ -15800,7 +15845,7 @@
                     <a:bodyPr/>
                     <a:lstStyle/>
                     <a:p>
-                      <a:endParaRPr lang="en-US"/>
+                      <a:endParaRPr lang="ru-Ru"/>
                     </a:p>
                   </a:txBody>
                   <a:tcPr/>
@@ -15810,8 +15855,8 @@
                     <a:bodyPr/>
                     <a:lstStyle/>
                     <a:p>
-                      <a:pPr algn="ctr"/>
-                      <a:endParaRPr lang="en-US" sz="1400" b="1" dirty="0"/>
+                      <a:pPr algn="ctr" rtl="0"/>
+                      <a:endParaRPr lang="ru-Ru" sz="1400" b="1" dirty="0"/>
                     </a:p>
                   </a:txBody>
                   <a:tcPr>
@@ -15858,8 +15903,8 @@
                     <a:bodyPr/>
                     <a:lstStyle/>
                     <a:p>
-                      <a:pPr algn="ctr"/>
-                      <a:endParaRPr lang="en-US" sz="1400" b="1" dirty="0"/>
+                      <a:pPr algn="ctr" rtl="0"/>
+                      <a:endParaRPr lang="ru-Ru" sz="1400" b="1" dirty="0"/>
                     </a:p>
                   </a:txBody>
                   <a:tcPr>
@@ -15913,38 +15958,38 @@
                     <a:bodyPr/>
                     <a:lstStyle/>
                     <a:p>
-                      <a:pPr marL="174625" indent="-174625" algn="l">
+                      <a:pPr marL="174625" indent="-174625" algn="l" rtl="0">
                         <a:buFont typeface="Arial" panose="020B0604020202020204" pitchFamily="34" charset="0"/>
                         <a:buChar char="•"/>
                         <a:tabLst/>
                       </a:pPr>
                       <a:r>
-                        <a:rPr lang="en-US" sz="1400" dirty="0"/>
-                        <a:t>Smart Contracts</a:t>
+                        <a:rPr lang="ru-Ru" sz="1400" b="0" i="0" u="none" baseline="0" dirty="0"/>
+                        <a:t>Смарт-контракты</a:t>
                       </a:r>
                     </a:p>
                     <a:p>
-                      <a:pPr marL="174625" indent="-174625" algn="l">
+                      <a:pPr marL="174625" indent="-174625" algn="l" rtl="0">
                         <a:buFont typeface="Arial" panose="020B0604020202020204" pitchFamily="34" charset="0"/>
                         <a:buChar char="•"/>
                         <a:tabLst/>
                       </a:pPr>
                       <a:r>
-                        <a:rPr lang="en-US" sz="1400" dirty="0"/>
-                        <a:t>Ledger data</a:t>
+                        <a:rPr lang="ru-Ru" sz="1400" b="0" i="0" u="none" baseline="0" dirty="0"/>
+                        <a:t>Данные реестра</a:t>
                       </a:r>
                     </a:p>
                     <a:p>
-                      <a:pPr marL="174625" indent="-174625" algn="l">
+                      <a:pPr marL="174625" indent="-174625" algn="l" rtl="0">
                         <a:buFont typeface="Arial" panose="020B0604020202020204" pitchFamily="34" charset="0"/>
                         <a:buChar char="•"/>
                         <a:tabLst/>
                       </a:pPr>
                       <a:r>
-                        <a:rPr lang="en-US" sz="1400" dirty="0"/>
-                        <a:t>Events</a:t>
+                        <a:rPr lang="ru-Ru" sz="1400" b="0" i="0" u="none" baseline="0" dirty="0"/>
+                        <a:t>События</a:t>
                       </a:r>
-                      <a:endParaRPr lang="en-US" sz="1400" b="1" dirty="0"/>
+                      <a:endParaRPr lang="ru-Ru" sz="1400" b="1" dirty="0"/>
                     </a:p>
                   </a:txBody>
                   <a:tcPr>
@@ -15997,12 +16042,12 @@
                     <a:bodyPr/>
                     <a:lstStyle/>
                     <a:p>
-                      <a:pPr marL="174625" indent="-174625" algn="l">
+                      <a:pPr marL="174625" indent="-174625" algn="l" rtl="0">
                         <a:buFont typeface="Arial" panose="020B0604020202020204" pitchFamily="34" charset="0"/>
                         <a:buChar char="•"/>
                         <a:tabLst/>
                       </a:pPr>
-                      <a:endParaRPr lang="en-US" sz="1800" b="1" dirty="0"/>
+                      <a:endParaRPr lang="ru-Ru" sz="1800" b="1" dirty="0"/>
                     </a:p>
                   </a:txBody>
                   <a:tcPr>
@@ -16055,7 +16100,7 @@
                     <a:bodyPr/>
                     <a:lstStyle/>
                     <a:p>
-                      <a:endParaRPr lang="en-US"/>
+                      <a:endParaRPr lang="ru-Ru"/>
                     </a:p>
                   </a:txBody>
                   <a:tcPr/>
@@ -16065,7 +16110,7 @@
                     <a:bodyPr/>
                     <a:lstStyle/>
                     <a:p>
-                      <a:endParaRPr lang="en-US"/>
+                      <a:endParaRPr lang="ru-Ru"/>
                     </a:p>
                   </a:txBody>
                   <a:tcPr/>
@@ -16092,7 +16137,7 @@
                         <a:tabLst/>
                         <a:defRPr/>
                       </a:pPr>
-                      <a:endParaRPr lang="en-US" sz="1800" b="1" dirty="0"/>
+                      <a:endParaRPr lang="ru-Ru" sz="1800" b="1" dirty="0"/>
                     </a:p>
                   </a:txBody>
                   <a:tcPr>
@@ -16145,7 +16190,7 @@
                     <a:bodyPr/>
                     <a:lstStyle/>
                     <a:p>
-                      <a:endParaRPr lang="en-US"/>
+                      <a:endParaRPr lang="ru-Ru"/>
                     </a:p>
                   </a:txBody>
                   <a:tcPr/>
@@ -16155,7 +16200,7 @@
                     <a:bodyPr/>
                     <a:lstStyle/>
                     <a:p>
-                      <a:endParaRPr lang="en-US"/>
+                      <a:endParaRPr lang="ru-Ru"/>
                     </a:p>
                   </a:txBody>
                   <a:tcPr/>
@@ -16182,7 +16227,7 @@
                         <a:tabLst/>
                         <a:defRPr/>
                       </a:pPr>
-                      <a:endParaRPr lang="en-US" sz="1800" b="1" dirty="0"/>
+                      <a:endParaRPr lang="ru-Ru" sz="1800" b="1" dirty="0"/>
                     </a:p>
                   </a:txBody>
                   <a:tcPr>
@@ -16266,12 +16311,13 @@
           <a:bodyPr/>
           <a:lstStyle/>
           <a:p>
+            <a:pPr algn="r" rtl="0"/>
             <a:fld id="{08BF69C1-739F-1B47-B5E3-FA651BCAB105}" type="slidenum">
-              <a:rPr lang="en-US" smtClean="0"/>
+              <a:rPr/>
               <a:pPr/>
               <a:t>4</a:t>
             </a:fld>
-            <a:endParaRPr lang="en-US"/>
+            <a:endParaRPr lang="ru-Ru"/>
           </a:p>
         </p:txBody>
       </p:sp>
@@ -16291,8 +16337,8 @@
         </p:nvSpPr>
         <p:spPr>
           <a:xfrm>
-            <a:off x="2247607" y="72070"/>
-            <a:ext cx="7138422" cy="571500"/>
+            <a:off x="1509823" y="72070"/>
+            <a:ext cx="8495414" cy="571500"/>
           </a:xfrm>
           <a:prstGeom prst="rect">
             <a:avLst/>
@@ -16465,13 +16511,26 @@
             </a:lvl9pPr>
           </a:lstStyle>
           <a:p>
-            <a:pPr marL="0" indent="0" algn="ctr">
+            <a:pPr marL="0" indent="0" algn="ctr" rtl="0">
               <a:buNone/>
             </a:pPr>
             <a:r>
-              <a:rPr lang="en-US" dirty="0"/>
-              <a:t>Hyperledger Fabric Policy Hierarchy</a:t>
+              <a:rPr lang="ru-Ru" b="0" i="0" u="none" baseline="0" dirty="0"/>
+              <a:t>Иерархия установленных правил </a:t>
             </a:r>
+            <a:r>
+              <a:rPr lang="ru-Ru" b="0" i="0" u="none" baseline="0" dirty="0" err="1"/>
+              <a:t>Hyperledger</a:t>
+            </a:r>
+            <a:r>
+              <a:rPr lang="ru-Ru" b="0" i="0" u="none" baseline="0" dirty="0"/>
+              <a:t> </a:t>
+            </a:r>
+            <a:r>
+              <a:rPr lang="ru-Ru" b="0" i="0" u="none" baseline="0" dirty="0" err="1"/>
+              <a:t>Fabric</a:t>
+            </a:r>
+            <a:endParaRPr lang="ru-Ru" b="0" i="0" u="none" baseline="0" dirty="0"/>
           </a:p>
         </p:txBody>
       </p:sp>
@@ -16503,13 +16562,14 @@
           </a:bodyPr>
           <a:lstStyle/>
           <a:p>
+            <a:pPr algn="l" rtl="0"/>
             <a:r>
-              <a:rPr lang="en-US" b="1" dirty="0"/>
-              <a:t>ACLs and smart contracts</a:t>
+              <a:rPr lang="ru-Ru" b="1" i="0" u="none" baseline="0"/>
+              <a:t>ACL и смарт-контракты</a:t>
             </a:r>
           </a:p>
           <a:p>
-            <a:endParaRPr lang="en-US" dirty="0"/>
+            <a:endParaRPr lang="ru-Ru" dirty="0"/>
           </a:p>
         </p:txBody>
       </p:sp>
@@ -16541,13 +16601,14 @@
           </a:bodyPr>
           <a:lstStyle/>
           <a:p>
+            <a:pPr algn="l" rtl="0"/>
             <a:r>
-              <a:rPr lang="en-US" b="1" dirty="0"/>
-              <a:t>Application Channel</a:t>
+              <a:rPr lang="ru-Ru" b="1" i="0" u="none" baseline="0"/>
+              <a:t>Канал приложения</a:t>
             </a:r>
           </a:p>
           <a:p>
-            <a:endParaRPr lang="en-US" dirty="0"/>
+            <a:endParaRPr lang="ru-Ru" dirty="0"/>
           </a:p>
         </p:txBody>
       </p:sp>
@@ -16566,7 +16627,7 @@
         <p:spPr>
           <a:xfrm>
             <a:off x="2924998" y="789643"/>
-            <a:ext cx="1684301" cy="646331"/>
+            <a:ext cx="2120768" cy="646331"/>
           </a:xfrm>
           <a:prstGeom prst="rect">
             <a:avLst/>
@@ -16579,13 +16640,14 @@
           </a:bodyPr>
           <a:lstStyle/>
           <a:p>
+            <a:pPr algn="l" rtl="0"/>
             <a:r>
-              <a:rPr lang="en-US" b="1" dirty="0"/>
-              <a:t>System Channel</a:t>
+              <a:rPr lang="ru-Ru" b="1" i="0" u="none" baseline="0" dirty="0"/>
+              <a:t>Системный канал</a:t>
             </a:r>
           </a:p>
           <a:p>
-            <a:endParaRPr lang="en-US" dirty="0"/>
+            <a:endParaRPr lang="ru-Ru" dirty="0"/>
           </a:p>
         </p:txBody>
       </p:sp>
@@ -16634,8 +16696,8 @@
           <a:bodyPr rtlCol="0" anchor="ctr"/>
           <a:lstStyle/>
           <a:p>
-            <a:pPr algn="ctr"/>
-            <a:endParaRPr lang="en-US"/>
+            <a:pPr algn="ctr" rtl="0"/>
+            <a:endParaRPr lang="ru-Ru"/>
           </a:p>
         </p:txBody>
       </p:sp>
@@ -16866,7 +16928,7 @@
         <p:spPr>
           <a:xfrm>
             <a:off x="1145008" y="795407"/>
-            <a:ext cx="1545936" cy="923330"/>
+            <a:ext cx="1761424" cy="1200329"/>
           </a:xfrm>
           <a:prstGeom prst="rect">
             <a:avLst/>
@@ -16879,29 +16941,14 @@
           </a:bodyPr>
           <a:lstStyle/>
           <a:p>
+            <a:pPr algn="l" rtl="0"/>
             <a:r>
-              <a:rPr lang="en-US" b="1" dirty="0">
+              <a:rPr lang="ru-Ru" b="1" i="0" u="none" baseline="0" dirty="0">
                 <a:solidFill>
                   <a:srgbClr val="0164FF"/>
                 </a:solidFill>
               </a:rPr>
-              <a:t>What </a:t>
-            </a:r>
-            <a:r>
-              <a:rPr lang="en-US" b="1" dirty="0" err="1">
-                <a:solidFill>
-                  <a:srgbClr val="0164FF"/>
-                </a:solidFill>
-              </a:rPr>
-              <a:t>Orderer</a:t>
-            </a:r>
-            <a:r>
-              <a:rPr lang="en-US" b="1" dirty="0">
-                <a:solidFill>
-                  <a:srgbClr val="0164FF"/>
-                </a:solidFill>
-              </a:rPr>
-              <a:t> organizations govern</a:t>
+              <a:t>Чем управляют организации службы упорядочения</a:t>
             </a:r>
           </a:p>
         </p:txBody>
@@ -16934,23 +16981,25 @@
           </a:bodyPr>
           <a:lstStyle/>
           <a:p>
+            <a:pPr algn="l" rtl="0"/>
             <a:r>
-              <a:rPr lang="en-US" b="1" dirty="0">
+              <a:rPr lang="ru-Ru" b="1" i="0" u="none" baseline="0">
                 <a:solidFill>
                   <a:srgbClr val="0164FF"/>
                 </a:solidFill>
               </a:rPr>
-              <a:t>What</a:t>
+              <a:t>Чем</a:t>
             </a:r>
           </a:p>
           <a:p>
+            <a:pPr algn="l" rtl="0"/>
             <a:r>
-              <a:rPr lang="en-US" b="1" dirty="0">
+              <a:rPr lang="ru-Ru" b="1" i="0" u="none" baseline="0">
                 <a:solidFill>
                   <a:srgbClr val="0164FF"/>
                 </a:solidFill>
               </a:rPr>
-              <a:t>Consortium organizations govern</a:t>
+              <a:t>управляют организации консорциума</a:t>
             </a:r>
           </a:p>
         </p:txBody>
@@ -17031,7 +17080,7 @@
           <a:blip r:embed="rId7">
             <a:extLst>
               <a:ext uri="{837473B0-CC2E-450A-ABE3-18F120FF3D39}">
-                <a1611:picAttrSrcUrl xmlns:a1611="http://schemas.microsoft.com/office/drawing/2016/11/main" r:id="rId8"/>
+                <a1611:picAttrSrcUrl xmlns:a1611="http://schemas.microsoft.com/office/drawing/2016/11/main" xmlns="" r:id="rId8"/>
               </a:ext>
             </a:extLst>
           </a:blip>
@@ -17180,9 +17229,9 @@
           <a:bodyPr rtlCol="0" anchor="ctr"/>
           <a:lstStyle/>
           <a:p>
-            <a:pPr algn="ctr"/>
+            <a:pPr algn="ctr" rtl="0"/>
             <a:r>
-              <a:rPr lang="en-US" dirty="0"/>
+              <a:rPr lang="ru-Ru" b="0" i="0" u="none" baseline="0"/>
               <a:t>Channel/Admins</a:t>
             </a:r>
           </a:p>
@@ -17203,7 +17252,7 @@
         <p:spPr>
           <a:xfrm>
             <a:off x="5341434" y="121322"/>
-            <a:ext cx="1851102" cy="369332"/>
+            <a:ext cx="2204224" cy="369332"/>
           </a:xfrm>
           <a:prstGeom prst="rect">
             <a:avLst/>
@@ -17216,9 +17265,10 @@
           </a:bodyPr>
           <a:lstStyle/>
           <a:p>
+            <a:pPr algn="l" rtl="0"/>
             <a:r>
-              <a:rPr lang="en-US" dirty="0"/>
-              <a:t>System Channel</a:t>
+              <a:rPr lang="ru-Ru" b="0" i="0" u="none" baseline="0" dirty="0"/>
+              <a:t>Системный канал</a:t>
             </a:r>
           </a:p>
         </p:txBody>
@@ -17264,9 +17314,9 @@
           <a:bodyPr rtlCol="0" anchor="ctr"/>
           <a:lstStyle/>
           <a:p>
-            <a:pPr algn="ctr"/>
+            <a:pPr algn="ctr" rtl="0"/>
             <a:r>
-              <a:rPr lang="en-US" dirty="0"/>
+              <a:rPr lang="ru-Ru" b="0" i="0" u="none" baseline="0"/>
               <a:t>Channel/Consortium/Admins</a:t>
             </a:r>
           </a:p>
@@ -17313,18 +17363,10 @@
           <a:bodyPr rtlCol="0" anchor="ctr"/>
           <a:lstStyle/>
           <a:p>
-            <a:pPr algn="ctr"/>
+            <a:pPr algn="ctr" rtl="0"/>
             <a:r>
-              <a:rPr lang="en-US" dirty="0"/>
-              <a:t>Channel/</a:t>
-            </a:r>
-            <a:r>
-              <a:rPr lang="en-US" dirty="0" err="1"/>
-              <a:t>Orderer</a:t>
-            </a:r>
-            <a:r>
-              <a:rPr lang="en-US" dirty="0"/>
-              <a:t>/Admins</a:t>
+              <a:rPr lang="ru-Ru" b="0" i="0" u="none" baseline="0"/>
+              <a:t>Channel/Orderer/Admins</a:t>
             </a:r>
           </a:p>
         </p:txBody>
@@ -17357,8 +17399,9 @@
           </a:bodyPr>
           <a:lstStyle/>
           <a:p>
+            <a:pPr algn="l" rtl="0"/>
             <a:r>
-              <a:rPr lang="en-US" sz="1200" dirty="0"/>
+              <a:rPr lang="ru-Ru" sz="1200" b="0" i="0" u="none" baseline="0"/>
               <a:t>MAJORITY sub policy: “Admins”                                     Type = 3</a:t>
             </a:r>
           </a:p>
@@ -17392,8 +17435,9 @@
           </a:bodyPr>
           <a:lstStyle/>
           <a:p>
+            <a:pPr algn="l" rtl="0"/>
             <a:r>
-              <a:rPr lang="en-US" sz="1200" dirty="0"/>
+              <a:rPr lang="ru-Ru" sz="1200" b="0" i="0" u="none" baseline="0"/>
               <a:t>n=0 (ANY)                                                                           Type = 1</a:t>
             </a:r>
           </a:p>
@@ -17440,18 +17484,10 @@
           <a:bodyPr rtlCol="0" anchor="ctr"/>
           <a:lstStyle/>
           <a:p>
-            <a:pPr algn="ctr"/>
+            <a:pPr algn="ctr" rtl="0"/>
             <a:r>
-              <a:rPr lang="en-US" sz="1200" dirty="0"/>
-              <a:t>Channel/Consortium/</a:t>
-            </a:r>
-            <a:r>
-              <a:rPr lang="en-US" sz="1200" dirty="0" err="1"/>
-              <a:t>SampleConsortium</a:t>
-            </a:r>
-            <a:r>
-              <a:rPr lang="en-US" sz="1200" dirty="0"/>
-              <a:t>/Org1MSP/Admins</a:t>
+              <a:rPr lang="ru-Ru" sz="1200" b="0" i="0" u="none" baseline="0"/>
+              <a:t>Channel/Consortium/SampleConsortium/Org1MSP/Admins</a:t>
             </a:r>
           </a:p>
         </p:txBody>
@@ -17484,8 +17520,9 @@
           </a:bodyPr>
           <a:lstStyle/>
           <a:p>
+            <a:pPr algn="l" rtl="0"/>
             <a:r>
-              <a:rPr lang="en-US" sz="1200" dirty="0"/>
+              <a:rPr lang="ru-Ru" sz="1200" b="0" i="0" u="none" baseline="0"/>
               <a:t>n=1  Role = “ADMIN” member of Org1MSP                Type = 1</a:t>
             </a:r>
           </a:p>
@@ -17532,18 +17569,10 @@
           <a:bodyPr rtlCol="0" anchor="ctr"/>
           <a:lstStyle/>
           <a:p>
-            <a:pPr algn="ctr"/>
+            <a:pPr algn="ctr" rtl="0"/>
             <a:r>
-              <a:rPr lang="en-US" sz="1200" dirty="0"/>
-              <a:t>Channel/Consortium/</a:t>
-            </a:r>
-            <a:r>
-              <a:rPr lang="en-US" sz="1200" dirty="0" err="1"/>
-              <a:t>SampleConsortium</a:t>
-            </a:r>
-            <a:r>
-              <a:rPr lang="en-US" sz="1200" dirty="0"/>
-              <a:t>/Org2MSP/Admins</a:t>
+              <a:rPr lang="ru-Ru" sz="1200" b="0" i="0" u="none" baseline="0"/>
+              <a:t>Channel/Consortium/SampleConsortium/Org2MSP/Admins</a:t>
             </a:r>
           </a:p>
         </p:txBody>
@@ -17576,8 +17605,9 @@
           </a:bodyPr>
           <a:lstStyle/>
           <a:p>
+            <a:pPr algn="l" rtl="0"/>
             <a:r>
-              <a:rPr lang="en-US" sz="1200" dirty="0"/>
+              <a:rPr lang="ru-Ru" sz="1200" b="0" i="0" u="none" baseline="0"/>
               <a:t>n=1  Role = “ADMIN” member of Org2MSP                Type = 1</a:t>
             </a:r>
           </a:p>
@@ -17782,8 +17812,9 @@
           </a:bodyPr>
           <a:lstStyle/>
           <a:p>
+            <a:pPr algn="l" rtl="0"/>
             <a:r>
-              <a:rPr lang="en-US" sz="1200" dirty="0"/>
+              <a:rPr lang="ru-Ru" sz="1200" b="0" i="0" u="none" baseline="0"/>
               <a:t>MAJORITY sub policy: “Admins”                                     Type = 3</a:t>
             </a:r>
           </a:p>
@@ -17830,26 +17861,10 @@
           <a:bodyPr rtlCol="0" anchor="ctr"/>
           <a:lstStyle/>
           <a:p>
-            <a:pPr algn="ctr"/>
+            <a:pPr algn="ctr" rtl="0"/>
             <a:r>
-              <a:rPr lang="en-US" sz="1200" dirty="0"/>
-              <a:t>Channel/</a:t>
-            </a:r>
-            <a:r>
-              <a:rPr lang="en-US" sz="1200" dirty="0" err="1"/>
-              <a:t>Orderer</a:t>
-            </a:r>
-            <a:r>
-              <a:rPr lang="en-US" sz="1200" dirty="0"/>
-              <a:t>/</a:t>
-            </a:r>
-            <a:r>
-              <a:rPr lang="en-US" sz="1200" dirty="0" err="1"/>
-              <a:t>OrdererOrg</a:t>
-            </a:r>
-            <a:r>
-              <a:rPr lang="en-US" sz="1200" dirty="0"/>
-              <a:t>/Admins</a:t>
+              <a:rPr lang="ru-Ru" sz="1200" b="0" i="0" u="none" baseline="0"/>
+              <a:t>Channel/Orderer/OrdererOrg/Admins</a:t>
             </a:r>
           </a:p>
         </p:txBody>
@@ -17882,17 +17897,10 @@
           </a:bodyPr>
           <a:lstStyle/>
           <a:p>
+            <a:pPr algn="l" rtl="0"/>
             <a:r>
-              <a:rPr lang="en-US" sz="1200" dirty="0"/>
-              <a:t>n=1  Role = “ADMIN” member of </a:t>
-            </a:r>
-            <a:r>
-              <a:rPr lang="en-US" sz="1200" dirty="0" err="1"/>
-              <a:t>OrdererMSP</a:t>
-            </a:r>
-            <a:r>
-              <a:rPr lang="en-US" sz="1200" dirty="0"/>
-              <a:t>         Type =1</a:t>
+              <a:rPr lang="ru-Ru" sz="1200" b="0" i="0" u="none" baseline="0"/>
+              <a:t>n=1  Role = “ADMIN” member of OrdererMSP         Type =1</a:t>
             </a:r>
           </a:p>
         </p:txBody>
@@ -17958,7 +17966,7 @@
           <a:blip r:embed="rId2">
             <a:extLst>
               <a:ext uri="{837473B0-CC2E-450A-ABE3-18F120FF3D39}">
-                <a1611:picAttrSrcUrl xmlns:a1611="http://schemas.microsoft.com/office/drawing/2016/11/main" r:id="rId3"/>
+                <a1611:picAttrSrcUrl xmlns:a1611="http://schemas.microsoft.com/office/drawing/2016/11/main" xmlns="" r:id="rId3"/>
               </a:ext>
             </a:extLst>
           </a:blip>
@@ -17994,7 +18002,7 @@
           <a:blip r:embed="rId2">
             <a:extLst>
               <a:ext uri="{837473B0-CC2E-450A-ABE3-18F120FF3D39}">
-                <a1611:picAttrSrcUrl xmlns:a1611="http://schemas.microsoft.com/office/drawing/2016/11/main" r:id="rId3"/>
+                <a1611:picAttrSrcUrl xmlns:a1611="http://schemas.microsoft.com/office/drawing/2016/11/main" xmlns="" r:id="rId3"/>
               </a:ext>
             </a:extLst>
           </a:blip>
@@ -18030,7 +18038,7 @@
           <a:blip r:embed="rId2">
             <a:extLst>
               <a:ext uri="{837473B0-CC2E-450A-ABE3-18F120FF3D39}">
-                <a1611:picAttrSrcUrl xmlns:a1611="http://schemas.microsoft.com/office/drawing/2016/11/main" r:id="rId3"/>
+                <a1611:picAttrSrcUrl xmlns:a1611="http://schemas.microsoft.com/office/drawing/2016/11/main" xmlns="" r:id="rId3"/>
               </a:ext>
             </a:extLst>
           </a:blip>
@@ -18066,7 +18074,7 @@
           <a:blip r:embed="rId2">
             <a:extLst>
               <a:ext uri="{837473B0-CC2E-450A-ABE3-18F120FF3D39}">
-                <a1611:picAttrSrcUrl xmlns:a1611="http://schemas.microsoft.com/office/drawing/2016/11/main" r:id="rId3"/>
+                <a1611:picAttrSrcUrl xmlns:a1611="http://schemas.microsoft.com/office/drawing/2016/11/main" xmlns="" r:id="rId3"/>
               </a:ext>
             </a:extLst>
           </a:blip>
@@ -18102,7 +18110,7 @@
           <a:blip r:embed="rId2">
             <a:extLst>
               <a:ext uri="{837473B0-CC2E-450A-ABE3-18F120FF3D39}">
-                <a1611:picAttrSrcUrl xmlns:a1611="http://schemas.microsoft.com/office/drawing/2016/11/main" r:id="rId3"/>
+                <a1611:picAttrSrcUrl xmlns:a1611="http://schemas.microsoft.com/office/drawing/2016/11/main" xmlns="" r:id="rId3"/>
               </a:ext>
             </a:extLst>
           </a:blip>
@@ -18148,15 +18156,17 @@
           </a:bodyPr>
           <a:lstStyle/>
           <a:p>
+            <a:pPr algn="l" rtl="0"/>
             <a:r>
-              <a:rPr lang="en-US" dirty="0"/>
-              <a:t>In order for the Channel/Admins policy to be satisfied, every sub-policy under it in the configuration hierarchy must</a:t>
+              <a:rPr lang="ru-Ru" b="0" i="0" u="none" baseline="0"/>
+              <a:t>Для удовлетворения правила Channel/Admins, каждое правило ниже по иерархии конфигурации должно</a:t>
             </a:r>
           </a:p>
           <a:p>
+            <a:pPr algn="l" rtl="0"/>
             <a:r>
-              <a:rPr lang="en-US" dirty="0"/>
-              <a:t>also be satisfied.</a:t>
+              <a:rPr lang="ru-Ru" b="0" i="0" u="none" baseline="0"/>
+              <a:t>также быть удовлетворено.</a:t>
             </a:r>
           </a:p>
         </p:txBody>
@@ -18204,8 +18214,8 @@
           <a:bodyPr rtlCol="0" anchor="ctr"/>
           <a:lstStyle/>
           <a:p>
-            <a:pPr algn="ctr"/>
-            <a:endParaRPr lang="en-US" dirty="0"/>
+            <a:pPr algn="ctr" rtl="0"/>
+            <a:endParaRPr lang="ru-Ru" dirty="0"/>
           </a:p>
         </p:txBody>
       </p:sp>
@@ -18237,24 +18247,22 @@
           </a:bodyPr>
           <a:lstStyle/>
           <a:p>
+            <a:pPr algn="l" rtl="0"/>
             <a:r>
-              <a:rPr lang="en-US" dirty="0"/>
+              <a:rPr lang="ru-Ru" b="0" i="0" u="none" baseline="0"/>
               <a:t>Type 1 = Signature</a:t>
             </a:r>
           </a:p>
           <a:p>
-            <a:endParaRPr lang="en-US" dirty="0"/>
+            <a:endParaRPr lang="ru-Ru" dirty="0"/>
           </a:p>
           <a:p>
+            <a:pPr algn="l" rtl="0"/>
             <a:r>
-              <a:rPr lang="en-US" dirty="0"/>
-              <a:t>Type 3 = </a:t>
+              <a:rPr lang="ru-Ru" b="0" i="0" u="none" baseline="0"/>
+              <a:t>Type 3 = ImplicitMeta</a:t>
             </a:r>
-            <a:r>
-              <a:rPr lang="en-US" dirty="0" err="1"/>
-              <a:t>ImplicitMeta</a:t>
-            </a:r>
-            <a:endParaRPr lang="en-US" dirty="0"/>
+            <a:endParaRPr lang="ru-Ru" dirty="0"/>
           </a:p>
         </p:txBody>
       </p:sp>
@@ -18329,9 +18337,9 @@
           <a:bodyPr rtlCol="0" anchor="ctr"/>
           <a:lstStyle/>
           <a:p>
-            <a:pPr algn="ctr"/>
+            <a:pPr algn="ctr" rtl="0"/>
             <a:r>
-              <a:rPr lang="en-US" dirty="0"/>
+              <a:rPr lang="ru-Ru" b="0" i="0" u="none" baseline="0"/>
               <a:t>Channel/Admins</a:t>
             </a:r>
           </a:p>
@@ -18365,9 +18373,10 @@
           </a:bodyPr>
           <a:lstStyle/>
           <a:p>
+            <a:pPr algn="l" rtl="0"/>
             <a:r>
-              <a:rPr lang="en-US" dirty="0"/>
-              <a:t>Application Channel</a:t>
+              <a:rPr lang="ru-Ru" b="0" i="0" u="none" baseline="0"/>
+              <a:t>Канал приложения</a:t>
             </a:r>
           </a:p>
         </p:txBody>
@@ -18413,9 +18422,9 @@
           <a:bodyPr rtlCol="0" anchor="ctr"/>
           <a:lstStyle/>
           <a:p>
-            <a:pPr algn="ctr"/>
+            <a:pPr algn="ctr" rtl="0"/>
             <a:r>
-              <a:rPr lang="en-US" dirty="0"/>
+              <a:rPr lang="ru-Ru" b="0" i="0" u="none" baseline="0"/>
               <a:t>Channel/Application/Admins</a:t>
             </a:r>
           </a:p>
@@ -18462,18 +18471,10 @@
           <a:bodyPr rtlCol="0" anchor="ctr"/>
           <a:lstStyle/>
           <a:p>
-            <a:pPr algn="ctr"/>
+            <a:pPr algn="ctr" rtl="0"/>
             <a:r>
-              <a:rPr lang="en-US" dirty="0"/>
-              <a:t>Channel/</a:t>
-            </a:r>
-            <a:r>
-              <a:rPr lang="en-US" dirty="0" err="1"/>
-              <a:t>Orderer</a:t>
-            </a:r>
-            <a:r>
-              <a:rPr lang="en-US" dirty="0"/>
-              <a:t>/Admins</a:t>
+              <a:rPr lang="ru-Ru" b="0" i="0" u="none" baseline="0"/>
+              <a:t>Channel/Orderer/Admins</a:t>
             </a:r>
           </a:p>
         </p:txBody>
@@ -18506,8 +18507,9 @@
           </a:bodyPr>
           <a:lstStyle/>
           <a:p>
+            <a:pPr algn="l" rtl="0"/>
             <a:r>
-              <a:rPr lang="en-US" sz="1200" dirty="0"/>
+              <a:rPr lang="ru-Ru" sz="1200" b="0" i="0" u="none" baseline="0"/>
               <a:t>MAJORITY sub policy: “Admins”                                      Type =3</a:t>
             </a:r>
           </a:p>
@@ -18541,8 +18543,9 @@
           </a:bodyPr>
           <a:lstStyle/>
           <a:p>
+            <a:pPr algn="l" rtl="0"/>
             <a:r>
-              <a:rPr lang="en-US" sz="1200" dirty="0"/>
+              <a:rPr lang="ru-Ru" sz="1200" b="0" i="0" u="none" baseline="0"/>
               <a:t>n=0 (ANY)                                                                            Type =1</a:t>
             </a:r>
           </a:p>
@@ -18589,18 +18592,10 @@
           <a:bodyPr rtlCol="0" anchor="ctr"/>
           <a:lstStyle/>
           <a:p>
-            <a:pPr algn="ctr"/>
+            <a:pPr algn="ctr" rtl="0"/>
             <a:r>
-              <a:rPr lang="en-US" sz="1200" dirty="0"/>
-              <a:t>Channel/Consortium/</a:t>
-            </a:r>
-            <a:r>
-              <a:rPr lang="en-US" sz="1200" dirty="0" err="1"/>
-              <a:t>SampleConsortium</a:t>
-            </a:r>
-            <a:r>
-              <a:rPr lang="en-US" sz="1200" dirty="0"/>
-              <a:t>/Org1MSP/Admins</a:t>
+              <a:rPr lang="ru-Ru" sz="1200" b="0" i="0" u="none" baseline="0"/>
+              <a:t>Channel/Consortium/SampleConsortium/Org1MSP/Admins</a:t>
             </a:r>
           </a:p>
         </p:txBody>
@@ -18633,8 +18628,9 @@
           </a:bodyPr>
           <a:lstStyle/>
           <a:p>
+            <a:pPr algn="l" rtl="0"/>
             <a:r>
-              <a:rPr lang="en-US" sz="1200" dirty="0"/>
+              <a:rPr lang="ru-Ru" sz="1200" b="0" i="0" u="none" baseline="0"/>
               <a:t>n=1  Role = “ADMIN” member of Org1MSP                  Type=1</a:t>
             </a:r>
           </a:p>
@@ -18681,18 +18677,10 @@
           <a:bodyPr rtlCol="0" anchor="ctr"/>
           <a:lstStyle/>
           <a:p>
-            <a:pPr algn="ctr"/>
+            <a:pPr algn="ctr" rtl="0"/>
             <a:r>
-              <a:rPr lang="en-US" sz="1200" dirty="0"/>
-              <a:t>Channel/Consortium/</a:t>
-            </a:r>
-            <a:r>
-              <a:rPr lang="en-US" sz="1200" dirty="0" err="1"/>
-              <a:t>SampleConsortium</a:t>
-            </a:r>
-            <a:r>
-              <a:rPr lang="en-US" sz="1200" dirty="0"/>
-              <a:t>/Org2MSP/Admins</a:t>
+              <a:rPr lang="ru-Ru" sz="1200" b="0" i="0" u="none" baseline="0"/>
+              <a:t>Channel/Consortium/SampleConsortium/Org2MSP/Admins</a:t>
             </a:r>
           </a:p>
         </p:txBody>
@@ -18725,8 +18713,9 @@
           </a:bodyPr>
           <a:lstStyle/>
           <a:p>
+            <a:pPr algn="l" rtl="0"/>
             <a:r>
-              <a:rPr lang="en-US" sz="1200" dirty="0"/>
+              <a:rPr lang="ru-Ru" sz="1200" b="0" i="0" u="none" baseline="0"/>
               <a:t>n=1  Role = “ADMIN” member of Org2MSP                  Type=1</a:t>
             </a:r>
           </a:p>
@@ -18931,8 +18920,9 @@
           </a:bodyPr>
           <a:lstStyle/>
           <a:p>
+            <a:pPr algn="l" rtl="0"/>
             <a:r>
-              <a:rPr lang="en-US" sz="1200" dirty="0"/>
+              <a:rPr lang="ru-Ru" sz="1200" b="0" i="0" u="none" baseline="0"/>
               <a:t>MAJORITY sub policy: “Admins”                                      Type =3</a:t>
             </a:r>
           </a:p>
@@ -18979,26 +18969,10 @@
           <a:bodyPr rtlCol="0" anchor="ctr"/>
           <a:lstStyle/>
           <a:p>
-            <a:pPr algn="ctr"/>
+            <a:pPr algn="ctr" rtl="0"/>
             <a:r>
-              <a:rPr lang="en-US" sz="1200" dirty="0"/>
-              <a:t>Channel/</a:t>
-            </a:r>
-            <a:r>
-              <a:rPr lang="en-US" sz="1200" dirty="0" err="1"/>
-              <a:t>Orderer</a:t>
-            </a:r>
-            <a:r>
-              <a:rPr lang="en-US" sz="1200" dirty="0"/>
-              <a:t>/</a:t>
-            </a:r>
-            <a:r>
-              <a:rPr lang="en-US" sz="1200" dirty="0" err="1"/>
-              <a:t>OrdererOrg</a:t>
-            </a:r>
-            <a:r>
-              <a:rPr lang="en-US" sz="1200" dirty="0"/>
-              <a:t>/Admins</a:t>
+              <a:rPr lang="ru-Ru" sz="1200" b="0" i="0" u="none" baseline="0"/>
+              <a:t>Channel/Orderer/OrdererOrg/Admins</a:t>
             </a:r>
           </a:p>
         </p:txBody>
@@ -19031,17 +19005,10 @@
           </a:bodyPr>
           <a:lstStyle/>
           <a:p>
+            <a:pPr algn="l" rtl="0"/>
             <a:r>
-              <a:rPr lang="en-US" sz="1200" dirty="0"/>
-              <a:t>n=1  Role = “ADMIN” member of </a:t>
-            </a:r>
-            <a:r>
-              <a:rPr lang="en-US" sz="1200" dirty="0" err="1"/>
-              <a:t>OrdererMSP</a:t>
-            </a:r>
-            <a:r>
-              <a:rPr lang="en-US" sz="1200" dirty="0"/>
-              <a:t>            Type=1</a:t>
+              <a:rPr lang="ru-Ru" sz="1200" b="0" i="0" u="none" baseline="0"/>
+              <a:t>n=1  Role = “ADMIN” member of OrdererMSP            Type=1</a:t>
             </a:r>
           </a:p>
         </p:txBody>
@@ -19107,7 +19074,7 @@
           <a:blip r:embed="rId2">
             <a:extLst>
               <a:ext uri="{837473B0-CC2E-450A-ABE3-18F120FF3D39}">
-                <a1611:picAttrSrcUrl xmlns:a1611="http://schemas.microsoft.com/office/drawing/2016/11/main" r:id="rId3"/>
+                <a1611:picAttrSrcUrl xmlns:a1611="http://schemas.microsoft.com/office/drawing/2016/11/main" xmlns="" r:id="rId3"/>
               </a:ext>
             </a:extLst>
           </a:blip>
@@ -19143,7 +19110,7 @@
           <a:blip r:embed="rId2">
             <a:extLst>
               <a:ext uri="{837473B0-CC2E-450A-ABE3-18F120FF3D39}">
-                <a1611:picAttrSrcUrl xmlns:a1611="http://schemas.microsoft.com/office/drawing/2016/11/main" r:id="rId3"/>
+                <a1611:picAttrSrcUrl xmlns:a1611="http://schemas.microsoft.com/office/drawing/2016/11/main" xmlns="" r:id="rId3"/>
               </a:ext>
             </a:extLst>
           </a:blip>
@@ -19179,7 +19146,7 @@
           <a:blip r:embed="rId2">
             <a:extLst>
               <a:ext uri="{837473B0-CC2E-450A-ABE3-18F120FF3D39}">
-                <a1611:picAttrSrcUrl xmlns:a1611="http://schemas.microsoft.com/office/drawing/2016/11/main" r:id="rId3"/>
+                <a1611:picAttrSrcUrl xmlns:a1611="http://schemas.microsoft.com/office/drawing/2016/11/main" xmlns="" r:id="rId3"/>
               </a:ext>
             </a:extLst>
           </a:blip>
@@ -19215,7 +19182,7 @@
           <a:blip r:embed="rId2">
             <a:extLst>
               <a:ext uri="{837473B0-CC2E-450A-ABE3-18F120FF3D39}">
-                <a1611:picAttrSrcUrl xmlns:a1611="http://schemas.microsoft.com/office/drawing/2016/11/main" r:id="rId3"/>
+                <a1611:picAttrSrcUrl xmlns:a1611="http://schemas.microsoft.com/office/drawing/2016/11/main" xmlns="" r:id="rId3"/>
               </a:ext>
             </a:extLst>
           </a:blip>
@@ -19251,7 +19218,7 @@
           <a:blip r:embed="rId2">
             <a:extLst>
               <a:ext uri="{837473B0-CC2E-450A-ABE3-18F120FF3D39}">
-                <a1611:picAttrSrcUrl xmlns:a1611="http://schemas.microsoft.com/office/drawing/2016/11/main" r:id="rId3"/>
+                <a1611:picAttrSrcUrl xmlns:a1611="http://schemas.microsoft.com/office/drawing/2016/11/main" xmlns="" r:id="rId3"/>
               </a:ext>
             </a:extLst>
           </a:blip>
@@ -19297,15 +19264,17 @@
           </a:bodyPr>
           <a:lstStyle/>
           <a:p>
+            <a:pPr algn="l" rtl="0"/>
             <a:r>
-              <a:rPr lang="en-US" dirty="0"/>
-              <a:t>In order for the Channel/Admins policy to be satisfied, every sub-policy under it in the configuration hierarchy must</a:t>
+              <a:rPr lang="ru-Ru" b="0" i="0" u="none" baseline="0"/>
+              <a:t>Для удовлетворения правила Channel/Admins, каждое правило ниже по иерархии конфигурации должно</a:t>
             </a:r>
           </a:p>
           <a:p>
+            <a:pPr algn="l" rtl="0"/>
             <a:r>
-              <a:rPr lang="en-US" dirty="0"/>
-              <a:t>be satisfied.</a:t>
+              <a:rPr lang="ru-Ru" b="0" i="0" u="none" baseline="0"/>
+              <a:t>быть удовлетворено.</a:t>
             </a:r>
           </a:p>
         </p:txBody>

</xml_diff>

<commit_message>
[RU] translation of policies.md with diagrams
Signed-off-by: Anton Ievlev <anthony.ievlev@gmail.com>
</commit_message>
<xml_diff>
--- a/docs/locale/ru_RU/source/policies/Fabric_Policy_Hierarchy.pptx
+++ b/docs/locale/ru_RU/source/policies/Fabric_Policy_Hierarchy.pptx
@@ -879,35 +879,36 @@
         <a:bodyPr/>
         <a:lstStyle/>
         <a:p>
+          <a:pPr algn="ctr" rtl="0"/>
           <a:r>
-            <a:rPr lang="en-US" dirty="0" err="1"/>
+            <a:rPr lang="ru-Ru" b="0" i="0" u="none" baseline="0"/>
             <a:t>configtx.yaml</a:t>
           </a:r>
-          <a:endParaRPr lang="en-US" dirty="0"/>
+          <a:endParaRPr lang="ru-Ru" dirty="0"/>
         </a:p>
         <a:p>
-          <a:endParaRPr lang="en-US" dirty="0"/>
+          <a:endParaRPr lang="ru-Ru" dirty="0"/>
         </a:p>
         <a:p>
-          <a:endParaRPr lang="en-US" dirty="0"/>
+          <a:endParaRPr lang="ru-Ru" dirty="0"/>
         </a:p>
         <a:p>
-          <a:endParaRPr lang="en-US" dirty="0"/>
+          <a:endParaRPr lang="ru-Ru" dirty="0"/>
         </a:p>
         <a:p>
-          <a:endParaRPr lang="en-US" dirty="0"/>
+          <a:endParaRPr lang="ru-Ru" dirty="0"/>
         </a:p>
         <a:p>
-          <a:endParaRPr lang="en-US" dirty="0"/>
+          <a:endParaRPr lang="ru-Ru" dirty="0"/>
         </a:p>
         <a:p>
-          <a:endParaRPr lang="en-US" dirty="0"/>
+          <a:endParaRPr lang="ru-Ru" dirty="0"/>
         </a:p>
         <a:p>
-          <a:endParaRPr lang="en-US" dirty="0"/>
+          <a:endParaRPr lang="ru-Ru" dirty="0"/>
         </a:p>
         <a:p>
-          <a:endParaRPr lang="en-US" dirty="0"/>
+          <a:endParaRPr lang="ru-Ru" dirty="0"/>
         </a:p>
       </dgm:t>
     </dgm:pt>
@@ -918,7 +919,7 @@
         <a:bodyPr/>
         <a:lstStyle/>
         <a:p>
-          <a:endParaRPr lang="en-US"/>
+          <a:endParaRPr lang="ru-Ru"/>
         </a:p>
       </dgm:t>
     </dgm:pt>
@@ -929,7 +930,7 @@
         <a:bodyPr/>
         <a:lstStyle/>
         <a:p>
-          <a:endParaRPr lang="en-US"/>
+          <a:endParaRPr lang="ru-Ru"/>
         </a:p>
       </dgm:t>
     </dgm:pt>
@@ -940,17 +941,14 @@
         <a:bodyPr/>
         <a:lstStyle/>
         <a:p>
+          <a:pPr algn="ctr" rtl="0"/>
           <a:r>
-            <a:rPr lang="en-US" dirty="0" err="1"/>
-            <a:t>configtxgen</a:t>
-          </a:r>
-          <a:r>
-            <a:rPr lang="en-US" dirty="0"/>
-            <a:t> tool</a:t>
+            <a:rPr lang="ru-Ru" b="0" i="0" u="none" baseline="0"/>
+            <a:t>инструмент configtxgen</a:t>
           </a:r>
         </a:p>
         <a:p>
-          <a:endParaRPr lang="en-US" dirty="0"/>
+          <a:endParaRPr lang="ru-Ru" dirty="0"/>
         </a:p>
       </dgm:t>
     </dgm:pt>
@@ -961,7 +959,7 @@
         <a:bodyPr/>
         <a:lstStyle/>
         <a:p>
-          <a:endParaRPr lang="en-US"/>
+          <a:endParaRPr lang="ru-Ru"/>
         </a:p>
       </dgm:t>
     </dgm:pt>
@@ -972,7 +970,7 @@
         <a:bodyPr/>
         <a:lstStyle/>
         <a:p>
-          <a:endParaRPr lang="en-US"/>
+          <a:endParaRPr lang="ru-Ru"/>
         </a:p>
       </dgm:t>
     </dgm:pt>
@@ -983,42 +981,44 @@
         <a:bodyPr/>
         <a:lstStyle/>
         <a:p>
+          <a:pPr algn="ctr" rtl="0"/>
           <a:r>
-            <a:rPr lang="en-US" dirty="0" err="1"/>
-            <a:t>genesis.block</a:t>
+            <a:rPr lang="ru-Ru" b="0" i="0" u="none" baseline="0"/>
+            <a:t>первичный блок genesis.block</a:t>
           </a:r>
-          <a:endParaRPr lang="en-US" dirty="0"/>
+          <a:endParaRPr lang="ru-Ru" dirty="0"/>
         </a:p>
         <a:p>
-          <a:endParaRPr lang="en-US" dirty="0"/>
+          <a:endParaRPr lang="ru-Ru" dirty="0"/>
         </a:p>
         <a:p>
-          <a:endParaRPr lang="en-US" dirty="0"/>
+          <a:endParaRPr lang="ru-Ru" dirty="0"/>
         </a:p>
         <a:p>
-          <a:endParaRPr lang="en-US" dirty="0"/>
+          <a:endParaRPr lang="ru-Ru" dirty="0"/>
         </a:p>
         <a:p>
-          <a:endParaRPr lang="en-US" dirty="0"/>
+          <a:endParaRPr lang="ru-Ru" dirty="0"/>
         </a:p>
         <a:p>
-          <a:endParaRPr lang="en-US" dirty="0"/>
+          <a:endParaRPr lang="ru-Ru" dirty="0"/>
         </a:p>
         <a:p>
-          <a:endParaRPr lang="en-US" dirty="0"/>
+          <a:endParaRPr lang="ru-Ru" dirty="0"/>
         </a:p>
         <a:p>
-          <a:endParaRPr lang="en-US" dirty="0"/>
+          <a:endParaRPr lang="ru-Ru" dirty="0"/>
         </a:p>
         <a:p>
-          <a:endParaRPr lang="en-US" dirty="0"/>
+          <a:endParaRPr lang="ru-Ru" dirty="0"/>
         </a:p>
         <a:p>
-          <a:endParaRPr lang="en-US" dirty="0"/>
+          <a:endParaRPr lang="ru-Ru" dirty="0"/>
         </a:p>
         <a:p>
+          <a:pPr algn="ctr" rtl="0"/>
           <a:r>
-            <a:rPr lang="en-US" dirty="0"/>
+            <a:rPr lang="ru-Ru" b="0" i="0" u="none" baseline="0"/>
             <a:t> </a:t>
           </a:r>
         </a:p>
@@ -1031,7 +1031,7 @@
         <a:bodyPr/>
         <a:lstStyle/>
         <a:p>
-          <a:endParaRPr lang="en-US"/>
+          <a:endParaRPr lang="ru-Ru"/>
         </a:p>
       </dgm:t>
     </dgm:pt>
@@ -1042,7 +1042,7 @@
         <a:bodyPr/>
         <a:lstStyle/>
         <a:p>
-          <a:endParaRPr lang="en-US"/>
+          <a:endParaRPr lang="ru-Ru"/>
         </a:p>
       </dgm:t>
     </dgm:pt>
@@ -1062,14 +1062,35 @@
         </dgm:presLayoutVars>
       </dgm:prSet>
       <dgm:spPr/>
+      <dgm:t>
+        <a:bodyPr/>
+        <a:lstStyle/>
+        <a:p>
+          <a:endParaRPr lang="ru-RU"/>
+        </a:p>
+      </dgm:t>
     </dgm:pt>
     <dgm:pt modelId="{FDBC50BA-5B0B-D840-9875-0BB27D476504}" type="pres">
       <dgm:prSet presAssocID="{48ABCE8D-ED8E-C148-B5EF-4CA47EF3F851}" presName="sibTrans" presStyleLbl="sibTrans2D1" presStyleIdx="0" presStyleCnt="2"/>
       <dgm:spPr/>
+      <dgm:t>
+        <a:bodyPr/>
+        <a:lstStyle/>
+        <a:p>
+          <a:endParaRPr lang="ru-RU"/>
+        </a:p>
+      </dgm:t>
     </dgm:pt>
     <dgm:pt modelId="{D1F2C96C-5B61-BC4E-8C9D-D6AD7E359E53}" type="pres">
       <dgm:prSet presAssocID="{48ABCE8D-ED8E-C148-B5EF-4CA47EF3F851}" presName="connectorText" presStyleLbl="sibTrans2D1" presStyleIdx="0" presStyleCnt="2"/>
       <dgm:spPr/>
+      <dgm:t>
+        <a:bodyPr/>
+        <a:lstStyle/>
+        <a:p>
+          <a:endParaRPr lang="ru-RU"/>
+        </a:p>
+      </dgm:t>
     </dgm:pt>
     <dgm:pt modelId="{0215057D-1011-9141-8AB3-721FA6ACC70D}" type="pres">
       <dgm:prSet presAssocID="{F1701819-3A2F-8A44-9499-9935EFC5614B}" presName="node" presStyleLbl="node1" presStyleIdx="1" presStyleCnt="3">
@@ -1078,14 +1099,35 @@
         </dgm:presLayoutVars>
       </dgm:prSet>
       <dgm:spPr/>
+      <dgm:t>
+        <a:bodyPr/>
+        <a:lstStyle/>
+        <a:p>
+          <a:endParaRPr lang="ru-RU"/>
+        </a:p>
+      </dgm:t>
     </dgm:pt>
     <dgm:pt modelId="{40D2CA6D-50A8-A74F-A2E9-22453F43FB96}" type="pres">
       <dgm:prSet presAssocID="{60154467-B5BF-564D-B6B1-97BE8CA1C55F}" presName="sibTrans" presStyleLbl="sibTrans2D1" presStyleIdx="1" presStyleCnt="2"/>
       <dgm:spPr/>
+      <dgm:t>
+        <a:bodyPr/>
+        <a:lstStyle/>
+        <a:p>
+          <a:endParaRPr lang="ru-RU"/>
+        </a:p>
+      </dgm:t>
     </dgm:pt>
     <dgm:pt modelId="{8F48EB89-DD03-B04D-B884-839DC6E6CB24}" type="pres">
       <dgm:prSet presAssocID="{60154467-B5BF-564D-B6B1-97BE8CA1C55F}" presName="connectorText" presStyleLbl="sibTrans2D1" presStyleIdx="1" presStyleCnt="2"/>
       <dgm:spPr/>
+      <dgm:t>
+        <a:bodyPr/>
+        <a:lstStyle/>
+        <a:p>
+          <a:endParaRPr lang="ru-RU"/>
+        </a:p>
+      </dgm:t>
     </dgm:pt>
     <dgm:pt modelId="{C941C808-D015-3B4F-939E-364F92A3E6F0}" type="pres">
       <dgm:prSet presAssocID="{10CA4083-CD4E-7D49-AF89-B24671ED1A42}" presName="node" presStyleLbl="node1" presStyleIdx="2" presStyleCnt="3" custScaleY="256522">
@@ -1094,20 +1136,27 @@
         </dgm:presLayoutVars>
       </dgm:prSet>
       <dgm:spPr/>
+      <dgm:t>
+        <a:bodyPr/>
+        <a:lstStyle/>
+        <a:p>
+          <a:endParaRPr lang="ru-RU"/>
+        </a:p>
+      </dgm:t>
     </dgm:pt>
   </dgm:ptLst>
   <dgm:cxnLst>
-    <dgm:cxn modelId="{093C400E-5F37-2547-8C54-C1F52CBBA070}" type="presOf" srcId="{60154467-B5BF-564D-B6B1-97BE8CA1C55F}" destId="{40D2CA6D-50A8-A74F-A2E9-22453F43FB96}" srcOrd="0" destOrd="0" presId="urn:microsoft.com/office/officeart/2005/8/layout/process1"/>
-    <dgm:cxn modelId="{F24B6E14-8625-7B40-8C1B-F6836412D454}" type="presOf" srcId="{10CA4083-CD4E-7D49-AF89-B24671ED1A42}" destId="{C941C808-D015-3B4F-939E-364F92A3E6F0}" srcOrd="0" destOrd="0" presId="urn:microsoft.com/office/officeart/2005/8/layout/process1"/>
+    <dgm:cxn modelId="{7F272494-3BBE-5445-8C1D-66D81AAC1866}" srcId="{BE673A56-5302-2646-A931-B4563F920AA2}" destId="{F1701819-3A2F-8A44-9499-9935EFC5614B}" srcOrd="1" destOrd="0" parTransId="{AD4D22E9-7D19-1F48-B46B-3D931272077D}" sibTransId="{60154467-B5BF-564D-B6B1-97BE8CA1C55F}"/>
     <dgm:cxn modelId="{923D5031-A676-6E45-800C-155CE4DA623A}" type="presOf" srcId="{60154467-B5BF-564D-B6B1-97BE8CA1C55F}" destId="{8F48EB89-DD03-B04D-B884-839DC6E6CB24}" srcOrd="1" destOrd="0" presId="urn:microsoft.com/office/officeart/2005/8/layout/process1"/>
+    <dgm:cxn modelId="{F1DD46A0-6B5D-824E-B2E0-75ABA82E2CA3}" srcId="{BE673A56-5302-2646-A931-B4563F920AA2}" destId="{10CA4083-CD4E-7D49-AF89-B24671ED1A42}" srcOrd="2" destOrd="0" parTransId="{156EA72E-6EA4-834D-A772-EE6731484063}" sibTransId="{960F0342-972B-864C-B472-7A1273F82461}"/>
+    <dgm:cxn modelId="{CBAA2989-0974-2B44-AA6E-C280DEB63641}" type="presOf" srcId="{F1701819-3A2F-8A44-9499-9935EFC5614B}" destId="{0215057D-1011-9141-8AB3-721FA6ACC70D}" srcOrd="0" destOrd="0" presId="urn:microsoft.com/office/officeart/2005/8/layout/process1"/>
     <dgm:cxn modelId="{2B2EF439-74D0-AC4E-B6A6-E1CE9F47CC93}" type="presOf" srcId="{B3469028-716C-8B49-8C22-B413E070994C}" destId="{D554ED56-22DA-A74E-807B-C8CA1903140E}" srcOrd="0" destOrd="0" presId="urn:microsoft.com/office/officeart/2005/8/layout/process1"/>
     <dgm:cxn modelId="{DEDB0370-F0D4-2246-BB0B-0896EF04B9B9}" type="presOf" srcId="{48ABCE8D-ED8E-C148-B5EF-4CA47EF3F851}" destId="{D1F2C96C-5B61-BC4E-8C9D-D6AD7E359E53}" srcOrd="1" destOrd="0" presId="urn:microsoft.com/office/officeart/2005/8/layout/process1"/>
-    <dgm:cxn modelId="{CBAA2989-0974-2B44-AA6E-C280DEB63641}" type="presOf" srcId="{F1701819-3A2F-8A44-9499-9935EFC5614B}" destId="{0215057D-1011-9141-8AB3-721FA6ACC70D}" srcOrd="0" destOrd="0" presId="urn:microsoft.com/office/officeart/2005/8/layout/process1"/>
-    <dgm:cxn modelId="{7F272494-3BBE-5445-8C1D-66D81AAC1866}" srcId="{BE673A56-5302-2646-A931-B4563F920AA2}" destId="{F1701819-3A2F-8A44-9499-9935EFC5614B}" srcOrd="1" destOrd="0" parTransId="{AD4D22E9-7D19-1F48-B46B-3D931272077D}" sibTransId="{60154467-B5BF-564D-B6B1-97BE8CA1C55F}"/>
-    <dgm:cxn modelId="{F1DD46A0-6B5D-824E-B2E0-75ABA82E2CA3}" srcId="{BE673A56-5302-2646-A931-B4563F920AA2}" destId="{10CA4083-CD4E-7D49-AF89-B24671ED1A42}" srcOrd="2" destOrd="0" parTransId="{156EA72E-6EA4-834D-A772-EE6731484063}" sibTransId="{960F0342-972B-864C-B472-7A1273F82461}"/>
+    <dgm:cxn modelId="{CBCE28DC-3436-0D43-A541-5EBF00835ED9}" type="presOf" srcId="{BE673A56-5302-2646-A931-B4563F920AA2}" destId="{EC167190-A553-5447-BF03-2130DABA2344}" srcOrd="0" destOrd="0" presId="urn:microsoft.com/office/officeart/2005/8/layout/process1"/>
+    <dgm:cxn modelId="{F24B6E14-8625-7B40-8C1B-F6836412D454}" type="presOf" srcId="{10CA4083-CD4E-7D49-AF89-B24671ED1A42}" destId="{C941C808-D015-3B4F-939E-364F92A3E6F0}" srcOrd="0" destOrd="0" presId="urn:microsoft.com/office/officeart/2005/8/layout/process1"/>
+    <dgm:cxn modelId="{093C400E-5F37-2547-8C54-C1F52CBBA070}" type="presOf" srcId="{60154467-B5BF-564D-B6B1-97BE8CA1C55F}" destId="{40D2CA6D-50A8-A74F-A2E9-22453F43FB96}" srcOrd="0" destOrd="0" presId="urn:microsoft.com/office/officeart/2005/8/layout/process1"/>
+    <dgm:cxn modelId="{20EC75B0-1DE0-574E-B8E7-44653CF405EB}" srcId="{BE673A56-5302-2646-A931-B4563F920AA2}" destId="{B3469028-716C-8B49-8C22-B413E070994C}" srcOrd="0" destOrd="0" parTransId="{3E83B87B-0B81-2B4D-8E46-BB329B32696C}" sibTransId="{48ABCE8D-ED8E-C148-B5EF-4CA47EF3F851}"/>
     <dgm:cxn modelId="{C93DD8AA-5753-8049-B8F7-93A166ED778F}" type="presOf" srcId="{48ABCE8D-ED8E-C148-B5EF-4CA47EF3F851}" destId="{FDBC50BA-5B0B-D840-9875-0BB27D476504}" srcOrd="0" destOrd="0" presId="urn:microsoft.com/office/officeart/2005/8/layout/process1"/>
-    <dgm:cxn modelId="{20EC75B0-1DE0-574E-B8E7-44653CF405EB}" srcId="{BE673A56-5302-2646-A931-B4563F920AA2}" destId="{B3469028-716C-8B49-8C22-B413E070994C}" srcOrd="0" destOrd="0" parTransId="{3E83B87B-0B81-2B4D-8E46-BB329B32696C}" sibTransId="{48ABCE8D-ED8E-C148-B5EF-4CA47EF3F851}"/>
-    <dgm:cxn modelId="{CBCE28DC-3436-0D43-A541-5EBF00835ED9}" type="presOf" srcId="{BE673A56-5302-2646-A931-B4563F920AA2}" destId="{EC167190-A553-5447-BF03-2130DABA2344}" srcOrd="0" destOrd="0" presId="urn:microsoft.com/office/officeart/2005/8/layout/process1"/>
     <dgm:cxn modelId="{2AE33AE5-91B3-494C-94FE-39436A28CF64}" type="presParOf" srcId="{EC167190-A553-5447-BF03-2130DABA2344}" destId="{D554ED56-22DA-A74E-807B-C8CA1903140E}" srcOrd="0" destOrd="0" presId="urn:microsoft.com/office/officeart/2005/8/layout/process1"/>
     <dgm:cxn modelId="{018A6943-F753-3442-87B8-FFF1B1F6F768}" type="presParOf" srcId="{EC167190-A553-5447-BF03-2130DABA2344}" destId="{FDBC50BA-5B0B-D840-9875-0BB27D476504}" srcOrd="1" destOrd="0" presId="urn:microsoft.com/office/officeart/2005/8/layout/process1"/>
     <dgm:cxn modelId="{09467641-2CC1-A14B-BF10-55EED5E30F64}" type="presParOf" srcId="{FDBC50BA-5B0B-D840-9875-0BB27D476504}" destId="{D1F2C96C-5B61-BC4E-8C9D-D6AD7E359E53}" srcOrd="0" destOrd="0" presId="urn:microsoft.com/office/officeart/2005/8/layout/process1"/>
@@ -1191,7 +1240,7 @@
         </a:bodyPr>
         <a:lstStyle/>
         <a:p>
-          <a:pPr marL="0" lvl="0" indent="0" algn="ctr" defTabSz="800100">
+          <a:pPr lvl="0" algn="ctr" defTabSz="800100" rtl="0">
             <a:lnSpc>
               <a:spcPct val="90000"/>
             </a:lnSpc>
@@ -1201,16 +1250,15 @@
             <a:spcAft>
               <a:spcPct val="35000"/>
             </a:spcAft>
-            <a:buNone/>
           </a:pPr>
           <a:r>
-            <a:rPr lang="en-US" sz="1800" kern="1200" dirty="0" err="1"/>
+            <a:rPr lang="ru-Ru" sz="1800" b="0" i="0" u="none" kern="1200" baseline="0"/>
             <a:t>configtx.yaml</a:t>
           </a:r>
-          <a:endParaRPr lang="en-US" sz="1800" kern="1200" dirty="0"/>
+          <a:endParaRPr lang="ru-Ru" sz="1800" kern="1200" dirty="0"/>
         </a:p>
         <a:p>
-          <a:pPr marL="0" lvl="0" indent="0" algn="ctr" defTabSz="800100">
+          <a:pPr lvl="0" defTabSz="800100">
             <a:lnSpc>
               <a:spcPct val="90000"/>
             </a:lnSpc>
@@ -1220,12 +1268,11 @@
             <a:spcAft>
               <a:spcPct val="35000"/>
             </a:spcAft>
-            <a:buNone/>
           </a:pPr>
-          <a:endParaRPr lang="en-US" sz="1800" kern="1200" dirty="0"/>
+          <a:endParaRPr lang="ru-Ru" sz="1800" kern="1200" dirty="0"/>
         </a:p>
         <a:p>
-          <a:pPr marL="0" lvl="0" indent="0" algn="ctr" defTabSz="800100">
+          <a:pPr lvl="0" defTabSz="800100">
             <a:lnSpc>
               <a:spcPct val="90000"/>
             </a:lnSpc>
@@ -1235,12 +1282,11 @@
             <a:spcAft>
               <a:spcPct val="35000"/>
             </a:spcAft>
-            <a:buNone/>
           </a:pPr>
-          <a:endParaRPr lang="en-US" sz="1800" kern="1200" dirty="0"/>
+          <a:endParaRPr lang="ru-Ru" sz="1800" kern="1200" dirty="0"/>
         </a:p>
         <a:p>
-          <a:pPr marL="0" lvl="0" indent="0" algn="ctr" defTabSz="800100">
+          <a:pPr lvl="0" defTabSz="800100">
             <a:lnSpc>
               <a:spcPct val="90000"/>
             </a:lnSpc>
@@ -1250,12 +1296,11 @@
             <a:spcAft>
               <a:spcPct val="35000"/>
             </a:spcAft>
-            <a:buNone/>
           </a:pPr>
-          <a:endParaRPr lang="en-US" sz="1800" kern="1200" dirty="0"/>
+          <a:endParaRPr lang="ru-Ru" sz="1800" kern="1200" dirty="0"/>
         </a:p>
         <a:p>
-          <a:pPr marL="0" lvl="0" indent="0" algn="ctr" defTabSz="800100">
+          <a:pPr lvl="0" defTabSz="800100">
             <a:lnSpc>
               <a:spcPct val="90000"/>
             </a:lnSpc>
@@ -1265,12 +1310,11 @@
             <a:spcAft>
               <a:spcPct val="35000"/>
             </a:spcAft>
-            <a:buNone/>
           </a:pPr>
-          <a:endParaRPr lang="en-US" sz="1800" kern="1200" dirty="0"/>
+          <a:endParaRPr lang="ru-Ru" sz="1800" kern="1200" dirty="0"/>
         </a:p>
         <a:p>
-          <a:pPr marL="0" lvl="0" indent="0" algn="ctr" defTabSz="800100">
+          <a:pPr lvl="0" defTabSz="800100">
             <a:lnSpc>
               <a:spcPct val="90000"/>
             </a:lnSpc>
@@ -1280,12 +1324,11 @@
             <a:spcAft>
               <a:spcPct val="35000"/>
             </a:spcAft>
-            <a:buNone/>
           </a:pPr>
-          <a:endParaRPr lang="en-US" sz="1800" kern="1200" dirty="0"/>
+          <a:endParaRPr lang="ru-Ru" sz="1800" kern="1200" dirty="0"/>
         </a:p>
         <a:p>
-          <a:pPr marL="0" lvl="0" indent="0" algn="ctr" defTabSz="800100">
+          <a:pPr lvl="0" defTabSz="800100">
             <a:lnSpc>
               <a:spcPct val="90000"/>
             </a:lnSpc>
@@ -1295,12 +1338,11 @@
             <a:spcAft>
               <a:spcPct val="35000"/>
             </a:spcAft>
-            <a:buNone/>
           </a:pPr>
-          <a:endParaRPr lang="en-US" sz="1800" kern="1200" dirty="0"/>
+          <a:endParaRPr lang="ru-Ru" sz="1800" kern="1200" dirty="0"/>
         </a:p>
         <a:p>
-          <a:pPr marL="0" lvl="0" indent="0" algn="ctr" defTabSz="800100">
+          <a:pPr lvl="0" defTabSz="800100">
             <a:lnSpc>
               <a:spcPct val="90000"/>
             </a:lnSpc>
@@ -1310,12 +1352,11 @@
             <a:spcAft>
               <a:spcPct val="35000"/>
             </a:spcAft>
-            <a:buNone/>
           </a:pPr>
-          <a:endParaRPr lang="en-US" sz="1800" kern="1200" dirty="0"/>
+          <a:endParaRPr lang="ru-Ru" sz="1800" kern="1200" dirty="0"/>
         </a:p>
         <a:p>
-          <a:pPr marL="0" lvl="0" indent="0" algn="ctr" defTabSz="800100">
+          <a:pPr lvl="0" defTabSz="800100">
             <a:lnSpc>
               <a:spcPct val="90000"/>
             </a:lnSpc>
@@ -1325,9 +1366,8 @@
             <a:spcAft>
               <a:spcPct val="35000"/>
             </a:spcAft>
-            <a:buNone/>
           </a:pPr>
-          <a:endParaRPr lang="en-US" sz="1800" kern="1200" dirty="0"/>
+          <a:endParaRPr lang="ru-Ru" sz="1800" kern="1200" dirty="0"/>
         </a:p>
       </dsp:txBody>
       <dsp:txXfrm>
@@ -1385,7 +1425,7 @@
         </a:bodyPr>
         <a:lstStyle/>
         <a:p>
-          <a:pPr marL="0" lvl="0" indent="0" algn="ctr" defTabSz="666750">
+          <a:pPr lvl="0" algn="ctr" defTabSz="666750">
             <a:lnSpc>
               <a:spcPct val="90000"/>
             </a:lnSpc>
@@ -1395,9 +1435,8 @@
             <a:spcAft>
               <a:spcPct val="35000"/>
             </a:spcAft>
-            <a:buNone/>
           </a:pPr>
-          <a:endParaRPr lang="en-US" sz="1500" kern="1200"/>
+          <a:endParaRPr lang="ru-Ru" sz="1500" kern="1200"/>
         </a:p>
       </dsp:txBody>
       <dsp:txXfrm>
@@ -1462,7 +1501,7 @@
         </a:bodyPr>
         <a:lstStyle/>
         <a:p>
-          <a:pPr marL="0" lvl="0" indent="0" algn="ctr" defTabSz="800100">
+          <a:pPr lvl="0" algn="ctr" defTabSz="800100" rtl="0">
             <a:lnSpc>
               <a:spcPct val="90000"/>
             </a:lnSpc>
@@ -1472,19 +1511,14 @@
             <a:spcAft>
               <a:spcPct val="35000"/>
             </a:spcAft>
-            <a:buNone/>
           </a:pPr>
           <a:r>
-            <a:rPr lang="en-US" sz="1800" kern="1200" dirty="0" err="1"/>
-            <a:t>configtxgen</a:t>
-          </a:r>
-          <a:r>
-            <a:rPr lang="en-US" sz="1800" kern="1200" dirty="0"/>
-            <a:t> tool</a:t>
+            <a:rPr lang="ru-Ru" sz="1800" b="0" i="0" u="none" kern="1200" baseline="0"/>
+            <a:t>инструмент configtxgen</a:t>
           </a:r>
         </a:p>
         <a:p>
-          <a:pPr marL="0" lvl="0" indent="0" algn="ctr" defTabSz="800100">
+          <a:pPr lvl="0" defTabSz="800100">
             <a:lnSpc>
               <a:spcPct val="90000"/>
             </a:lnSpc>
@@ -1494,9 +1528,8 @@
             <a:spcAft>
               <a:spcPct val="35000"/>
             </a:spcAft>
-            <a:buNone/>
           </a:pPr>
-          <a:endParaRPr lang="en-US" sz="1800" kern="1200" dirty="0"/>
+          <a:endParaRPr lang="ru-Ru" sz="1800" kern="1200" dirty="0"/>
         </a:p>
       </dsp:txBody>
       <dsp:txXfrm>
@@ -1554,7 +1587,7 @@
         </a:bodyPr>
         <a:lstStyle/>
         <a:p>
-          <a:pPr marL="0" lvl="0" indent="0" algn="ctr" defTabSz="666750">
+          <a:pPr lvl="0" algn="ctr" defTabSz="666750">
             <a:lnSpc>
               <a:spcPct val="90000"/>
             </a:lnSpc>
@@ -1564,9 +1597,8 @@
             <a:spcAft>
               <a:spcPct val="35000"/>
             </a:spcAft>
-            <a:buNone/>
           </a:pPr>
-          <a:endParaRPr lang="en-US" sz="1500" kern="1200"/>
+          <a:endParaRPr lang="ru-Ru" sz="1500" kern="1200"/>
         </a:p>
       </dsp:txBody>
       <dsp:txXfrm>
@@ -1631,7 +1663,7 @@
         </a:bodyPr>
         <a:lstStyle/>
         <a:p>
-          <a:pPr marL="0" lvl="0" indent="0" algn="ctr" defTabSz="800100">
+          <a:pPr lvl="0" algn="ctr" defTabSz="800100" rtl="0">
             <a:lnSpc>
               <a:spcPct val="90000"/>
             </a:lnSpc>
@@ -1641,16 +1673,15 @@
             <a:spcAft>
               <a:spcPct val="35000"/>
             </a:spcAft>
-            <a:buNone/>
           </a:pPr>
           <a:r>
-            <a:rPr lang="en-US" sz="1800" kern="1200" dirty="0" err="1"/>
-            <a:t>genesis.block</a:t>
+            <a:rPr lang="ru-Ru" sz="1800" b="0" i="0" u="none" kern="1200" baseline="0"/>
+            <a:t>первичный блок genesis.block</a:t>
           </a:r>
-          <a:endParaRPr lang="en-US" sz="1800" kern="1200" dirty="0"/>
+          <a:endParaRPr lang="ru-Ru" sz="1800" kern="1200" dirty="0"/>
         </a:p>
         <a:p>
-          <a:pPr marL="0" lvl="0" indent="0" algn="ctr" defTabSz="800100">
+          <a:pPr lvl="0" defTabSz="800100">
             <a:lnSpc>
               <a:spcPct val="90000"/>
             </a:lnSpc>
@@ -1660,12 +1691,11 @@
             <a:spcAft>
               <a:spcPct val="35000"/>
             </a:spcAft>
-            <a:buNone/>
           </a:pPr>
-          <a:endParaRPr lang="en-US" sz="1800" kern="1200" dirty="0"/>
+          <a:endParaRPr lang="ru-Ru" sz="1800" kern="1200" dirty="0"/>
         </a:p>
         <a:p>
-          <a:pPr marL="0" lvl="0" indent="0" algn="ctr" defTabSz="800100">
+          <a:pPr lvl="0" defTabSz="800100">
             <a:lnSpc>
               <a:spcPct val="90000"/>
             </a:lnSpc>
@@ -1675,12 +1705,11 @@
             <a:spcAft>
               <a:spcPct val="35000"/>
             </a:spcAft>
-            <a:buNone/>
           </a:pPr>
-          <a:endParaRPr lang="en-US" sz="1800" kern="1200" dirty="0"/>
+          <a:endParaRPr lang="ru-Ru" sz="1800" kern="1200" dirty="0"/>
         </a:p>
         <a:p>
-          <a:pPr marL="0" lvl="0" indent="0" algn="ctr" defTabSz="800100">
+          <a:pPr lvl="0" defTabSz="800100">
             <a:lnSpc>
               <a:spcPct val="90000"/>
             </a:lnSpc>
@@ -1690,12 +1719,11 @@
             <a:spcAft>
               <a:spcPct val="35000"/>
             </a:spcAft>
-            <a:buNone/>
           </a:pPr>
-          <a:endParaRPr lang="en-US" sz="1800" kern="1200" dirty="0"/>
+          <a:endParaRPr lang="ru-Ru" sz="1800" kern="1200" dirty="0"/>
         </a:p>
         <a:p>
-          <a:pPr marL="0" lvl="0" indent="0" algn="ctr" defTabSz="800100">
+          <a:pPr lvl="0" defTabSz="800100">
             <a:lnSpc>
               <a:spcPct val="90000"/>
             </a:lnSpc>
@@ -1705,12 +1733,11 @@
             <a:spcAft>
               <a:spcPct val="35000"/>
             </a:spcAft>
-            <a:buNone/>
           </a:pPr>
-          <a:endParaRPr lang="en-US" sz="1800" kern="1200" dirty="0"/>
+          <a:endParaRPr lang="ru-Ru" sz="1800" kern="1200" dirty="0"/>
         </a:p>
         <a:p>
-          <a:pPr marL="0" lvl="0" indent="0" algn="ctr" defTabSz="800100">
+          <a:pPr lvl="0" defTabSz="800100">
             <a:lnSpc>
               <a:spcPct val="90000"/>
             </a:lnSpc>
@@ -1720,12 +1747,11 @@
             <a:spcAft>
               <a:spcPct val="35000"/>
             </a:spcAft>
-            <a:buNone/>
           </a:pPr>
-          <a:endParaRPr lang="en-US" sz="1800" kern="1200" dirty="0"/>
+          <a:endParaRPr lang="ru-Ru" sz="1800" kern="1200" dirty="0"/>
         </a:p>
         <a:p>
-          <a:pPr marL="0" lvl="0" indent="0" algn="ctr" defTabSz="800100">
+          <a:pPr lvl="0" defTabSz="800100">
             <a:lnSpc>
               <a:spcPct val="90000"/>
             </a:lnSpc>
@@ -1735,12 +1761,11 @@
             <a:spcAft>
               <a:spcPct val="35000"/>
             </a:spcAft>
-            <a:buNone/>
           </a:pPr>
-          <a:endParaRPr lang="en-US" sz="1800" kern="1200" dirty="0"/>
+          <a:endParaRPr lang="ru-Ru" sz="1800" kern="1200" dirty="0"/>
         </a:p>
         <a:p>
-          <a:pPr marL="0" lvl="0" indent="0" algn="ctr" defTabSz="800100">
+          <a:pPr lvl="0" defTabSz="800100">
             <a:lnSpc>
               <a:spcPct val="90000"/>
             </a:lnSpc>
@@ -1750,12 +1775,11 @@
             <a:spcAft>
               <a:spcPct val="35000"/>
             </a:spcAft>
-            <a:buNone/>
           </a:pPr>
-          <a:endParaRPr lang="en-US" sz="1800" kern="1200" dirty="0"/>
+          <a:endParaRPr lang="ru-Ru" sz="1800" kern="1200" dirty="0"/>
         </a:p>
         <a:p>
-          <a:pPr marL="0" lvl="0" indent="0" algn="ctr" defTabSz="800100">
+          <a:pPr lvl="0" defTabSz="800100">
             <a:lnSpc>
               <a:spcPct val="90000"/>
             </a:lnSpc>
@@ -1765,12 +1789,11 @@
             <a:spcAft>
               <a:spcPct val="35000"/>
             </a:spcAft>
-            <a:buNone/>
           </a:pPr>
-          <a:endParaRPr lang="en-US" sz="1800" kern="1200" dirty="0"/>
+          <a:endParaRPr lang="ru-Ru" sz="1800" kern="1200" dirty="0"/>
         </a:p>
         <a:p>
-          <a:pPr marL="0" lvl="0" indent="0" algn="ctr" defTabSz="800100">
+          <a:pPr lvl="0" defTabSz="800100">
             <a:lnSpc>
               <a:spcPct val="90000"/>
             </a:lnSpc>
@@ -1780,12 +1803,11 @@
             <a:spcAft>
               <a:spcPct val="35000"/>
             </a:spcAft>
-            <a:buNone/>
           </a:pPr>
-          <a:endParaRPr lang="en-US" sz="1800" kern="1200" dirty="0"/>
+          <a:endParaRPr lang="ru-Ru" sz="1800" kern="1200" dirty="0"/>
         </a:p>
         <a:p>
-          <a:pPr marL="0" lvl="0" indent="0" algn="ctr" defTabSz="800100">
+          <a:pPr lvl="0" algn="ctr" defTabSz="800100" rtl="0">
             <a:lnSpc>
               <a:spcPct val="90000"/>
             </a:lnSpc>
@@ -1795,10 +1817,9 @@
             <a:spcAft>
               <a:spcPct val="35000"/>
             </a:spcAft>
-            <a:buNone/>
           </a:pPr>
           <a:r>
-            <a:rPr lang="en-US" sz="1800" kern="1200" dirty="0"/>
+            <a:rPr lang="ru-Ru" sz="1800" b="0" i="0" u="none" kern="1200" baseline="0"/>
             <a:t> </a:t>
           </a:r>
         </a:p>
@@ -3139,7 +3160,7 @@
           <a:p>
             <a:fld id="{56AAEC7F-4E29-6542-B6A8-2778CF3AB49D}" type="datetimeFigureOut">
               <a:rPr lang="en-US" smtClean="0"/>
-              <a:t>4/19/19</a:t>
+              <a:t>12/10/2020</a:t>
             </a:fld>
             <a:endParaRPr lang="en-US"/>
           </a:p>
@@ -3337,7 +3358,7 @@
           <a:p>
             <a:fld id="{56AAEC7F-4E29-6542-B6A8-2778CF3AB49D}" type="datetimeFigureOut">
               <a:rPr lang="en-US" smtClean="0"/>
-              <a:t>4/19/19</a:t>
+              <a:t>12/10/2020</a:t>
             </a:fld>
             <a:endParaRPr lang="en-US"/>
           </a:p>
@@ -3545,7 +3566,7 @@
           <a:p>
             <a:fld id="{56AAEC7F-4E29-6542-B6A8-2778CF3AB49D}" type="datetimeFigureOut">
               <a:rPr lang="en-US" smtClean="0"/>
-              <a:t>4/19/19</a:t>
+              <a:t>12/10/2020</a:t>
             </a:fld>
             <a:endParaRPr lang="en-US"/>
           </a:p>
@@ -3743,7 +3764,7 @@
           <a:p>
             <a:fld id="{56AAEC7F-4E29-6542-B6A8-2778CF3AB49D}" type="datetimeFigureOut">
               <a:rPr lang="en-US" smtClean="0"/>
-              <a:t>4/19/19</a:t>
+              <a:t>12/10/2020</a:t>
             </a:fld>
             <a:endParaRPr lang="en-US"/>
           </a:p>
@@ -4018,7 +4039,7 @@
           <a:p>
             <a:fld id="{56AAEC7F-4E29-6542-B6A8-2778CF3AB49D}" type="datetimeFigureOut">
               <a:rPr lang="en-US" smtClean="0"/>
-              <a:t>4/19/19</a:t>
+              <a:t>12/10/2020</a:t>
             </a:fld>
             <a:endParaRPr lang="en-US"/>
           </a:p>
@@ -4283,7 +4304,7 @@
           <a:p>
             <a:fld id="{56AAEC7F-4E29-6542-B6A8-2778CF3AB49D}" type="datetimeFigureOut">
               <a:rPr lang="en-US" smtClean="0"/>
-              <a:t>4/19/19</a:t>
+              <a:t>12/10/2020</a:t>
             </a:fld>
             <a:endParaRPr lang="en-US"/>
           </a:p>
@@ -4695,7 +4716,7 @@
           <a:p>
             <a:fld id="{56AAEC7F-4E29-6542-B6A8-2778CF3AB49D}" type="datetimeFigureOut">
               <a:rPr lang="en-US" smtClean="0"/>
-              <a:t>4/19/19</a:t>
+              <a:t>12/10/2020</a:t>
             </a:fld>
             <a:endParaRPr lang="en-US"/>
           </a:p>
@@ -4836,7 +4857,7 @@
           <a:p>
             <a:fld id="{56AAEC7F-4E29-6542-B6A8-2778CF3AB49D}" type="datetimeFigureOut">
               <a:rPr lang="en-US" smtClean="0"/>
-              <a:t>4/19/19</a:t>
+              <a:t>12/10/2020</a:t>
             </a:fld>
             <a:endParaRPr lang="en-US"/>
           </a:p>
@@ -4949,7 +4970,7 @@
           <a:p>
             <a:fld id="{56AAEC7F-4E29-6542-B6A8-2778CF3AB49D}" type="datetimeFigureOut">
               <a:rPr lang="en-US" smtClean="0"/>
-              <a:t>4/19/19</a:t>
+              <a:t>12/10/2020</a:t>
             </a:fld>
             <a:endParaRPr lang="en-US"/>
           </a:p>
@@ -5260,7 +5281,7 @@
           <a:p>
             <a:fld id="{56AAEC7F-4E29-6542-B6A8-2778CF3AB49D}" type="datetimeFigureOut">
               <a:rPr lang="en-US" smtClean="0"/>
-              <a:t>4/19/19</a:t>
+              <a:t>12/10/2020</a:t>
             </a:fld>
             <a:endParaRPr lang="en-US"/>
           </a:p>
@@ -5548,7 +5569,7 @@
           <a:p>
             <a:fld id="{56AAEC7F-4E29-6542-B6A8-2778CF3AB49D}" type="datetimeFigureOut">
               <a:rPr lang="en-US" smtClean="0"/>
-              <a:t>4/19/19</a:t>
+              <a:t>12/10/2020</a:t>
             </a:fld>
             <a:endParaRPr lang="en-US"/>
           </a:p>
@@ -5789,7 +5810,7 @@
           <a:p>
             <a:fld id="{56AAEC7F-4E29-6542-B6A8-2778CF3AB49D}" type="datetimeFigureOut">
               <a:rPr lang="en-US" smtClean="0"/>
-              <a:t>4/19/19</a:t>
+              <a:t>12/10/2020</a:t>
             </a:fld>
             <a:endParaRPr lang="en-US"/>
           </a:p>
@@ -6268,7 +6289,7 @@
                         <a:tabLst/>
                         <a:defRPr/>
                       </a:pPr>
-                      <a:endParaRPr lang="en-US" sz="1400" b="1" dirty="0"/>
+                      <a:endParaRPr lang="ru-Ru" sz="1400" b="1" dirty="0"/>
                     </a:p>
                   </a:txBody>
                   <a:tcPr>
@@ -6322,29 +6343,29 @@
                     <a:bodyPr/>
                     <a:lstStyle/>
                     <a:p>
-                      <a:endParaRPr lang="en-US" sz="1400" dirty="0"/>
+                      <a:endParaRPr lang="ru-Ru" sz="1400" dirty="0"/>
                     </a:p>
                     <a:p>
-                      <a:endParaRPr lang="en-US" sz="1400" dirty="0"/>
+                      <a:endParaRPr lang="ru-Ru" sz="1400" dirty="0"/>
                     </a:p>
                     <a:p>
-                      <a:pPr marL="0" indent="0" algn="ctr">
+                      <a:pPr marL="0" indent="0" algn="ctr" rtl="0">
                         <a:buFont typeface="Arial" panose="020B0604020202020204" pitchFamily="34" charset="0"/>
                         <a:buNone/>
                         <a:tabLst/>
                       </a:pPr>
                       <a:r>
-                        <a:rPr lang="en-US" sz="2800" b="1" dirty="0"/>
-                        <a:t>System Channel</a:t>
+                        <a:rPr lang="ru-Ru" sz="2800" b="1" i="0" u="none" baseline="0"/>
+                        <a:t>Системный канал</a:t>
                       </a:r>
                     </a:p>
                     <a:p>
-                      <a:pPr marL="0" indent="0" algn="ctr">
+                      <a:pPr marL="0" indent="0" algn="ctr" rtl="0">
                         <a:buFont typeface="Arial" panose="020B0604020202020204" pitchFamily="34" charset="0"/>
                         <a:buNone/>
                         <a:tabLst/>
                       </a:pPr>
-                      <a:endParaRPr lang="en-US" dirty="0"/>
+                      <a:endParaRPr lang="ru-Ru" dirty="0"/>
                     </a:p>
                   </a:txBody>
                   <a:tcPr>
@@ -6421,7 +6442,7 @@
                         <a:tabLst/>
                         <a:defRPr/>
                       </a:pPr>
-                      <a:endParaRPr lang="en-US" sz="1400" b="1" dirty="0"/>
+                      <a:endParaRPr lang="ru-Ru" sz="1400" b="1" dirty="0"/>
                     </a:p>
                   </a:txBody>
                   <a:tcPr>
@@ -6492,7 +6513,7 @@
                         <a:tabLst/>
                         <a:defRPr/>
                       </a:pPr>
-                      <a:endParaRPr lang="en-US" sz="1400" dirty="0"/>
+                      <a:endParaRPr lang="ru-Ru" sz="1400" dirty="0"/>
                     </a:p>
                     <a:p>
                       <a:pPr marL="0" marR="0" lvl="0" indent="0" algn="ctr" defTabSz="457200" rtl="0" eaLnBrk="1" fontAlgn="auto" latinLnBrk="0" hangingPunct="1">
@@ -6513,8 +6534,8 @@
                         <a:defRPr/>
                       </a:pPr>
                       <a:r>
-                        <a:rPr lang="en-US" sz="2800" b="1" dirty="0"/>
-                        <a:t>Application Channel</a:t>
+                        <a:rPr lang="ru-Ru" sz="2800" b="1" i="0" u="none" baseline="0"/>
+                        <a:t>Канал приложения</a:t>
                       </a:r>
                     </a:p>
                   </a:txBody>
@@ -6575,8 +6596,8 @@
                     <a:bodyPr/>
                     <a:lstStyle/>
                     <a:p>
-                      <a:pPr algn="ctr"/>
-                      <a:endParaRPr lang="en-US" sz="1400" b="1" dirty="0"/>
+                      <a:pPr algn="ctr" rtl="0"/>
+                      <a:endParaRPr lang="ru-Ru" sz="1400" b="1" dirty="0"/>
                     </a:p>
                   </a:txBody>
                   <a:tcPr>
@@ -6647,7 +6668,7 @@
                         <a:tabLst/>
                         <a:defRPr/>
                       </a:pPr>
-                      <a:endParaRPr lang="en-US" sz="1400" b="1" dirty="0"/>
+                      <a:endParaRPr lang="ru-Ru" sz="1400" b="1" dirty="0"/>
                     </a:p>
                     <a:p>
                       <a:pPr marL="0" marR="0" lvl="0" indent="0" algn="ctr" defTabSz="914400" rtl="0" eaLnBrk="1" fontAlgn="auto" latinLnBrk="0" hangingPunct="1">
@@ -6667,7 +6688,7 @@
                         <a:tabLst/>
                         <a:defRPr/>
                       </a:pPr>
-                      <a:endParaRPr lang="en-US" sz="1400" b="1" dirty="0"/>
+                      <a:endParaRPr lang="ru-Ru" sz="1400" b="1" dirty="0"/>
                     </a:p>
                     <a:p>
                       <a:pPr marL="0" marR="0" lvl="0" indent="0" algn="ctr" defTabSz="914400" rtl="0" eaLnBrk="1" fontAlgn="auto" latinLnBrk="0" hangingPunct="1">
@@ -6688,8 +6709,8 @@
                         <a:defRPr/>
                       </a:pPr>
                       <a:r>
-                        <a:rPr lang="en-US" sz="2800" b="1" dirty="0"/>
-                        <a:t>Access Control Lists (ACLs)  and smart contracts</a:t>
+                        <a:rPr lang="ru-Ru" sz="2800" b="1" i="0" u="none" baseline="0"/>
+                        <a:t>Списки контроля доступа (ACL) и смарт-контракты</a:t>
                       </a:r>
                     </a:p>
                     <a:p>
@@ -6710,7 +6731,7 @@
                         <a:tabLst/>
                         <a:defRPr/>
                       </a:pPr>
-                      <a:endParaRPr lang="en-US" sz="1800" b="1" dirty="0"/>
+                      <a:endParaRPr lang="ru-Ru" sz="1800" b="1" dirty="0"/>
                     </a:p>
                   </a:txBody>
                   <a:tcPr>
@@ -6794,12 +6815,13 @@
           <a:bodyPr/>
           <a:lstStyle/>
           <a:p>
+            <a:pPr algn="r" rtl="0"/>
             <a:fld id="{08BF69C1-739F-1B47-B5E3-FA651BCAB105}" type="slidenum">
-              <a:rPr lang="en-US" smtClean="0"/>
+              <a:rPr/>
               <a:pPr/>
               <a:t>1</a:t>
             </a:fld>
-            <a:endParaRPr lang="en-US"/>
+            <a:endParaRPr lang="ru-Ru"/>
           </a:p>
         </p:txBody>
       </p:sp>
@@ -6993,12 +7015,12 @@
             </a:lvl9pPr>
           </a:lstStyle>
           <a:p>
-            <a:pPr marL="0" indent="0" algn="ctr">
+            <a:pPr marL="0" indent="0" algn="ctr" rtl="0">
               <a:buNone/>
             </a:pPr>
             <a:r>
-              <a:rPr lang="en-US" dirty="0"/>
-              <a:t>Hyperledger Fabric Policy Hierarchy</a:t>
+              <a:rPr lang="ru-Ru" b="0" i="0" u="none" baseline="0"/>
+              <a:t>Иерархия установленных правил Hyperledger Fabric</a:t>
             </a:r>
           </a:p>
         </p:txBody>
@@ -7144,7 +7166,7 @@
                         <a:tabLst/>
                         <a:defRPr/>
                       </a:pPr>
-                      <a:endParaRPr lang="en-US" sz="1400" b="1" dirty="0"/>
+                      <a:endParaRPr lang="ru-Ru" sz="1400" b="1" dirty="0"/>
                     </a:p>
                   </a:txBody>
                   <a:tcPr>
@@ -7208,7 +7230,7 @@
                         <a:tabLst/>
                         <a:defRPr/>
                       </a:pPr>
-                      <a:endParaRPr lang="en-US" sz="1400" b="1" dirty="0"/>
+                      <a:endParaRPr lang="ru-Ru" sz="1400" b="1" dirty="0"/>
                     </a:p>
                   </a:txBody>
                   <a:tcPr>
@@ -7272,7 +7294,7 @@
                         <a:tabLst/>
                         <a:defRPr/>
                       </a:pPr>
-                      <a:endParaRPr lang="en-US" sz="1400" b="1" dirty="0"/>
+                      <a:endParaRPr lang="ru-Ru" sz="1400" b="1" dirty="0"/>
                     </a:p>
                   </a:txBody>
                   <a:tcPr>
@@ -7336,7 +7358,7 @@
                         <a:tabLst/>
                         <a:defRPr/>
                       </a:pPr>
-                      <a:endParaRPr lang="en-US" sz="1400" b="1" dirty="0"/>
+                      <a:endParaRPr lang="ru-Ru" sz="1400" b="1" dirty="0"/>
                     </a:p>
                   </a:txBody>
                   <a:tcPr>
@@ -7400,7 +7422,7 @@
                         <a:tabLst/>
                         <a:defRPr/>
                       </a:pPr>
-                      <a:endParaRPr lang="en-US" sz="1400" b="1" dirty="0"/>
+                      <a:endParaRPr lang="ru-Ru" sz="1400" b="1" dirty="0"/>
                     </a:p>
                   </a:txBody>
                   <a:tcPr>
@@ -7464,7 +7486,7 @@
                         <a:tabLst/>
                         <a:defRPr/>
                       </a:pPr>
-                      <a:endParaRPr lang="en-US" sz="1400" b="1" dirty="0"/>
+                      <a:endParaRPr lang="ru-Ru" sz="1400" b="1" dirty="0"/>
                     </a:p>
                   </a:txBody>
                   <a:tcPr>
@@ -7528,7 +7550,7 @@
                         <a:tabLst/>
                         <a:defRPr/>
                       </a:pPr>
-                      <a:endParaRPr lang="en-US" sz="1400" b="1" dirty="0"/>
+                      <a:endParaRPr lang="ru-Ru" sz="1400" b="1" dirty="0"/>
                     </a:p>
                   </a:txBody>
                   <a:tcPr>
@@ -7592,7 +7614,7 @@
                         <a:tabLst/>
                         <a:defRPr/>
                       </a:pPr>
-                      <a:endParaRPr lang="en-US" sz="1400" b="1" dirty="0"/>
+                      <a:endParaRPr lang="ru-Ru" sz="1400" b="1" dirty="0"/>
                     </a:p>
                   </a:txBody>
                   <a:tcPr>
@@ -7663,7 +7685,7 @@
                         <a:tabLst/>
                         <a:defRPr/>
                       </a:pPr>
-                      <a:endParaRPr lang="en-US" sz="1400" b="1" i="1" dirty="0"/>
+                      <a:endParaRPr lang="ru-Ru" sz="1400" b="1" i="1" dirty="0"/>
                     </a:p>
                     <a:p>
                       <a:pPr marL="0" marR="0" lvl="0" indent="0" algn="ctr" defTabSz="914400" rtl="0" eaLnBrk="1" fontAlgn="auto" latinLnBrk="0" hangingPunct="1">
@@ -7684,8 +7706,8 @@
                         <a:defRPr/>
                       </a:pPr>
                       <a:r>
-                        <a:rPr lang="en-US" sz="1400" b="1" i="1" dirty="0"/>
-                        <a:t>Consortium Membership and blockchain structure</a:t>
+                        <a:rPr lang="ru-Ru" sz="1400" b="1" i="1" u="none" baseline="0"/>
+                        <a:t>Членство в консорциуме и структура блокчейна</a:t>
                       </a:r>
                     </a:p>
                   </a:txBody>
@@ -7739,11 +7761,11 @@
                     <a:bodyPr/>
                     <a:lstStyle/>
                     <a:p>
-                      <a:pPr marL="285750" indent="-285750">
+                      <a:pPr marL="285750" indent="-285750" algn="l" rtl="0">
                         <a:buFont typeface="Arial" panose="020B0604020202020204" pitchFamily="34" charset="0"/>
                         <a:buChar char="•"/>
                       </a:pPr>
-                      <a:endParaRPr lang="en-US" sz="1400" dirty="0"/>
+                      <a:endParaRPr lang="ru-Ru" sz="1400" dirty="0"/>
                     </a:p>
                   </a:txBody>
                   <a:tcPr>
@@ -7796,7 +7818,7 @@
                     <a:bodyPr/>
                     <a:lstStyle/>
                     <a:p>
-                      <a:endParaRPr lang="en-US"/>
+                      <a:endParaRPr lang="ru-Ru"/>
                     </a:p>
                   </a:txBody>
                   <a:tcPr/>
@@ -7806,7 +7828,7 @@
                     <a:bodyPr/>
                     <a:lstStyle/>
                     <a:p>
-                      <a:endParaRPr lang="en-US"/>
+                      <a:endParaRPr lang="ru-Ru"/>
                     </a:p>
                   </a:txBody>
                   <a:tcPr/>
@@ -7816,12 +7838,12 @@
                     <a:bodyPr/>
                     <a:lstStyle/>
                     <a:p>
-                      <a:pPr marL="0" indent="0" algn="ctr">
+                      <a:pPr marL="0" indent="0" algn="ctr" rtl="0">
                         <a:buFont typeface="Arial" panose="020B0604020202020204" pitchFamily="34" charset="0"/>
                         <a:buNone/>
                         <a:tabLst/>
                       </a:pPr>
-                      <a:endParaRPr lang="en-US" dirty="0"/>
+                      <a:endParaRPr lang="ru-Ru" dirty="0"/>
                     </a:p>
                   </a:txBody>
                   <a:tcPr>
@@ -7891,7 +7913,7 @@
                         <a:tabLst/>
                         <a:defRPr/>
                       </a:pPr>
-                      <a:endParaRPr lang="en-US" sz="1000" dirty="0"/>
+                      <a:endParaRPr lang="ru-Ru" sz="1000" dirty="0"/>
                     </a:p>
                   </a:txBody>
                   <a:tcPr>
@@ -7956,7 +7978,7 @@
                         <a:tabLst/>
                         <a:defRPr/>
                       </a:pPr>
-                      <a:endParaRPr lang="en-US" sz="1000" dirty="0"/>
+                      <a:endParaRPr lang="ru-Ru" sz="1000" dirty="0"/>
                     </a:p>
                   </a:txBody>
                   <a:tcPr>
@@ -8009,12 +8031,12 @@
                     <a:bodyPr/>
                     <a:lstStyle/>
                     <a:p>
-                      <a:pPr marL="0" indent="0" algn="ctr">
+                      <a:pPr marL="0" indent="0" algn="ctr" rtl="0">
                         <a:buFont typeface="Arial" panose="020B0604020202020204" pitchFamily="34" charset="0"/>
                         <a:buNone/>
                         <a:tabLst/>
                       </a:pPr>
-                      <a:endParaRPr lang="en-US" dirty="0"/>
+                      <a:endParaRPr lang="ru-Ru" dirty="0"/>
                     </a:p>
                   </a:txBody>
                   <a:tcPr>
@@ -8091,7 +8113,7 @@
                         <a:tabLst/>
                         <a:defRPr/>
                       </a:pPr>
-                      <a:endParaRPr lang="en-US" sz="1400" b="1" dirty="0"/>
+                      <a:endParaRPr lang="ru-Ru" sz="1400" b="1" dirty="0"/>
                     </a:p>
                   </a:txBody>
                   <a:tcPr>
@@ -8155,7 +8177,7 @@
                         <a:tabLst/>
                         <a:defRPr/>
                       </a:pPr>
-                      <a:endParaRPr lang="en-US" sz="1400" b="1" dirty="0"/>
+                      <a:endParaRPr lang="ru-Ru" sz="1400" b="1" dirty="0"/>
                     </a:p>
                   </a:txBody>
                   <a:tcPr>
@@ -8219,7 +8241,7 @@
                         <a:tabLst/>
                         <a:defRPr/>
                       </a:pPr>
-                      <a:endParaRPr lang="en-US" sz="1400" b="1" dirty="0"/>
+                      <a:endParaRPr lang="ru-Ru" sz="1400" b="1" dirty="0"/>
                     </a:p>
                   </a:txBody>
                   <a:tcPr>
@@ -8283,7 +8305,7 @@
                         <a:tabLst/>
                         <a:defRPr/>
                       </a:pPr>
-                      <a:endParaRPr lang="en-US" sz="1400" b="1" dirty="0"/>
+                      <a:endParaRPr lang="ru-Ru" sz="1400" b="1" dirty="0"/>
                     </a:p>
                   </a:txBody>
                   <a:tcPr>
@@ -8347,7 +8369,7 @@
                         <a:tabLst/>
                         <a:defRPr/>
                       </a:pPr>
-                      <a:endParaRPr lang="en-US" sz="1400" b="1" dirty="0"/>
+                      <a:endParaRPr lang="ru-Ru" sz="1400" b="1" dirty="0"/>
                     </a:p>
                   </a:txBody>
                   <a:tcPr>
@@ -8411,7 +8433,7 @@
                         <a:tabLst/>
                         <a:defRPr/>
                       </a:pPr>
-                      <a:endParaRPr lang="en-US" sz="1400" b="1" dirty="0"/>
+                      <a:endParaRPr lang="ru-Ru" sz="1400" b="1" dirty="0"/>
                     </a:p>
                   </a:txBody>
                   <a:tcPr>
@@ -8475,7 +8497,7 @@
                         <a:tabLst/>
                         <a:defRPr/>
                       </a:pPr>
-                      <a:endParaRPr lang="en-US" sz="1400" b="1" dirty="0"/>
+                      <a:endParaRPr lang="ru-Ru" sz="1400" b="1" dirty="0"/>
                     </a:p>
                   </a:txBody>
                   <a:tcPr>
@@ -8539,7 +8561,7 @@
                         <a:tabLst/>
                         <a:defRPr/>
                       </a:pPr>
-                      <a:endParaRPr lang="en-US" sz="1400" b="1" dirty="0"/>
+                      <a:endParaRPr lang="ru-Ru" sz="1400" b="1" dirty="0"/>
                     </a:p>
                   </a:txBody>
                   <a:tcPr>
@@ -8610,7 +8632,7 @@
                         <a:tabLst/>
                         <a:defRPr/>
                       </a:pPr>
-                      <a:endParaRPr lang="en-US" sz="1400" b="1" dirty="0"/>
+                      <a:endParaRPr lang="ru-Ru" sz="1400" b="1" dirty="0"/>
                     </a:p>
                     <a:p>
                       <a:pPr marL="0" marR="0" lvl="0" indent="0" algn="ctr" defTabSz="457200" rtl="0" eaLnBrk="1" fontAlgn="auto" latinLnBrk="0" hangingPunct="1">
@@ -8631,8 +8653,8 @@
                         <a:defRPr/>
                       </a:pPr>
                       <a:r>
-                        <a:rPr lang="en-US" sz="1400" b="1" i="1" dirty="0"/>
-                        <a:t>Transaction networks, business logic</a:t>
+                        <a:rPr lang="ru-Ru" sz="1400" b="1" i="1" u="none" baseline="0"/>
+                        <a:t>Сети транзакций, бизнес-логика</a:t>
                       </a:r>
                     </a:p>
                     <a:p>
@@ -8653,7 +8675,7 @@
                         <a:tabLst/>
                         <a:defRPr/>
                       </a:pPr>
-                      <a:endParaRPr lang="en-US" sz="1400" dirty="0"/>
+                      <a:endParaRPr lang="ru-Ru" sz="1400" dirty="0"/>
                     </a:p>
                   </a:txBody>
                   <a:tcPr>
@@ -8723,7 +8745,7 @@
                         <a:tabLst/>
                         <a:defRPr/>
                       </a:pPr>
-                      <a:endParaRPr lang="en-US" sz="1800" b="1" dirty="0"/>
+                      <a:endParaRPr lang="ru-Ru" sz="1800" b="1" dirty="0"/>
                     </a:p>
                   </a:txBody>
                   <a:tcPr>
@@ -8793,7 +8815,7 @@
                         <a:tabLst/>
                         <a:defRPr/>
                       </a:pPr>
-                      <a:endParaRPr lang="en-US" sz="1800" b="1" dirty="0"/>
+                      <a:endParaRPr lang="ru-Ru" sz="1800" b="1" dirty="0"/>
                     </a:p>
                   </a:txBody>
                   <a:tcPr>
@@ -8858,7 +8880,7 @@
                         <a:tabLst/>
                         <a:defRPr/>
                       </a:pPr>
-                      <a:endParaRPr lang="en-US" sz="1800" b="1" dirty="0"/>
+                      <a:endParaRPr lang="ru-Ru" sz="1800" b="1" dirty="0"/>
                     </a:p>
                   </a:txBody>
                   <a:tcPr>
@@ -8906,11 +8928,11 @@
                     <a:bodyPr/>
                     <a:lstStyle/>
                     <a:p>
-                      <a:pPr marL="285750" indent="-285750">
+                      <a:pPr marL="285750" indent="-285750" algn="l" rtl="0">
                         <a:buFont typeface="Arial" panose="020B0604020202020204" pitchFamily="34" charset="0"/>
                         <a:buChar char="•"/>
                       </a:pPr>
-                      <a:endParaRPr lang="en-US" sz="1400" dirty="0"/>
+                      <a:endParaRPr lang="ru-Ru" sz="1400" dirty="0"/>
                     </a:p>
                   </a:txBody>
                   <a:tcPr>
@@ -8963,7 +8985,7 @@
                     <a:bodyPr/>
                     <a:lstStyle/>
                     <a:p>
-                      <a:endParaRPr lang="en-US"/>
+                      <a:endParaRPr lang="ru-Ru"/>
                     </a:p>
                   </a:txBody>
                   <a:tcPr/>
@@ -8973,7 +8995,7 @@
                     <a:bodyPr/>
                     <a:lstStyle/>
                     <a:p>
-                      <a:endParaRPr lang="en-US"/>
+                      <a:endParaRPr lang="ru-Ru"/>
                     </a:p>
                   </a:txBody>
                   <a:tcPr/>
@@ -9000,7 +9022,7 @@
                         <a:tabLst/>
                         <a:defRPr/>
                       </a:pPr>
-                      <a:endParaRPr lang="en-US" sz="1800" b="1" dirty="0"/>
+                      <a:endParaRPr lang="ru-Ru" sz="1800" b="1" dirty="0"/>
                     </a:p>
                   </a:txBody>
                   <a:tcPr>
@@ -9060,8 +9082,8 @@
                     <a:bodyPr/>
                     <a:lstStyle/>
                     <a:p>
-                      <a:pPr algn="ctr"/>
-                      <a:endParaRPr lang="en-US" sz="1400" b="1" dirty="0"/>
+                      <a:pPr algn="ctr" rtl="0"/>
+                      <a:endParaRPr lang="ru-Ru" sz="1400" b="1" dirty="0"/>
                     </a:p>
                   </a:txBody>
                   <a:tcPr>
@@ -9108,8 +9130,8 @@
                     <a:bodyPr/>
                     <a:lstStyle/>
                     <a:p>
-                      <a:pPr algn="ctr"/>
-                      <a:endParaRPr lang="en-US" sz="1400" b="1" dirty="0"/>
+                      <a:pPr algn="ctr" rtl="0"/>
+                      <a:endParaRPr lang="ru-Ru" sz="1400" b="1" dirty="0"/>
                     </a:p>
                   </a:txBody>
                   <a:tcPr>
@@ -9156,8 +9178,8 @@
                     <a:bodyPr/>
                     <a:lstStyle/>
                     <a:p>
-                      <a:pPr algn="ctr"/>
-                      <a:endParaRPr lang="en-US" sz="1400" b="1" dirty="0"/>
+                      <a:pPr algn="ctr" rtl="0"/>
+                      <a:endParaRPr lang="ru-Ru" sz="1400" b="1" dirty="0"/>
                     </a:p>
                   </a:txBody>
                   <a:tcPr>
@@ -9204,8 +9226,8 @@
                     <a:bodyPr/>
                     <a:lstStyle/>
                     <a:p>
-                      <a:pPr algn="ctr"/>
-                      <a:endParaRPr lang="en-US" sz="1400" b="1" dirty="0"/>
+                      <a:pPr algn="ctr" rtl="0"/>
+                      <a:endParaRPr lang="ru-Ru" sz="1400" b="1" dirty="0"/>
                     </a:p>
                   </a:txBody>
                   <a:tcPr>
@@ -9252,8 +9274,8 @@
                     <a:bodyPr/>
                     <a:lstStyle/>
                     <a:p>
-                      <a:pPr algn="ctr"/>
-                      <a:endParaRPr lang="en-US" sz="1400" b="1" dirty="0"/>
+                      <a:pPr algn="ctr" rtl="0"/>
+                      <a:endParaRPr lang="ru-Ru" sz="1400" b="1" dirty="0"/>
                     </a:p>
                   </a:txBody>
                   <a:tcPr>
@@ -9300,7 +9322,7 @@
                     <a:bodyPr/>
                     <a:lstStyle/>
                     <a:p>
-                      <a:endParaRPr lang="en-US"/>
+                      <a:endParaRPr lang="ru-Ru"/>
                     </a:p>
                   </a:txBody>
                   <a:tcPr/>
@@ -9310,8 +9332,8 @@
                     <a:bodyPr/>
                     <a:lstStyle/>
                     <a:p>
-                      <a:pPr algn="ctr"/>
-                      <a:endParaRPr lang="en-US" sz="1400" b="1" dirty="0"/>
+                      <a:pPr algn="ctr" rtl="0"/>
+                      <a:endParaRPr lang="ru-Ru" sz="1400" b="1" dirty="0"/>
                     </a:p>
                   </a:txBody>
                   <a:tcPr>
@@ -9358,8 +9380,8 @@
                     <a:bodyPr/>
                     <a:lstStyle/>
                     <a:p>
-                      <a:pPr algn="ctr"/>
-                      <a:endParaRPr lang="en-US" sz="1400" b="1" dirty="0"/>
+                      <a:pPr algn="ctr" rtl="0"/>
+                      <a:endParaRPr lang="ru-Ru" sz="1400" b="1" dirty="0"/>
                     </a:p>
                   </a:txBody>
                   <a:tcPr>
@@ -9430,7 +9452,7 @@
                         <a:tabLst/>
                         <a:defRPr/>
                       </a:pPr>
-                      <a:endParaRPr lang="en-US" sz="1400" b="1" dirty="0"/>
+                      <a:endParaRPr lang="ru-Ru" sz="1400" b="1" dirty="0"/>
                     </a:p>
                     <a:p>
                       <a:pPr marL="0" marR="0" lvl="0" indent="0" algn="ctr" defTabSz="914400" rtl="0" eaLnBrk="1" fontAlgn="auto" latinLnBrk="0" hangingPunct="1">
@@ -9451,17 +9473,17 @@
                         <a:defRPr/>
                       </a:pPr>
                       <a:r>
-                        <a:rPr lang="en-US" sz="1400" b="1" i="1" dirty="0"/>
-                        <a:t>Transactions, data, and events</a:t>
+                        <a:rPr lang="ru-Ru" sz="1400" b="1" i="1" u="none" baseline="0"/>
+                        <a:t>Транзакции, данные и события</a:t>
                       </a:r>
                     </a:p>
                     <a:p>
-                      <a:pPr marL="0" indent="0" algn="ctr">
+                      <a:pPr marL="0" indent="0" algn="ctr" rtl="0">
                         <a:buFont typeface="Arial" panose="020B0604020202020204" pitchFamily="34" charset="0"/>
                         <a:buNone/>
                         <a:tabLst/>
                       </a:pPr>
-                      <a:endParaRPr lang="en-US" sz="1800" b="1" dirty="0"/>
+                      <a:endParaRPr lang="ru-Ru" sz="1800" b="1" dirty="0"/>
                     </a:p>
                   </a:txBody>
                   <a:tcPr>
@@ -9514,12 +9536,12 @@
                     <a:bodyPr/>
                     <a:lstStyle/>
                     <a:p>
-                      <a:pPr marL="174625" indent="-174625" algn="l">
+                      <a:pPr marL="174625" indent="-174625" algn="l" rtl="0">
                         <a:buFont typeface="Arial" panose="020B0604020202020204" pitchFamily="34" charset="0"/>
                         <a:buChar char="•"/>
                         <a:tabLst/>
                       </a:pPr>
-                      <a:endParaRPr lang="en-US" sz="1800" b="1" dirty="0"/>
+                      <a:endParaRPr lang="ru-Ru" sz="1800" b="1" dirty="0"/>
                     </a:p>
                   </a:txBody>
                   <a:tcPr>
@@ -9572,7 +9594,7 @@
                     <a:bodyPr/>
                     <a:lstStyle/>
                     <a:p>
-                      <a:endParaRPr lang="en-US"/>
+                      <a:endParaRPr lang="ru-Ru"/>
                     </a:p>
                   </a:txBody>
                   <a:tcPr/>
@@ -9582,7 +9604,7 @@
                     <a:bodyPr/>
                     <a:lstStyle/>
                     <a:p>
-                      <a:endParaRPr lang="en-US"/>
+                      <a:endParaRPr lang="ru-Ru"/>
                     </a:p>
                   </a:txBody>
                   <a:tcPr/>
@@ -9609,7 +9631,7 @@
                         <a:tabLst/>
                         <a:defRPr/>
                       </a:pPr>
-                      <a:endParaRPr lang="en-US" sz="1800" b="1" dirty="0"/>
+                      <a:endParaRPr lang="ru-Ru" sz="1800" b="1" dirty="0"/>
                     </a:p>
                   </a:txBody>
                   <a:tcPr>
@@ -9662,7 +9684,7 @@
                     <a:bodyPr/>
                     <a:lstStyle/>
                     <a:p>
-                      <a:endParaRPr lang="en-US"/>
+                      <a:endParaRPr lang="ru-Ru"/>
                     </a:p>
                   </a:txBody>
                   <a:tcPr/>
@@ -9672,7 +9694,7 @@
                     <a:bodyPr/>
                     <a:lstStyle/>
                     <a:p>
-                      <a:endParaRPr lang="en-US"/>
+                      <a:endParaRPr lang="ru-Ru"/>
                     </a:p>
                   </a:txBody>
                   <a:tcPr/>
@@ -9699,7 +9721,7 @@
                         <a:tabLst/>
                         <a:defRPr/>
                       </a:pPr>
-                      <a:endParaRPr lang="en-US" sz="1800" b="1" dirty="0"/>
+                      <a:endParaRPr lang="ru-Ru" sz="1800" b="1" dirty="0"/>
                     </a:p>
                   </a:txBody>
                   <a:tcPr>
@@ -9783,12 +9805,13 @@
           <a:bodyPr/>
           <a:lstStyle/>
           <a:p>
+            <a:pPr algn="r" rtl="0"/>
             <a:fld id="{08BF69C1-739F-1B47-B5E3-FA651BCAB105}" type="slidenum">
-              <a:rPr lang="en-US" smtClean="0"/>
+              <a:rPr/>
               <a:pPr/>
               <a:t>2</a:t>
             </a:fld>
-            <a:endParaRPr lang="en-US"/>
+            <a:endParaRPr lang="ru-Ru"/>
           </a:p>
         </p:txBody>
       </p:sp>
@@ -9808,8 +9831,8 @@
         </p:nvSpPr>
         <p:spPr>
           <a:xfrm>
-            <a:off x="2247607" y="72070"/>
-            <a:ext cx="7138422" cy="571500"/>
+            <a:off x="1913860" y="72070"/>
+            <a:ext cx="8293395" cy="571500"/>
           </a:xfrm>
           <a:prstGeom prst="rect">
             <a:avLst/>
@@ -9982,13 +10005,26 @@
             </a:lvl9pPr>
           </a:lstStyle>
           <a:p>
-            <a:pPr marL="0" indent="0" algn="ctr">
+            <a:pPr marL="0" indent="0" algn="ctr" rtl="0">
               <a:buNone/>
             </a:pPr>
             <a:r>
-              <a:rPr lang="en-US" dirty="0"/>
-              <a:t>Hyperledger Fabric Policy Hierarchy</a:t>
+              <a:rPr lang="ru-Ru" b="0" i="0" u="none" baseline="0" dirty="0"/>
+              <a:t>Иерархия установленных правил </a:t>
             </a:r>
+            <a:r>
+              <a:rPr lang="ru-Ru" b="0" i="0" u="none" baseline="0" dirty="0" err="1"/>
+              <a:t>Hyperledger</a:t>
+            </a:r>
+            <a:r>
+              <a:rPr lang="ru-Ru" b="0" i="0" u="none" baseline="0" dirty="0"/>
+              <a:t> </a:t>
+            </a:r>
+            <a:r>
+              <a:rPr lang="ru-Ru" b="0" i="0" u="none" baseline="0" dirty="0" err="1"/>
+              <a:t>Fabric</a:t>
+            </a:r>
+            <a:endParaRPr lang="ru-Ru" b="0" i="0" u="none" baseline="0" dirty="0"/>
           </a:p>
         </p:txBody>
       </p:sp>
@@ -10020,13 +10056,14 @@
           </a:bodyPr>
           <a:lstStyle/>
           <a:p>
+            <a:pPr algn="l" rtl="0"/>
             <a:r>
-              <a:rPr lang="en-US" b="1" dirty="0"/>
-              <a:t>ACLs and smart contracts</a:t>
+              <a:rPr lang="ru-Ru" b="1" i="0" u="none" baseline="0"/>
+              <a:t>ACL и смарт-контракты</a:t>
             </a:r>
           </a:p>
           <a:p>
-            <a:endParaRPr lang="en-US" dirty="0"/>
+            <a:endParaRPr lang="ru-Ru" dirty="0"/>
           </a:p>
         </p:txBody>
       </p:sp>
@@ -10058,13 +10095,14 @@
           </a:bodyPr>
           <a:lstStyle/>
           <a:p>
+            <a:pPr algn="l" rtl="0"/>
             <a:r>
-              <a:rPr lang="en-US" b="1" dirty="0"/>
-              <a:t>Application Channel</a:t>
+              <a:rPr lang="ru-Ru" b="1" i="0" u="none" baseline="0"/>
+              <a:t>Канал приложения</a:t>
             </a:r>
           </a:p>
           <a:p>
-            <a:endParaRPr lang="en-US" dirty="0"/>
+            <a:endParaRPr lang="ru-Ru" dirty="0"/>
           </a:p>
         </p:txBody>
       </p:sp>
@@ -10083,7 +10121,7 @@
         <p:spPr>
           <a:xfrm>
             <a:off x="5064369" y="643570"/>
-            <a:ext cx="1684301" cy="646331"/>
+            <a:ext cx="2165771" cy="646331"/>
           </a:xfrm>
           <a:prstGeom prst="rect">
             <a:avLst/>
@@ -10096,13 +10134,14 @@
           </a:bodyPr>
           <a:lstStyle/>
           <a:p>
+            <a:pPr algn="l" rtl="0"/>
             <a:r>
-              <a:rPr lang="en-US" b="1" dirty="0"/>
-              <a:t>System Channel</a:t>
+              <a:rPr lang="ru-Ru" b="1" i="0" u="none" baseline="0" dirty="0"/>
+              <a:t>Системный канал</a:t>
             </a:r>
           </a:p>
           <a:p>
-            <a:endParaRPr lang="en-US" dirty="0"/>
+            <a:endParaRPr lang="ru-Ru" dirty="0"/>
           </a:p>
         </p:txBody>
       </p:sp>
@@ -10247,7 +10286,7 @@
                         <a:tabLst/>
                         <a:defRPr/>
                       </a:pPr>
-                      <a:endParaRPr lang="en-US" sz="1400" b="1" dirty="0"/>
+                      <a:endParaRPr lang="ru-Ru" sz="1400" b="1" dirty="0"/>
                     </a:p>
                   </a:txBody>
                   <a:tcPr>
@@ -10311,7 +10350,7 @@
                         <a:tabLst/>
                         <a:defRPr/>
                       </a:pPr>
-                      <a:endParaRPr lang="en-US" sz="1400" b="1" dirty="0"/>
+                      <a:endParaRPr lang="ru-Ru" sz="1400" b="1" dirty="0"/>
                     </a:p>
                   </a:txBody>
                   <a:tcPr>
@@ -10375,7 +10414,7 @@
                         <a:tabLst/>
                         <a:defRPr/>
                       </a:pPr>
-                      <a:endParaRPr lang="en-US" sz="1400" b="1" dirty="0"/>
+                      <a:endParaRPr lang="ru-Ru" sz="1400" b="1" dirty="0"/>
                     </a:p>
                   </a:txBody>
                   <a:tcPr>
@@ -10439,7 +10478,7 @@
                         <a:tabLst/>
                         <a:defRPr/>
                       </a:pPr>
-                      <a:endParaRPr lang="en-US" sz="1400" b="1" dirty="0"/>
+                      <a:endParaRPr lang="ru-Ru" sz="1400" b="1" dirty="0"/>
                     </a:p>
                   </a:txBody>
                   <a:tcPr>
@@ -10503,7 +10542,7 @@
                         <a:tabLst/>
                         <a:defRPr/>
                       </a:pPr>
-                      <a:endParaRPr lang="en-US" sz="1400" b="1" dirty="0"/>
+                      <a:endParaRPr lang="ru-Ru" sz="1400" b="1" dirty="0"/>
                     </a:p>
                   </a:txBody>
                   <a:tcPr>
@@ -10567,7 +10606,7 @@
                         <a:tabLst/>
                         <a:defRPr/>
                       </a:pPr>
-                      <a:endParaRPr lang="en-US" sz="1400" b="1" dirty="0"/>
+                      <a:endParaRPr lang="ru-Ru" sz="1400" b="1" dirty="0"/>
                     </a:p>
                   </a:txBody>
                   <a:tcPr>
@@ -10631,7 +10670,7 @@
                         <a:tabLst/>
                         <a:defRPr/>
                       </a:pPr>
-                      <a:endParaRPr lang="en-US" sz="1400" b="1" dirty="0"/>
+                      <a:endParaRPr lang="ru-Ru" sz="1400" b="1" dirty="0"/>
                     </a:p>
                   </a:txBody>
                   <a:tcPr>
@@ -10695,7 +10734,7 @@
                         <a:tabLst/>
                         <a:defRPr/>
                       </a:pPr>
-                      <a:endParaRPr lang="en-US" sz="1400" b="1" dirty="0"/>
+                      <a:endParaRPr lang="ru-Ru" sz="1400" b="1" dirty="0"/>
                     </a:p>
                   </a:txBody>
                   <a:tcPr>
@@ -10766,7 +10805,7 @@
                         <a:tabLst/>
                         <a:defRPr/>
                       </a:pPr>
-                      <a:endParaRPr lang="en-US" sz="1400" b="1" dirty="0"/>
+                      <a:endParaRPr lang="ru-Ru" sz="1400" b="1" dirty="0"/>
                     </a:p>
                     <a:p>
                       <a:pPr marL="0" marR="0" lvl="0" indent="0" algn="l" defTabSz="914400" rtl="0" eaLnBrk="1" fontAlgn="auto" latinLnBrk="0" hangingPunct="1">
@@ -10787,16 +10826,16 @@
                         <a:defRPr/>
                       </a:pPr>
                       <a:r>
-                        <a:rPr lang="en-US" sz="1400" b="1" dirty="0"/>
-                        <a:t>Consortium Membership and blockchain structure</a:t>
+                        <a:rPr lang="ru-Ru" sz="1400" b="1" i="0" u="none" baseline="0"/>
+                        <a:t>Членство в консорциуме и структура блокчейна</a:t>
                       </a:r>
                     </a:p>
                     <a:p>
-                      <a:pPr marL="0" indent="0">
+                      <a:pPr marL="0" indent="0" algn="l" rtl="0">
                         <a:buFont typeface="Arial" panose="020B0604020202020204" pitchFamily="34" charset="0"/>
                         <a:buNone/>
                       </a:pPr>
-                      <a:endParaRPr lang="en-US" sz="1400" dirty="0"/>
+                      <a:endParaRPr lang="ru-Ru" sz="1400" dirty="0"/>
                     </a:p>
                   </a:txBody>
                   <a:tcPr>
@@ -10849,11 +10888,11 @@
                     <a:bodyPr/>
                     <a:lstStyle/>
                     <a:p>
-                      <a:pPr marL="285750" indent="-285750">
+                      <a:pPr marL="285750" indent="-285750" algn="l" rtl="0">
                         <a:buFont typeface="Arial" panose="020B0604020202020204" pitchFamily="34" charset="0"/>
                         <a:buChar char="•"/>
                       </a:pPr>
-                      <a:endParaRPr lang="en-US" sz="1400" dirty="0"/>
+                      <a:endParaRPr lang="ru-Ru" sz="1400" dirty="0"/>
                     </a:p>
                   </a:txBody>
                   <a:tcPr>
@@ -10906,7 +10945,7 @@
                     <a:bodyPr/>
                     <a:lstStyle/>
                     <a:p>
-                      <a:endParaRPr lang="en-US"/>
+                      <a:endParaRPr lang="ru-Ru"/>
                     </a:p>
                   </a:txBody>
                   <a:tcPr/>
@@ -10916,7 +10955,7 @@
                     <a:bodyPr/>
                     <a:lstStyle/>
                     <a:p>
-                      <a:endParaRPr lang="en-US"/>
+                      <a:endParaRPr lang="ru-Ru"/>
                     </a:p>
                   </a:txBody>
                   <a:tcPr/>
@@ -10926,12 +10965,12 @@
                     <a:bodyPr/>
                     <a:lstStyle/>
                     <a:p>
-                      <a:pPr marL="0" indent="0" algn="ctr">
+                      <a:pPr marL="0" indent="0" algn="ctr" rtl="0">
                         <a:buFont typeface="Arial" panose="020B0604020202020204" pitchFamily="34" charset="0"/>
                         <a:buNone/>
                         <a:tabLst/>
                       </a:pPr>
-                      <a:endParaRPr lang="en-US" dirty="0"/>
+                      <a:endParaRPr lang="ru-Ru" dirty="0"/>
                     </a:p>
                   </a:txBody>
                   <a:tcPr>
@@ -10984,12 +11023,12 @@
                     <a:bodyPr/>
                     <a:lstStyle/>
                     <a:p>
-                      <a:pPr marL="0" indent="0" algn="ctr">
+                      <a:pPr marL="0" indent="0" algn="ctr" rtl="0">
                         <a:buFont typeface="Arial" panose="020B0604020202020204" pitchFamily="34" charset="0"/>
                         <a:buNone/>
                         <a:tabLst/>
                       </a:pPr>
-                      <a:endParaRPr lang="en-US" dirty="0"/>
+                      <a:endParaRPr lang="ru-Ru" dirty="0"/>
                     </a:p>
                   </a:txBody>
                   <a:tcPr>
@@ -11054,7 +11093,7 @@
                         <a:tabLst/>
                         <a:defRPr/>
                       </a:pPr>
-                      <a:endParaRPr lang="en-US" sz="1000" dirty="0"/>
+                      <a:endParaRPr lang="ru-Ru" sz="1000" dirty="0"/>
                     </a:p>
                   </a:txBody>
                   <a:tcPr>
@@ -11107,12 +11146,12 @@
                     <a:bodyPr/>
                     <a:lstStyle/>
                     <a:p>
-                      <a:pPr marL="0" indent="0" algn="ctr">
+                      <a:pPr marL="0" indent="0" algn="ctr" rtl="0">
                         <a:buFont typeface="Arial" panose="020B0604020202020204" pitchFamily="34" charset="0"/>
                         <a:buNone/>
                         <a:tabLst/>
                       </a:pPr>
-                      <a:endParaRPr lang="en-US" dirty="0"/>
+                      <a:endParaRPr lang="ru-Ru" dirty="0"/>
                     </a:p>
                   </a:txBody>
                   <a:tcPr>
@@ -11189,7 +11228,7 @@
                         <a:tabLst/>
                         <a:defRPr/>
                       </a:pPr>
-                      <a:endParaRPr lang="en-US" sz="1400" b="1" dirty="0"/>
+                      <a:endParaRPr lang="ru-Ru" sz="1400" b="1" dirty="0"/>
                     </a:p>
                   </a:txBody>
                   <a:tcPr>
@@ -11253,7 +11292,7 @@
                         <a:tabLst/>
                         <a:defRPr/>
                       </a:pPr>
-                      <a:endParaRPr lang="en-US" sz="1400" b="1" dirty="0"/>
+                      <a:endParaRPr lang="ru-Ru" sz="1400" b="1" dirty="0"/>
                     </a:p>
                   </a:txBody>
                   <a:tcPr>
@@ -11317,7 +11356,7 @@
                         <a:tabLst/>
                         <a:defRPr/>
                       </a:pPr>
-                      <a:endParaRPr lang="en-US" sz="1400" b="1" dirty="0"/>
+                      <a:endParaRPr lang="ru-Ru" sz="1400" b="1" dirty="0"/>
                     </a:p>
                   </a:txBody>
                   <a:tcPr>
@@ -11381,7 +11420,7 @@
                         <a:tabLst/>
                         <a:defRPr/>
                       </a:pPr>
-                      <a:endParaRPr lang="en-US" sz="1400" b="1" dirty="0"/>
+                      <a:endParaRPr lang="ru-Ru" sz="1400" b="1" dirty="0"/>
                     </a:p>
                   </a:txBody>
                   <a:tcPr>
@@ -11445,7 +11484,7 @@
                         <a:tabLst/>
                         <a:defRPr/>
                       </a:pPr>
-                      <a:endParaRPr lang="en-US" sz="1400" b="1" dirty="0"/>
+                      <a:endParaRPr lang="ru-Ru" sz="1400" b="1" dirty="0"/>
                     </a:p>
                   </a:txBody>
                   <a:tcPr>
@@ -11509,7 +11548,7 @@
                         <a:tabLst/>
                         <a:defRPr/>
                       </a:pPr>
-                      <a:endParaRPr lang="en-US" sz="1400" b="1" dirty="0"/>
+                      <a:endParaRPr lang="ru-Ru" sz="1400" b="1" dirty="0"/>
                     </a:p>
                   </a:txBody>
                   <a:tcPr>
@@ -11573,7 +11612,7 @@
                         <a:tabLst/>
                         <a:defRPr/>
                       </a:pPr>
-                      <a:endParaRPr lang="en-US" sz="1400" b="1" dirty="0"/>
+                      <a:endParaRPr lang="ru-Ru" sz="1400" b="1" dirty="0"/>
                     </a:p>
                   </a:txBody>
                   <a:tcPr>
@@ -11637,7 +11676,7 @@
                         <a:tabLst/>
                         <a:defRPr/>
                       </a:pPr>
-                      <a:endParaRPr lang="en-US" sz="1400" b="1" dirty="0"/>
+                      <a:endParaRPr lang="ru-Ru" sz="1400" b="1" dirty="0"/>
                     </a:p>
                   </a:txBody>
                   <a:tcPr>
@@ -11708,7 +11747,7 @@
                         <a:tabLst/>
                         <a:defRPr/>
                       </a:pPr>
-                      <a:endParaRPr lang="en-US" sz="1400" dirty="0"/>
+                      <a:endParaRPr lang="ru-Ru" sz="1400" dirty="0"/>
                     </a:p>
                   </a:txBody>
                   <a:tcPr>
@@ -11778,7 +11817,7 @@
                         <a:tabLst/>
                         <a:defRPr/>
                       </a:pPr>
-                      <a:endParaRPr lang="en-US" sz="1800" b="1" dirty="0"/>
+                      <a:endParaRPr lang="ru-Ru" sz="1800" b="1" dirty="0"/>
                     </a:p>
                   </a:txBody>
                   <a:tcPr>
@@ -11848,7 +11887,7 @@
                         <a:tabLst/>
                         <a:defRPr/>
                       </a:pPr>
-                      <a:endParaRPr lang="en-US" sz="1800" b="1" dirty="0"/>
+                      <a:endParaRPr lang="ru-Ru" sz="1800" b="1" dirty="0"/>
                     </a:p>
                   </a:txBody>
                   <a:tcPr>
@@ -11913,7 +11952,7 @@
                         <a:tabLst/>
                         <a:defRPr/>
                       </a:pPr>
-                      <a:endParaRPr lang="en-US" sz="1800" b="1" dirty="0"/>
+                      <a:endParaRPr lang="ru-Ru" sz="1800" b="1" dirty="0"/>
                     </a:p>
                   </a:txBody>
                   <a:tcPr>
@@ -11961,9 +12000,10 @@
                     <a:bodyPr/>
                     <a:lstStyle/>
                     <a:p>
+                      <a:pPr algn="l" rtl="0"/>
                       <a:r>
-                        <a:rPr lang="en-US" sz="1400" b="1" dirty="0"/>
-                        <a:t>Transaction networks, business logic</a:t>
+                        <a:rPr lang="ru-Ru" sz="1400" b="1" i="0" u="none" baseline="0"/>
+                        <a:t>Сети транзакций, бизнес-логика</a:t>
                       </a:r>
                     </a:p>
                   </a:txBody>
@@ -12017,7 +12057,7 @@
                     <a:bodyPr/>
                     <a:lstStyle/>
                     <a:p>
-                      <a:endParaRPr lang="en-US"/>
+                      <a:endParaRPr lang="ru-Ru"/>
                     </a:p>
                   </a:txBody>
                   <a:tcPr/>
@@ -12027,7 +12067,7 @@
                     <a:bodyPr/>
                     <a:lstStyle/>
                     <a:p>
-                      <a:endParaRPr lang="en-US"/>
+                      <a:endParaRPr lang="ru-Ru"/>
                     </a:p>
                   </a:txBody>
                   <a:tcPr/>
@@ -12054,7 +12094,7 @@
                         <a:tabLst/>
                         <a:defRPr/>
                       </a:pPr>
-                      <a:endParaRPr lang="en-US" sz="1800" b="1" dirty="0"/>
+                      <a:endParaRPr lang="ru-Ru" sz="1800" b="1" dirty="0"/>
                     </a:p>
                   </a:txBody>
                   <a:tcPr>
@@ -12114,8 +12154,8 @@
                     <a:bodyPr/>
                     <a:lstStyle/>
                     <a:p>
-                      <a:pPr algn="ctr"/>
-                      <a:endParaRPr lang="en-US" sz="1400" b="1" dirty="0"/>
+                      <a:pPr algn="ctr" rtl="0"/>
+                      <a:endParaRPr lang="ru-Ru" sz="1400" b="1" dirty="0"/>
                     </a:p>
                   </a:txBody>
                   <a:tcPr>
@@ -12162,8 +12202,8 @@
                     <a:bodyPr/>
                     <a:lstStyle/>
                     <a:p>
-                      <a:pPr algn="ctr"/>
-                      <a:endParaRPr lang="en-US" sz="1400" b="1" dirty="0"/>
+                      <a:pPr algn="ctr" rtl="0"/>
+                      <a:endParaRPr lang="ru-Ru" sz="1400" b="1" dirty="0"/>
                     </a:p>
                   </a:txBody>
                   <a:tcPr>
@@ -12210,8 +12250,8 @@
                     <a:bodyPr/>
                     <a:lstStyle/>
                     <a:p>
-                      <a:pPr algn="ctr"/>
-                      <a:endParaRPr lang="en-US" sz="1400" b="1" dirty="0"/>
+                      <a:pPr algn="ctr" rtl="0"/>
+                      <a:endParaRPr lang="ru-Ru" sz="1400" b="1" dirty="0"/>
                     </a:p>
                   </a:txBody>
                   <a:tcPr>
@@ -12258,8 +12298,8 @@
                     <a:bodyPr/>
                     <a:lstStyle/>
                     <a:p>
-                      <a:pPr algn="ctr"/>
-                      <a:endParaRPr lang="en-US" sz="1400" b="1" dirty="0"/>
+                      <a:pPr algn="ctr" rtl="0"/>
+                      <a:endParaRPr lang="ru-Ru" sz="1400" b="1" dirty="0"/>
                     </a:p>
                   </a:txBody>
                   <a:tcPr>
@@ -12306,8 +12346,8 @@
                     <a:bodyPr/>
                     <a:lstStyle/>
                     <a:p>
-                      <a:pPr algn="ctr"/>
-                      <a:endParaRPr lang="en-US" sz="1400" b="1" dirty="0"/>
+                      <a:pPr algn="ctr" rtl="0"/>
+                      <a:endParaRPr lang="ru-Ru" sz="1400" b="1" dirty="0"/>
                     </a:p>
                   </a:txBody>
                   <a:tcPr>
@@ -12354,7 +12394,7 @@
                     <a:bodyPr/>
                     <a:lstStyle/>
                     <a:p>
-                      <a:endParaRPr lang="en-US"/>
+                      <a:endParaRPr lang="ru-Ru"/>
                     </a:p>
                   </a:txBody>
                   <a:tcPr/>
@@ -12364,8 +12404,8 @@
                     <a:bodyPr/>
                     <a:lstStyle/>
                     <a:p>
-                      <a:pPr algn="ctr"/>
-                      <a:endParaRPr lang="en-US" sz="1400" b="1" dirty="0"/>
+                      <a:pPr algn="ctr" rtl="0"/>
+                      <a:endParaRPr lang="ru-Ru" sz="1400" b="1" dirty="0"/>
                     </a:p>
                   </a:txBody>
                   <a:tcPr>
@@ -12412,8 +12452,8 @@
                     <a:bodyPr/>
                     <a:lstStyle/>
                     <a:p>
-                      <a:pPr algn="ctr"/>
-                      <a:endParaRPr lang="en-US" sz="1400" b="1" dirty="0"/>
+                      <a:pPr algn="ctr" rtl="0"/>
+                      <a:endParaRPr lang="ru-Ru" sz="1400" b="1" dirty="0"/>
                     </a:p>
                   </a:txBody>
                   <a:tcPr>
@@ -12467,12 +12507,12 @@
                     <a:bodyPr/>
                     <a:lstStyle/>
                     <a:p>
-                      <a:pPr marL="174625" indent="-174625" algn="l">
+                      <a:pPr marL="174625" indent="-174625" algn="l" rtl="0">
                         <a:buFont typeface="Arial" panose="020B0604020202020204" pitchFamily="34" charset="0"/>
                         <a:buChar char="•"/>
                         <a:tabLst/>
                       </a:pPr>
-                      <a:endParaRPr lang="en-US" sz="1800" b="1" dirty="0"/>
+                      <a:endParaRPr lang="ru-Ru" sz="1800" b="1" dirty="0"/>
                     </a:p>
                   </a:txBody>
                   <a:tcPr>
@@ -12525,12 +12565,12 @@
                     <a:bodyPr/>
                     <a:lstStyle/>
                     <a:p>
-                      <a:pPr marL="0" indent="0" algn="l">
+                      <a:pPr marL="0" indent="0" algn="l" rtl="0">
                         <a:buFont typeface="Arial" panose="020B0604020202020204" pitchFamily="34" charset="0"/>
                         <a:buNone/>
                         <a:tabLst/>
                       </a:pPr>
-                      <a:endParaRPr lang="en-US" sz="1800" b="1" dirty="0"/>
+                      <a:endParaRPr lang="ru-Ru" sz="1800" b="1" dirty="0"/>
                     </a:p>
                   </a:txBody>
                   <a:tcPr>
@@ -12583,7 +12623,7 @@
                     <a:bodyPr/>
                     <a:lstStyle/>
                     <a:p>
-                      <a:endParaRPr lang="en-US"/>
+                      <a:endParaRPr lang="ru-Ru"/>
                     </a:p>
                   </a:txBody>
                   <a:tcPr/>
@@ -12593,7 +12633,7 @@
                     <a:bodyPr/>
                     <a:lstStyle/>
                     <a:p>
-                      <a:endParaRPr lang="en-US"/>
+                      <a:endParaRPr lang="ru-Ru"/>
                     </a:p>
                   </a:txBody>
                   <a:tcPr/>
@@ -12620,7 +12660,7 @@
                         <a:tabLst/>
                         <a:defRPr/>
                       </a:pPr>
-                      <a:endParaRPr lang="en-US" sz="1800" b="1" dirty="0"/>
+                      <a:endParaRPr lang="ru-Ru" sz="1800" b="1" dirty="0"/>
                     </a:p>
                   </a:txBody>
                   <a:tcPr>
@@ -12673,7 +12713,7 @@
                     <a:bodyPr/>
                     <a:lstStyle/>
                     <a:p>
-                      <a:endParaRPr lang="en-US"/>
+                      <a:endParaRPr lang="ru-Ru"/>
                     </a:p>
                   </a:txBody>
                   <a:tcPr/>
@@ -12683,7 +12723,7 @@
                     <a:bodyPr/>
                     <a:lstStyle/>
                     <a:p>
-                      <a:endParaRPr lang="en-US"/>
+                      <a:endParaRPr lang="ru-Ru"/>
                     </a:p>
                   </a:txBody>
                   <a:tcPr/>
@@ -12710,7 +12750,7 @@
                         <a:tabLst/>
                         <a:defRPr/>
                       </a:pPr>
-                      <a:endParaRPr lang="en-US" sz="1800" b="1" dirty="0"/>
+                      <a:endParaRPr lang="ru-Ru" sz="1800" b="1" dirty="0"/>
                     </a:p>
                   </a:txBody>
                   <a:tcPr>
@@ -12794,12 +12834,13 @@
           <a:bodyPr/>
           <a:lstStyle/>
           <a:p>
+            <a:pPr algn="r" rtl="0"/>
             <a:fld id="{08BF69C1-739F-1B47-B5E3-FA651BCAB105}" type="slidenum">
-              <a:rPr lang="en-US" smtClean="0"/>
+              <a:rPr/>
               <a:pPr/>
               <a:t>3</a:t>
             </a:fld>
-            <a:endParaRPr lang="en-US"/>
+            <a:endParaRPr lang="ru-Ru"/>
           </a:p>
         </p:txBody>
       </p:sp>
@@ -12819,8 +12860,8 @@
         </p:nvSpPr>
         <p:spPr>
           <a:xfrm>
-            <a:off x="2247607" y="72070"/>
-            <a:ext cx="7138422" cy="571500"/>
+            <a:off x="1371600" y="72070"/>
+            <a:ext cx="8014429" cy="571500"/>
           </a:xfrm>
           <a:prstGeom prst="rect">
             <a:avLst/>
@@ -12993,13 +13034,26 @@
             </a:lvl9pPr>
           </a:lstStyle>
           <a:p>
-            <a:pPr marL="0" indent="0" algn="ctr">
+            <a:pPr marL="0" indent="0" algn="ctr" rtl="0">
               <a:buNone/>
             </a:pPr>
             <a:r>
-              <a:rPr lang="en-US" dirty="0"/>
-              <a:t>Hyperledger Fabric Policy Hierarchy</a:t>
+              <a:rPr lang="ru-Ru" b="0" i="0" u="none" baseline="0" dirty="0"/>
+              <a:t>Иерархия установленных правил </a:t>
             </a:r>
+            <a:r>
+              <a:rPr lang="ru-Ru" b="0" i="0" u="none" baseline="0" dirty="0" err="1"/>
+              <a:t>Hyperledger</a:t>
+            </a:r>
+            <a:r>
+              <a:rPr lang="ru-Ru" b="0" i="0" u="none" baseline="0" dirty="0"/>
+              <a:t> </a:t>
+            </a:r>
+            <a:r>
+              <a:rPr lang="ru-Ru" b="0" i="0" u="none" baseline="0" dirty="0" err="1"/>
+              <a:t>Fabric</a:t>
+            </a:r>
+            <a:endParaRPr lang="ru-Ru" b="0" i="0" u="none" baseline="0" dirty="0"/>
           </a:p>
         </p:txBody>
       </p:sp>
@@ -13031,13 +13085,14 @@
           </a:bodyPr>
           <a:lstStyle/>
           <a:p>
+            <a:pPr algn="l" rtl="0"/>
             <a:r>
-              <a:rPr lang="en-US" b="1" dirty="0"/>
-              <a:t>ACLs and smart contracts</a:t>
+              <a:rPr lang="ru-Ru" b="1" i="0" u="none" baseline="0"/>
+              <a:t>ACL и смарт-контракты</a:t>
             </a:r>
           </a:p>
           <a:p>
-            <a:endParaRPr lang="en-US" dirty="0"/>
+            <a:endParaRPr lang="ru-Ru" dirty="0"/>
           </a:p>
         </p:txBody>
       </p:sp>
@@ -13069,13 +13124,14 @@
           </a:bodyPr>
           <a:lstStyle/>
           <a:p>
+            <a:pPr algn="l" rtl="0"/>
             <a:r>
-              <a:rPr lang="en-US" b="1" dirty="0"/>
-              <a:t>Application Channel</a:t>
+              <a:rPr lang="ru-Ru" b="1" i="0" u="none" baseline="0" dirty="0"/>
+              <a:t>Канал приложения</a:t>
             </a:r>
           </a:p>
           <a:p>
-            <a:endParaRPr lang="en-US" dirty="0"/>
+            <a:endParaRPr lang="ru-Ru" dirty="0"/>
           </a:p>
         </p:txBody>
       </p:sp>
@@ -13094,7 +13150,7 @@
         <p:spPr>
           <a:xfrm>
             <a:off x="2924998" y="789643"/>
-            <a:ext cx="1684301" cy="369332"/>
+            <a:ext cx="2339441" cy="369332"/>
           </a:xfrm>
           <a:prstGeom prst="rect">
             <a:avLst/>
@@ -13107,9 +13163,10 @@
           </a:bodyPr>
           <a:lstStyle/>
           <a:p>
+            <a:pPr algn="l" rtl="0"/>
             <a:r>
-              <a:rPr lang="en-US" b="1" dirty="0"/>
-              <a:t>System Channel</a:t>
+              <a:rPr lang="ru-Ru" b="1" i="0" u="none" baseline="0" dirty="0"/>
+              <a:t>Системный канал</a:t>
             </a:r>
           </a:p>
         </p:txBody>
@@ -13159,8 +13216,8 @@
           <a:bodyPr rtlCol="0" anchor="ctr"/>
           <a:lstStyle/>
           <a:p>
-            <a:pPr algn="ctr"/>
-            <a:endParaRPr lang="en-US"/>
+            <a:pPr algn="ctr" rtl="0"/>
+            <a:endParaRPr lang="ru-Ru"/>
           </a:p>
         </p:txBody>
       </p:sp>
@@ -13397,7 +13454,7 @@
         <p:spPr>
           <a:xfrm>
             <a:off x="1145008" y="795407"/>
-            <a:ext cx="1545936" cy="923330"/>
+            <a:ext cx="1737340" cy="1200329"/>
           </a:xfrm>
           <a:prstGeom prst="rect">
             <a:avLst/>
@@ -13410,29 +13467,14 @@
           </a:bodyPr>
           <a:lstStyle/>
           <a:p>
+            <a:pPr algn="l" rtl="0"/>
             <a:r>
-              <a:rPr lang="en-US" b="1" dirty="0">
+              <a:rPr lang="ru-Ru" b="1" i="0" u="none" baseline="0" dirty="0">
                 <a:solidFill>
                   <a:srgbClr val="0164FF"/>
                 </a:solidFill>
               </a:rPr>
-              <a:t>What </a:t>
-            </a:r>
-            <a:r>
-              <a:rPr lang="en-US" b="1" dirty="0" err="1">
-                <a:solidFill>
-                  <a:srgbClr val="0164FF"/>
-                </a:solidFill>
-              </a:rPr>
-              <a:t>Orderer</a:t>
-            </a:r>
-            <a:r>
-              <a:rPr lang="en-US" b="1" dirty="0">
-                <a:solidFill>
-                  <a:srgbClr val="0164FF"/>
-                </a:solidFill>
-              </a:rPr>
-              <a:t> organizations govern</a:t>
+              <a:t>Чем управляют организации службы упорядочения</a:t>
             </a:r>
           </a:p>
         </p:txBody>
@@ -13465,23 +13507,25 @@
           </a:bodyPr>
           <a:lstStyle/>
           <a:p>
+            <a:pPr algn="l" rtl="0"/>
             <a:r>
-              <a:rPr lang="en-US" b="1" dirty="0">
+              <a:rPr lang="ru-Ru" b="1" i="0" u="none" baseline="0" dirty="0">
                 <a:solidFill>
                   <a:srgbClr val="0164FF"/>
                 </a:solidFill>
               </a:rPr>
-              <a:t>What</a:t>
+              <a:t>Чем</a:t>
             </a:r>
           </a:p>
           <a:p>
+            <a:pPr algn="l" rtl="0"/>
             <a:r>
-              <a:rPr lang="en-US" b="1" dirty="0">
+              <a:rPr lang="ru-Ru" b="1" i="0" u="none" baseline="0" dirty="0">
                 <a:solidFill>
                   <a:srgbClr val="0164FF"/>
                 </a:solidFill>
               </a:rPr>
-              <a:t>Consortium organizations govern</a:t>
+              <a:t>управляют организации консорциума</a:t>
             </a:r>
           </a:p>
         </p:txBody>
@@ -13514,9 +13558,10 @@
           </a:bodyPr>
           <a:lstStyle/>
           <a:p>
+            <a:pPr algn="l" rtl="0"/>
             <a:r>
-              <a:rPr lang="en-US" sz="1400" b="1" dirty="0"/>
-              <a:t>Transactions, data, and events</a:t>
+              <a:rPr lang="ru-Ru" sz="1400" b="1" i="0" u="none" baseline="0"/>
+              <a:t>Транзакции, данные и события</a:t>
             </a:r>
           </a:p>
         </p:txBody>
@@ -13573,7 +13618,7 @@
         </p:nvGraphicFramePr>
         <p:xfrm>
           <a:off x="3000871" y="789643"/>
-          <a:ext cx="5820502" cy="4006778"/>
+          <a:ext cx="5820502" cy="4153135"/>
         </p:xfrm>
         <a:graphic>
           <a:graphicData uri="http://schemas.openxmlformats.org/drawingml/2006/table">
@@ -13662,7 +13707,7 @@
                         <a:tabLst/>
                         <a:defRPr/>
                       </a:pPr>
-                      <a:endParaRPr lang="en-US" sz="1400" b="1" dirty="0"/>
+                      <a:endParaRPr lang="ru-Ru" sz="1400" b="1" dirty="0"/>
                     </a:p>
                   </a:txBody>
                   <a:tcPr>
@@ -13726,7 +13771,7 @@
                         <a:tabLst/>
                         <a:defRPr/>
                       </a:pPr>
-                      <a:endParaRPr lang="en-US" sz="1400" b="1" dirty="0"/>
+                      <a:endParaRPr lang="ru-Ru" sz="1400" b="1" dirty="0"/>
                     </a:p>
                   </a:txBody>
                   <a:tcPr>
@@ -13790,7 +13835,7 @@
                         <a:tabLst/>
                         <a:defRPr/>
                       </a:pPr>
-                      <a:endParaRPr lang="en-US" sz="1400" b="1" dirty="0"/>
+                      <a:endParaRPr lang="ru-Ru" sz="1400" b="1" dirty="0"/>
                     </a:p>
                   </a:txBody>
                   <a:tcPr>
@@ -13854,7 +13899,7 @@
                         <a:tabLst/>
                         <a:defRPr/>
                       </a:pPr>
-                      <a:endParaRPr lang="en-US" sz="1400" b="1" dirty="0"/>
+                      <a:endParaRPr lang="ru-Ru" sz="1400" b="1" dirty="0"/>
                     </a:p>
                   </a:txBody>
                   <a:tcPr>
@@ -13918,7 +13963,7 @@
                         <a:tabLst/>
                         <a:defRPr/>
                       </a:pPr>
-                      <a:endParaRPr lang="en-US" sz="1400" b="1" dirty="0"/>
+                      <a:endParaRPr lang="ru-Ru" sz="1400" b="1" dirty="0"/>
                     </a:p>
                   </a:txBody>
                   <a:tcPr>
@@ -13982,7 +14027,7 @@
                         <a:tabLst/>
                         <a:defRPr/>
                       </a:pPr>
-                      <a:endParaRPr lang="en-US" sz="1400" b="1" dirty="0"/>
+                      <a:endParaRPr lang="ru-Ru" sz="1400" b="1" dirty="0"/>
                     </a:p>
                   </a:txBody>
                   <a:tcPr>
@@ -14046,7 +14091,7 @@
                         <a:tabLst/>
                         <a:defRPr/>
                       </a:pPr>
-                      <a:endParaRPr lang="en-US" sz="1400" b="1" dirty="0"/>
+                      <a:endParaRPr lang="ru-Ru" sz="1400" b="1" dirty="0"/>
                     </a:p>
                   </a:txBody>
                   <a:tcPr>
@@ -14110,7 +14155,7 @@
                         <a:tabLst/>
                         <a:defRPr/>
                       </a:pPr>
-                      <a:endParaRPr lang="en-US" sz="1400" b="1" dirty="0"/>
+                      <a:endParaRPr lang="ru-Ru" sz="1400" b="1" dirty="0"/>
                     </a:p>
                   </a:txBody>
                   <a:tcPr>
@@ -14164,44 +14209,44 @@
                     <a:bodyPr/>
                     <a:lstStyle/>
                     <a:p>
-                      <a:pPr marL="285750" indent="-285750">
+                      <a:pPr marL="285750" indent="-285750" algn="l" rtl="0">
                         <a:buFont typeface="Arial" panose="020B0604020202020204" pitchFamily="34" charset="0"/>
                         <a:buChar char="•"/>
                       </a:pPr>
                       <a:r>
-                        <a:rPr lang="en-US" sz="1400" dirty="0"/>
-                        <a:t>Blockchain Structure</a:t>
+                        <a:rPr lang="ru-Ru" sz="1400" b="0" i="0" u="none" baseline="0"/>
+                        <a:t>Структура блокчейна</a:t>
                       </a:r>
                     </a:p>
                     <a:p>
-                      <a:pPr marL="285750" indent="-285750">
+                      <a:pPr marL="285750" indent="-285750" algn="l" rtl="0">
                         <a:buFont typeface="Arial" panose="020B0604020202020204" pitchFamily="34" charset="0"/>
                         <a:buChar char="•"/>
                       </a:pPr>
                       <a:r>
-                        <a:rPr lang="en-US" sz="1400" dirty="0"/>
-                        <a:t>Consensus</a:t>
+                        <a:rPr lang="ru-Ru" sz="1400" b="0" i="0" u="none" baseline="0"/>
+                        <a:t>Консенсус</a:t>
                       </a:r>
                     </a:p>
                     <a:p>
-                      <a:pPr marL="285750" indent="-285750">
+                      <a:pPr marL="285750" indent="-285750" algn="l" rtl="0">
                         <a:buFont typeface="Arial" panose="020B0604020202020204" pitchFamily="34" charset="0"/>
                         <a:buChar char="•"/>
                       </a:pPr>
                       <a:r>
-                        <a:rPr lang="en-US" sz="1400" dirty="0"/>
-                        <a:t>Consortium membership</a:t>
+                        <a:rPr lang="ru-Ru" sz="1400" b="0" i="0" u="none" baseline="0"/>
+                        <a:t>Членство в консорциуме</a:t>
                       </a:r>
                     </a:p>
                     <a:p>
-                      <a:pPr marL="285750" lvl="0" indent="-285750" defTabSz="457200">
+                      <a:pPr marL="285750" lvl="0" indent="-285750" algn="l" defTabSz="457200" rtl="0">
                         <a:buFont typeface="Arial" panose="020B0604020202020204" pitchFamily="34" charset="0"/>
                         <a:buChar char="•"/>
                         <a:defRPr/>
                       </a:pPr>
                       <a:r>
-                        <a:rPr lang="en-US" sz="1400" dirty="0"/>
-                        <a:t>Consortium Member Policies policies (Readers, Writers, Admins)</a:t>
+                        <a:rPr lang="ru-Ru" sz="1400" b="0" i="0" u="none" baseline="0"/>
+                        <a:t>Установленные правила членов консорциума («чтение», «запись», «администратор»)</a:t>
                       </a:r>
                     </a:p>
                   </a:txBody>
@@ -14255,11 +14300,11 @@
                     <a:bodyPr/>
                     <a:lstStyle/>
                     <a:p>
-                      <a:pPr marL="285750" indent="-285750">
+                      <a:pPr marL="285750" indent="-285750" algn="l" rtl="0">
                         <a:buFont typeface="Arial" panose="020B0604020202020204" pitchFamily="34" charset="0"/>
                         <a:buChar char="•"/>
                       </a:pPr>
-                      <a:endParaRPr lang="en-US" sz="1400" dirty="0"/>
+                      <a:endParaRPr lang="ru-Ru" sz="1400" dirty="0"/>
                     </a:p>
                   </a:txBody>
                   <a:tcPr>
@@ -14312,7 +14357,7 @@
                     <a:bodyPr/>
                     <a:lstStyle/>
                     <a:p>
-                      <a:endParaRPr lang="en-US"/>
+                      <a:endParaRPr lang="ru-Ru"/>
                     </a:p>
                   </a:txBody>
                   <a:tcPr/>
@@ -14322,7 +14367,7 @@
                     <a:bodyPr/>
                     <a:lstStyle/>
                     <a:p>
-                      <a:endParaRPr lang="en-US"/>
+                      <a:endParaRPr lang="ru-Ru"/>
                     </a:p>
                   </a:txBody>
                   <a:tcPr/>
@@ -14332,12 +14377,12 @@
                     <a:bodyPr/>
                     <a:lstStyle/>
                     <a:p>
-                      <a:pPr marL="0" indent="0" algn="ctr">
+                      <a:pPr marL="0" indent="0" algn="ctr" rtl="0">
                         <a:buFont typeface="Arial" panose="020B0604020202020204" pitchFamily="34" charset="0"/>
                         <a:buNone/>
                         <a:tabLst/>
                       </a:pPr>
-                      <a:endParaRPr lang="en-US" dirty="0"/>
+                      <a:endParaRPr lang="ru-Ru" dirty="0"/>
                     </a:p>
                   </a:txBody>
                   <a:tcPr>
@@ -14390,12 +14435,12 @@
                     <a:bodyPr/>
                     <a:lstStyle/>
                     <a:p>
-                      <a:pPr marL="0" indent="0" algn="ctr">
+                      <a:pPr marL="0" indent="0" algn="ctr" rtl="0">
                         <a:buFont typeface="Arial" panose="020B0604020202020204" pitchFamily="34" charset="0"/>
                         <a:buNone/>
                         <a:tabLst/>
                       </a:pPr>
-                      <a:endParaRPr lang="en-US" dirty="0"/>
+                      <a:endParaRPr lang="ru-Ru" dirty="0"/>
                     </a:p>
                   </a:txBody>
                   <a:tcPr>
@@ -14461,8 +14506,8 @@
                         <a:defRPr/>
                       </a:pPr>
                       <a:r>
-                        <a:rPr lang="en-US" sz="1000" dirty="0"/>
-                        <a:t>Channel modification</a:t>
+                        <a:rPr lang="ru-Ru" sz="1000" b="0" i="0" u="none" baseline="0"/>
+                        <a:t>Изменение канала</a:t>
                       </a:r>
                     </a:p>
                   </a:txBody>
@@ -14516,12 +14561,12 @@
                     <a:bodyPr/>
                     <a:lstStyle/>
                     <a:p>
-                      <a:pPr marL="0" indent="0" algn="ctr">
+                      <a:pPr marL="0" indent="0" algn="ctr" rtl="0">
                         <a:buFont typeface="Arial" panose="020B0604020202020204" pitchFamily="34" charset="0"/>
                         <a:buNone/>
                         <a:tabLst/>
                       </a:pPr>
-                      <a:endParaRPr lang="en-US" dirty="0"/>
+                      <a:endParaRPr lang="ru-Ru" dirty="0"/>
                     </a:p>
                   </a:txBody>
                   <a:tcPr>
@@ -14598,7 +14643,7 @@
                         <a:tabLst/>
                         <a:defRPr/>
                       </a:pPr>
-                      <a:endParaRPr lang="en-US" sz="1400" b="1" dirty="0"/>
+                      <a:endParaRPr lang="ru-Ru" sz="1400" b="1" dirty="0"/>
                     </a:p>
                   </a:txBody>
                   <a:tcPr>
@@ -14662,7 +14707,7 @@
                         <a:tabLst/>
                         <a:defRPr/>
                       </a:pPr>
-                      <a:endParaRPr lang="en-US" sz="1400" b="1" dirty="0"/>
+                      <a:endParaRPr lang="ru-Ru" sz="1400" b="1" dirty="0"/>
                     </a:p>
                   </a:txBody>
                   <a:tcPr>
@@ -14726,7 +14771,7 @@
                         <a:tabLst/>
                         <a:defRPr/>
                       </a:pPr>
-                      <a:endParaRPr lang="en-US" sz="1400" b="1" dirty="0"/>
+                      <a:endParaRPr lang="ru-Ru" sz="1400" b="1" dirty="0"/>
                     </a:p>
                   </a:txBody>
                   <a:tcPr>
@@ -14790,7 +14835,7 @@
                         <a:tabLst/>
                         <a:defRPr/>
                       </a:pPr>
-                      <a:endParaRPr lang="en-US" sz="1400" b="1" dirty="0"/>
+                      <a:endParaRPr lang="ru-Ru" sz="1400" b="1" dirty="0"/>
                     </a:p>
                   </a:txBody>
                   <a:tcPr>
@@ -14854,7 +14899,7 @@
                         <a:tabLst/>
                         <a:defRPr/>
                       </a:pPr>
-                      <a:endParaRPr lang="en-US" sz="1400" b="1" dirty="0"/>
+                      <a:endParaRPr lang="ru-Ru" sz="1400" b="1" dirty="0"/>
                     </a:p>
                   </a:txBody>
                   <a:tcPr>
@@ -14918,7 +14963,7 @@
                         <a:tabLst/>
                         <a:defRPr/>
                       </a:pPr>
-                      <a:endParaRPr lang="en-US" sz="1400" b="1" dirty="0"/>
+                      <a:endParaRPr lang="ru-Ru" sz="1400" b="1" dirty="0"/>
                     </a:p>
                   </a:txBody>
                   <a:tcPr>
@@ -14982,7 +15027,7 @@
                         <a:tabLst/>
                         <a:defRPr/>
                       </a:pPr>
-                      <a:endParaRPr lang="en-US" sz="1400" b="1" dirty="0"/>
+                      <a:endParaRPr lang="ru-Ru" sz="1400" b="1" dirty="0"/>
                     </a:p>
                   </a:txBody>
                   <a:tcPr>
@@ -15046,7 +15091,7 @@
                         <a:tabLst/>
                         <a:defRPr/>
                       </a:pPr>
-                      <a:endParaRPr lang="en-US" sz="1400" b="1" dirty="0"/>
+                      <a:endParaRPr lang="ru-Ru" sz="1400" b="1" dirty="0"/>
                     </a:p>
                   </a:txBody>
                   <a:tcPr>
@@ -15118,8 +15163,8 @@
                         <a:defRPr/>
                       </a:pPr>
                       <a:r>
-                        <a:rPr lang="en-US" sz="1400" dirty="0"/>
-                        <a:t>Consensus</a:t>
+                        <a:rPr lang="ru-Ru" sz="1400" b="0" i="0" u="none" baseline="0"/>
+                        <a:t>Консенсус</a:t>
                       </a:r>
                     </a:p>
                     <a:p>
@@ -15140,7 +15185,7 @@
                         <a:tabLst/>
                         <a:defRPr/>
                       </a:pPr>
-                      <a:endParaRPr lang="en-US" sz="1800" b="1" dirty="0"/>
+                      <a:endParaRPr lang="ru-Ru" sz="1800" b="1" dirty="0"/>
                     </a:p>
                   </a:txBody>
                   <a:tcPr>
@@ -15210,7 +15255,7 @@
                         <a:tabLst/>
                         <a:defRPr/>
                       </a:pPr>
-                      <a:endParaRPr lang="en-US" sz="1800" b="1" dirty="0"/>
+                      <a:endParaRPr lang="ru-Ru" sz="1800" b="1" dirty="0"/>
                     </a:p>
                   </a:txBody>
                   <a:tcPr>
@@ -15280,7 +15325,7 @@
                         <a:tabLst/>
                         <a:defRPr/>
                       </a:pPr>
-                      <a:endParaRPr lang="en-US" sz="1800" b="1" dirty="0"/>
+                      <a:endParaRPr lang="ru-Ru" sz="1800" b="1" dirty="0"/>
                     </a:p>
                   </a:txBody>
                   <a:tcPr>
@@ -15345,7 +15390,7 @@
                         <a:tabLst/>
                         <a:defRPr/>
                       </a:pPr>
-                      <a:endParaRPr lang="en-US" sz="1800" b="1" dirty="0"/>
+                      <a:endParaRPr lang="ru-Ru" sz="1800" b="1" dirty="0"/>
                     </a:p>
                   </a:txBody>
                   <a:tcPr>
@@ -15393,23 +15438,23 @@
                     <a:bodyPr/>
                     <a:lstStyle/>
                     <a:p>
-                      <a:pPr marL="285750" indent="-285750">
+                      <a:pPr marL="285750" indent="-285750" algn="l" rtl="0">
                         <a:buFont typeface="Arial" panose="020B0604020202020204" pitchFamily="34" charset="0"/>
                         <a:buChar char="•"/>
                       </a:pPr>
                       <a:r>
-                        <a:rPr lang="en-US" sz="1400" dirty="0"/>
-                        <a:t>Channel Membership</a:t>
+                        <a:rPr lang="ru-Ru" sz="1400" b="0" i="0" u="none" baseline="0"/>
+                        <a:t>Членство в канале</a:t>
                       </a:r>
                     </a:p>
                     <a:p>
-                      <a:pPr marL="285750" indent="-285750">
+                      <a:pPr marL="285750" indent="-285750" algn="l" rtl="0">
                         <a:buFont typeface="Arial" panose="020B0604020202020204" pitchFamily="34" charset="0"/>
                         <a:buChar char="•"/>
                       </a:pPr>
                       <a:r>
-                        <a:rPr lang="en-US" sz="1400" dirty="0"/>
-                        <a:t>Organization policies (Readers, Writers, Admins)</a:t>
+                        <a:rPr lang="ru-Ru" sz="1400" b="0" i="0" u="none" baseline="0"/>
+                        <a:t>Правила организации («чтение», «запись», «администратор»)</a:t>
                       </a:r>
                     </a:p>
                   </a:txBody>
@@ -15463,7 +15508,7 @@
                     <a:bodyPr/>
                     <a:lstStyle/>
                     <a:p>
-                      <a:endParaRPr lang="en-US"/>
+                      <a:endParaRPr lang="ru-Ru"/>
                     </a:p>
                   </a:txBody>
                   <a:tcPr/>
@@ -15473,7 +15518,7 @@
                     <a:bodyPr/>
                     <a:lstStyle/>
                     <a:p>
-                      <a:endParaRPr lang="en-US"/>
+                      <a:endParaRPr lang="ru-Ru"/>
                     </a:p>
                   </a:txBody>
                   <a:tcPr/>
@@ -15500,7 +15545,7 @@
                         <a:tabLst/>
                         <a:defRPr/>
                       </a:pPr>
-                      <a:endParaRPr lang="en-US" sz="1800" b="1" dirty="0"/>
+                      <a:endParaRPr lang="ru-Ru" sz="1800" b="1" dirty="0"/>
                     </a:p>
                   </a:txBody>
                   <a:tcPr>
@@ -15560,8 +15605,8 @@
                     <a:bodyPr/>
                     <a:lstStyle/>
                     <a:p>
-                      <a:pPr algn="ctr"/>
-                      <a:endParaRPr lang="en-US" sz="1400" b="1" dirty="0"/>
+                      <a:pPr algn="ctr" rtl="0"/>
+                      <a:endParaRPr lang="ru-Ru" sz="1400" b="1" dirty="0"/>
                     </a:p>
                   </a:txBody>
                   <a:tcPr>
@@ -15608,8 +15653,8 @@
                     <a:bodyPr/>
                     <a:lstStyle/>
                     <a:p>
-                      <a:pPr algn="ctr"/>
-                      <a:endParaRPr lang="en-US" sz="1400" b="1" dirty="0"/>
+                      <a:pPr algn="ctr" rtl="0"/>
+                      <a:endParaRPr lang="ru-Ru" sz="1400" b="1" dirty="0"/>
                     </a:p>
                   </a:txBody>
                   <a:tcPr>
@@ -15656,8 +15701,8 @@
                     <a:bodyPr/>
                     <a:lstStyle/>
                     <a:p>
-                      <a:pPr algn="ctr"/>
-                      <a:endParaRPr lang="en-US" sz="1400" b="1" dirty="0"/>
+                      <a:pPr algn="ctr" rtl="0"/>
+                      <a:endParaRPr lang="ru-Ru" sz="1400" b="1" dirty="0"/>
                     </a:p>
                   </a:txBody>
                   <a:tcPr>
@@ -15704,8 +15749,8 @@
                     <a:bodyPr/>
                     <a:lstStyle/>
                     <a:p>
-                      <a:pPr algn="ctr"/>
-                      <a:endParaRPr lang="en-US" sz="1400" b="1" dirty="0"/>
+                      <a:pPr algn="ctr" rtl="0"/>
+                      <a:endParaRPr lang="ru-Ru" sz="1400" b="1" dirty="0"/>
                     </a:p>
                   </a:txBody>
                   <a:tcPr>
@@ -15752,8 +15797,8 @@
                     <a:bodyPr/>
                     <a:lstStyle/>
                     <a:p>
-                      <a:pPr algn="ctr"/>
-                      <a:endParaRPr lang="en-US" sz="1400" b="1" dirty="0"/>
+                      <a:pPr algn="ctr" rtl="0"/>
+                      <a:endParaRPr lang="ru-Ru" sz="1400" b="1" dirty="0"/>
                     </a:p>
                   </a:txBody>
                   <a:tcPr>
@@ -15800,7 +15845,7 @@
                     <a:bodyPr/>
                     <a:lstStyle/>
                     <a:p>
-                      <a:endParaRPr lang="en-US"/>
+                      <a:endParaRPr lang="ru-Ru"/>
                     </a:p>
                   </a:txBody>
                   <a:tcPr/>
@@ -15810,8 +15855,8 @@
                     <a:bodyPr/>
                     <a:lstStyle/>
                     <a:p>
-                      <a:pPr algn="ctr"/>
-                      <a:endParaRPr lang="en-US" sz="1400" b="1" dirty="0"/>
+                      <a:pPr algn="ctr" rtl="0"/>
+                      <a:endParaRPr lang="ru-Ru" sz="1400" b="1" dirty="0"/>
                     </a:p>
                   </a:txBody>
                   <a:tcPr>
@@ -15858,8 +15903,8 @@
                     <a:bodyPr/>
                     <a:lstStyle/>
                     <a:p>
-                      <a:pPr algn="ctr"/>
-                      <a:endParaRPr lang="en-US" sz="1400" b="1" dirty="0"/>
+                      <a:pPr algn="ctr" rtl="0"/>
+                      <a:endParaRPr lang="ru-Ru" sz="1400" b="1" dirty="0"/>
                     </a:p>
                   </a:txBody>
                   <a:tcPr>
@@ -15913,38 +15958,38 @@
                     <a:bodyPr/>
                     <a:lstStyle/>
                     <a:p>
-                      <a:pPr marL="174625" indent="-174625" algn="l">
+                      <a:pPr marL="174625" indent="-174625" algn="l" rtl="0">
                         <a:buFont typeface="Arial" panose="020B0604020202020204" pitchFamily="34" charset="0"/>
                         <a:buChar char="•"/>
                         <a:tabLst/>
                       </a:pPr>
                       <a:r>
-                        <a:rPr lang="en-US" sz="1400" dirty="0"/>
-                        <a:t>Smart Contracts</a:t>
+                        <a:rPr lang="ru-Ru" sz="1400" b="0" i="0" u="none" baseline="0" dirty="0"/>
+                        <a:t>Смарт-контракты</a:t>
                       </a:r>
                     </a:p>
                     <a:p>
-                      <a:pPr marL="174625" indent="-174625" algn="l">
+                      <a:pPr marL="174625" indent="-174625" algn="l" rtl="0">
                         <a:buFont typeface="Arial" panose="020B0604020202020204" pitchFamily="34" charset="0"/>
                         <a:buChar char="•"/>
                         <a:tabLst/>
                       </a:pPr>
                       <a:r>
-                        <a:rPr lang="en-US" sz="1400" dirty="0"/>
-                        <a:t>Ledger data</a:t>
+                        <a:rPr lang="ru-Ru" sz="1400" b="0" i="0" u="none" baseline="0" dirty="0"/>
+                        <a:t>Данные реестра</a:t>
                       </a:r>
                     </a:p>
                     <a:p>
-                      <a:pPr marL="174625" indent="-174625" algn="l">
+                      <a:pPr marL="174625" indent="-174625" algn="l" rtl="0">
                         <a:buFont typeface="Arial" panose="020B0604020202020204" pitchFamily="34" charset="0"/>
                         <a:buChar char="•"/>
                         <a:tabLst/>
                       </a:pPr>
                       <a:r>
-                        <a:rPr lang="en-US" sz="1400" dirty="0"/>
-                        <a:t>Events</a:t>
+                        <a:rPr lang="ru-Ru" sz="1400" b="0" i="0" u="none" baseline="0" dirty="0"/>
+                        <a:t>События</a:t>
                       </a:r>
-                      <a:endParaRPr lang="en-US" sz="1400" b="1" dirty="0"/>
+                      <a:endParaRPr lang="ru-Ru" sz="1400" b="1" dirty="0"/>
                     </a:p>
                   </a:txBody>
                   <a:tcPr>
@@ -15997,12 +16042,12 @@
                     <a:bodyPr/>
                     <a:lstStyle/>
                     <a:p>
-                      <a:pPr marL="174625" indent="-174625" algn="l">
+                      <a:pPr marL="174625" indent="-174625" algn="l" rtl="0">
                         <a:buFont typeface="Arial" panose="020B0604020202020204" pitchFamily="34" charset="0"/>
                         <a:buChar char="•"/>
                         <a:tabLst/>
                       </a:pPr>
-                      <a:endParaRPr lang="en-US" sz="1800" b="1" dirty="0"/>
+                      <a:endParaRPr lang="ru-Ru" sz="1800" b="1" dirty="0"/>
                     </a:p>
                   </a:txBody>
                   <a:tcPr>
@@ -16055,7 +16100,7 @@
                     <a:bodyPr/>
                     <a:lstStyle/>
                     <a:p>
-                      <a:endParaRPr lang="en-US"/>
+                      <a:endParaRPr lang="ru-Ru"/>
                     </a:p>
                   </a:txBody>
                   <a:tcPr/>
@@ -16065,7 +16110,7 @@
                     <a:bodyPr/>
                     <a:lstStyle/>
                     <a:p>
-                      <a:endParaRPr lang="en-US"/>
+                      <a:endParaRPr lang="ru-Ru"/>
                     </a:p>
                   </a:txBody>
                   <a:tcPr/>
@@ -16092,7 +16137,7 @@
                         <a:tabLst/>
                         <a:defRPr/>
                       </a:pPr>
-                      <a:endParaRPr lang="en-US" sz="1800" b="1" dirty="0"/>
+                      <a:endParaRPr lang="ru-Ru" sz="1800" b="1" dirty="0"/>
                     </a:p>
                   </a:txBody>
                   <a:tcPr>
@@ -16145,7 +16190,7 @@
                     <a:bodyPr/>
                     <a:lstStyle/>
                     <a:p>
-                      <a:endParaRPr lang="en-US"/>
+                      <a:endParaRPr lang="ru-Ru"/>
                     </a:p>
                   </a:txBody>
                   <a:tcPr/>
@@ -16155,7 +16200,7 @@
                     <a:bodyPr/>
                     <a:lstStyle/>
                     <a:p>
-                      <a:endParaRPr lang="en-US"/>
+                      <a:endParaRPr lang="ru-Ru"/>
                     </a:p>
                   </a:txBody>
                   <a:tcPr/>
@@ -16182,7 +16227,7 @@
                         <a:tabLst/>
                         <a:defRPr/>
                       </a:pPr>
-                      <a:endParaRPr lang="en-US" sz="1800" b="1" dirty="0"/>
+                      <a:endParaRPr lang="ru-Ru" sz="1800" b="1" dirty="0"/>
                     </a:p>
                   </a:txBody>
                   <a:tcPr>
@@ -16266,12 +16311,13 @@
           <a:bodyPr/>
           <a:lstStyle/>
           <a:p>
+            <a:pPr algn="r" rtl="0"/>
             <a:fld id="{08BF69C1-739F-1B47-B5E3-FA651BCAB105}" type="slidenum">
-              <a:rPr lang="en-US" smtClean="0"/>
+              <a:rPr/>
               <a:pPr/>
               <a:t>4</a:t>
             </a:fld>
-            <a:endParaRPr lang="en-US"/>
+            <a:endParaRPr lang="ru-Ru"/>
           </a:p>
         </p:txBody>
       </p:sp>
@@ -16291,8 +16337,8 @@
         </p:nvSpPr>
         <p:spPr>
           <a:xfrm>
-            <a:off x="2247607" y="72070"/>
-            <a:ext cx="7138422" cy="571500"/>
+            <a:off x="1509823" y="72070"/>
+            <a:ext cx="8495414" cy="571500"/>
           </a:xfrm>
           <a:prstGeom prst="rect">
             <a:avLst/>
@@ -16465,13 +16511,26 @@
             </a:lvl9pPr>
           </a:lstStyle>
           <a:p>
-            <a:pPr marL="0" indent="0" algn="ctr">
+            <a:pPr marL="0" indent="0" algn="ctr" rtl="0">
               <a:buNone/>
             </a:pPr>
             <a:r>
-              <a:rPr lang="en-US" dirty="0"/>
-              <a:t>Hyperledger Fabric Policy Hierarchy</a:t>
+              <a:rPr lang="ru-Ru" b="0" i="0" u="none" baseline="0" dirty="0"/>
+              <a:t>Иерархия установленных правил </a:t>
             </a:r>
+            <a:r>
+              <a:rPr lang="ru-Ru" b="0" i="0" u="none" baseline="0" dirty="0" err="1"/>
+              <a:t>Hyperledger</a:t>
+            </a:r>
+            <a:r>
+              <a:rPr lang="ru-Ru" b="0" i="0" u="none" baseline="0" dirty="0"/>
+              <a:t> </a:t>
+            </a:r>
+            <a:r>
+              <a:rPr lang="ru-Ru" b="0" i="0" u="none" baseline="0" dirty="0" err="1"/>
+              <a:t>Fabric</a:t>
+            </a:r>
+            <a:endParaRPr lang="ru-Ru" b="0" i="0" u="none" baseline="0" dirty="0"/>
           </a:p>
         </p:txBody>
       </p:sp>
@@ -16503,13 +16562,14 @@
           </a:bodyPr>
           <a:lstStyle/>
           <a:p>
+            <a:pPr algn="l" rtl="0"/>
             <a:r>
-              <a:rPr lang="en-US" b="1" dirty="0"/>
-              <a:t>ACLs and smart contracts</a:t>
+              <a:rPr lang="ru-Ru" b="1" i="0" u="none" baseline="0"/>
+              <a:t>ACL и смарт-контракты</a:t>
             </a:r>
           </a:p>
           <a:p>
-            <a:endParaRPr lang="en-US" dirty="0"/>
+            <a:endParaRPr lang="ru-Ru" dirty="0"/>
           </a:p>
         </p:txBody>
       </p:sp>
@@ -16541,13 +16601,14 @@
           </a:bodyPr>
           <a:lstStyle/>
           <a:p>
+            <a:pPr algn="l" rtl="0"/>
             <a:r>
-              <a:rPr lang="en-US" b="1" dirty="0"/>
-              <a:t>Application Channel</a:t>
+              <a:rPr lang="ru-Ru" b="1" i="0" u="none" baseline="0"/>
+              <a:t>Канал приложения</a:t>
             </a:r>
           </a:p>
           <a:p>
-            <a:endParaRPr lang="en-US" dirty="0"/>
+            <a:endParaRPr lang="ru-Ru" dirty="0"/>
           </a:p>
         </p:txBody>
       </p:sp>
@@ -16566,7 +16627,7 @@
         <p:spPr>
           <a:xfrm>
             <a:off x="2924998" y="789643"/>
-            <a:ext cx="1684301" cy="646331"/>
+            <a:ext cx="2120768" cy="646331"/>
           </a:xfrm>
           <a:prstGeom prst="rect">
             <a:avLst/>
@@ -16579,13 +16640,14 @@
           </a:bodyPr>
           <a:lstStyle/>
           <a:p>
+            <a:pPr algn="l" rtl="0"/>
             <a:r>
-              <a:rPr lang="en-US" b="1" dirty="0"/>
-              <a:t>System Channel</a:t>
+              <a:rPr lang="ru-Ru" b="1" i="0" u="none" baseline="0" dirty="0"/>
+              <a:t>Системный канал</a:t>
             </a:r>
           </a:p>
           <a:p>
-            <a:endParaRPr lang="en-US" dirty="0"/>
+            <a:endParaRPr lang="ru-Ru" dirty="0"/>
           </a:p>
         </p:txBody>
       </p:sp>
@@ -16634,8 +16696,8 @@
           <a:bodyPr rtlCol="0" anchor="ctr"/>
           <a:lstStyle/>
           <a:p>
-            <a:pPr algn="ctr"/>
-            <a:endParaRPr lang="en-US"/>
+            <a:pPr algn="ctr" rtl="0"/>
+            <a:endParaRPr lang="ru-Ru"/>
           </a:p>
         </p:txBody>
       </p:sp>
@@ -16866,7 +16928,7 @@
         <p:spPr>
           <a:xfrm>
             <a:off x="1145008" y="795407"/>
-            <a:ext cx="1545936" cy="923330"/>
+            <a:ext cx="1761424" cy="1200329"/>
           </a:xfrm>
           <a:prstGeom prst="rect">
             <a:avLst/>
@@ -16879,29 +16941,14 @@
           </a:bodyPr>
           <a:lstStyle/>
           <a:p>
+            <a:pPr algn="l" rtl="0"/>
             <a:r>
-              <a:rPr lang="en-US" b="1" dirty="0">
+              <a:rPr lang="ru-Ru" b="1" i="0" u="none" baseline="0" dirty="0">
                 <a:solidFill>
                   <a:srgbClr val="0164FF"/>
                 </a:solidFill>
               </a:rPr>
-              <a:t>What </a:t>
-            </a:r>
-            <a:r>
-              <a:rPr lang="en-US" b="1" dirty="0" err="1">
-                <a:solidFill>
-                  <a:srgbClr val="0164FF"/>
-                </a:solidFill>
-              </a:rPr>
-              <a:t>Orderer</a:t>
-            </a:r>
-            <a:r>
-              <a:rPr lang="en-US" b="1" dirty="0">
-                <a:solidFill>
-                  <a:srgbClr val="0164FF"/>
-                </a:solidFill>
-              </a:rPr>
-              <a:t> organizations govern</a:t>
+              <a:t>Чем управляют организации службы упорядочения</a:t>
             </a:r>
           </a:p>
         </p:txBody>
@@ -16934,23 +16981,25 @@
           </a:bodyPr>
           <a:lstStyle/>
           <a:p>
+            <a:pPr algn="l" rtl="0"/>
             <a:r>
-              <a:rPr lang="en-US" b="1" dirty="0">
+              <a:rPr lang="ru-Ru" b="1" i="0" u="none" baseline="0">
                 <a:solidFill>
                   <a:srgbClr val="0164FF"/>
                 </a:solidFill>
               </a:rPr>
-              <a:t>What</a:t>
+              <a:t>Чем</a:t>
             </a:r>
           </a:p>
           <a:p>
+            <a:pPr algn="l" rtl="0"/>
             <a:r>
-              <a:rPr lang="en-US" b="1" dirty="0">
+              <a:rPr lang="ru-Ru" b="1" i="0" u="none" baseline="0">
                 <a:solidFill>
                   <a:srgbClr val="0164FF"/>
                 </a:solidFill>
               </a:rPr>
-              <a:t>Consortium organizations govern</a:t>
+              <a:t>управляют организации консорциума</a:t>
             </a:r>
           </a:p>
         </p:txBody>
@@ -17031,7 +17080,7 @@
           <a:blip r:embed="rId7">
             <a:extLst>
               <a:ext uri="{837473B0-CC2E-450A-ABE3-18F120FF3D39}">
-                <a1611:picAttrSrcUrl xmlns:a1611="http://schemas.microsoft.com/office/drawing/2016/11/main" r:id="rId8"/>
+                <a1611:picAttrSrcUrl xmlns:a1611="http://schemas.microsoft.com/office/drawing/2016/11/main" xmlns="" r:id="rId8"/>
               </a:ext>
             </a:extLst>
           </a:blip>
@@ -17180,9 +17229,9 @@
           <a:bodyPr rtlCol="0" anchor="ctr"/>
           <a:lstStyle/>
           <a:p>
-            <a:pPr algn="ctr"/>
+            <a:pPr algn="ctr" rtl="0"/>
             <a:r>
-              <a:rPr lang="en-US" dirty="0"/>
+              <a:rPr lang="ru-Ru" b="0" i="0" u="none" baseline="0"/>
               <a:t>Channel/Admins</a:t>
             </a:r>
           </a:p>
@@ -17203,7 +17252,7 @@
         <p:spPr>
           <a:xfrm>
             <a:off x="5341434" y="121322"/>
-            <a:ext cx="1851102" cy="369332"/>
+            <a:ext cx="2204224" cy="369332"/>
           </a:xfrm>
           <a:prstGeom prst="rect">
             <a:avLst/>
@@ -17216,9 +17265,10 @@
           </a:bodyPr>
           <a:lstStyle/>
           <a:p>
+            <a:pPr algn="l" rtl="0"/>
             <a:r>
-              <a:rPr lang="en-US" dirty="0"/>
-              <a:t>System Channel</a:t>
+              <a:rPr lang="ru-Ru" b="0" i="0" u="none" baseline="0" dirty="0"/>
+              <a:t>Системный канал</a:t>
             </a:r>
           </a:p>
         </p:txBody>
@@ -17264,9 +17314,9 @@
           <a:bodyPr rtlCol="0" anchor="ctr"/>
           <a:lstStyle/>
           <a:p>
-            <a:pPr algn="ctr"/>
+            <a:pPr algn="ctr" rtl="0"/>
             <a:r>
-              <a:rPr lang="en-US" dirty="0"/>
+              <a:rPr lang="ru-Ru" b="0" i="0" u="none" baseline="0"/>
               <a:t>Channel/Consortium/Admins</a:t>
             </a:r>
           </a:p>
@@ -17313,18 +17363,10 @@
           <a:bodyPr rtlCol="0" anchor="ctr"/>
           <a:lstStyle/>
           <a:p>
-            <a:pPr algn="ctr"/>
+            <a:pPr algn="ctr" rtl="0"/>
             <a:r>
-              <a:rPr lang="en-US" dirty="0"/>
-              <a:t>Channel/</a:t>
-            </a:r>
-            <a:r>
-              <a:rPr lang="en-US" dirty="0" err="1"/>
-              <a:t>Orderer</a:t>
-            </a:r>
-            <a:r>
-              <a:rPr lang="en-US" dirty="0"/>
-              <a:t>/Admins</a:t>
+              <a:rPr lang="ru-Ru" b="0" i="0" u="none" baseline="0"/>
+              <a:t>Channel/Orderer/Admins</a:t>
             </a:r>
           </a:p>
         </p:txBody>
@@ -17357,8 +17399,9 @@
           </a:bodyPr>
           <a:lstStyle/>
           <a:p>
+            <a:pPr algn="l" rtl="0"/>
             <a:r>
-              <a:rPr lang="en-US" sz="1200" dirty="0"/>
+              <a:rPr lang="ru-Ru" sz="1200" b="0" i="0" u="none" baseline="0"/>
               <a:t>MAJORITY sub policy: “Admins”                                     Type = 3</a:t>
             </a:r>
           </a:p>
@@ -17392,8 +17435,9 @@
           </a:bodyPr>
           <a:lstStyle/>
           <a:p>
+            <a:pPr algn="l" rtl="0"/>
             <a:r>
-              <a:rPr lang="en-US" sz="1200" dirty="0"/>
+              <a:rPr lang="ru-Ru" sz="1200" b="0" i="0" u="none" baseline="0"/>
               <a:t>n=0 (ANY)                                                                           Type = 1</a:t>
             </a:r>
           </a:p>
@@ -17440,18 +17484,10 @@
           <a:bodyPr rtlCol="0" anchor="ctr"/>
           <a:lstStyle/>
           <a:p>
-            <a:pPr algn="ctr"/>
+            <a:pPr algn="ctr" rtl="0"/>
             <a:r>
-              <a:rPr lang="en-US" sz="1200" dirty="0"/>
-              <a:t>Channel/Consortium/</a:t>
-            </a:r>
-            <a:r>
-              <a:rPr lang="en-US" sz="1200" dirty="0" err="1"/>
-              <a:t>SampleConsortium</a:t>
-            </a:r>
-            <a:r>
-              <a:rPr lang="en-US" sz="1200" dirty="0"/>
-              <a:t>/Org1MSP/Admins</a:t>
+              <a:rPr lang="ru-Ru" sz="1200" b="0" i="0" u="none" baseline="0"/>
+              <a:t>Channel/Consortium/SampleConsortium/Org1MSP/Admins</a:t>
             </a:r>
           </a:p>
         </p:txBody>
@@ -17484,8 +17520,9 @@
           </a:bodyPr>
           <a:lstStyle/>
           <a:p>
+            <a:pPr algn="l" rtl="0"/>
             <a:r>
-              <a:rPr lang="en-US" sz="1200" dirty="0"/>
+              <a:rPr lang="ru-Ru" sz="1200" b="0" i="0" u="none" baseline="0"/>
               <a:t>n=1  Role = “ADMIN” member of Org1MSP                Type = 1</a:t>
             </a:r>
           </a:p>
@@ -17532,18 +17569,10 @@
           <a:bodyPr rtlCol="0" anchor="ctr"/>
           <a:lstStyle/>
           <a:p>
-            <a:pPr algn="ctr"/>
+            <a:pPr algn="ctr" rtl="0"/>
             <a:r>
-              <a:rPr lang="en-US" sz="1200" dirty="0"/>
-              <a:t>Channel/Consortium/</a:t>
-            </a:r>
-            <a:r>
-              <a:rPr lang="en-US" sz="1200" dirty="0" err="1"/>
-              <a:t>SampleConsortium</a:t>
-            </a:r>
-            <a:r>
-              <a:rPr lang="en-US" sz="1200" dirty="0"/>
-              <a:t>/Org2MSP/Admins</a:t>
+              <a:rPr lang="ru-Ru" sz="1200" b="0" i="0" u="none" baseline="0"/>
+              <a:t>Channel/Consortium/SampleConsortium/Org2MSP/Admins</a:t>
             </a:r>
           </a:p>
         </p:txBody>
@@ -17576,8 +17605,9 @@
           </a:bodyPr>
           <a:lstStyle/>
           <a:p>
+            <a:pPr algn="l" rtl="0"/>
             <a:r>
-              <a:rPr lang="en-US" sz="1200" dirty="0"/>
+              <a:rPr lang="ru-Ru" sz="1200" b="0" i="0" u="none" baseline="0"/>
               <a:t>n=1  Role = “ADMIN” member of Org2MSP                Type = 1</a:t>
             </a:r>
           </a:p>
@@ -17782,8 +17812,9 @@
           </a:bodyPr>
           <a:lstStyle/>
           <a:p>
+            <a:pPr algn="l" rtl="0"/>
             <a:r>
-              <a:rPr lang="en-US" sz="1200" dirty="0"/>
+              <a:rPr lang="ru-Ru" sz="1200" b="0" i="0" u="none" baseline="0"/>
               <a:t>MAJORITY sub policy: “Admins”                                     Type = 3</a:t>
             </a:r>
           </a:p>
@@ -17830,26 +17861,10 @@
           <a:bodyPr rtlCol="0" anchor="ctr"/>
           <a:lstStyle/>
           <a:p>
-            <a:pPr algn="ctr"/>
+            <a:pPr algn="ctr" rtl="0"/>
             <a:r>
-              <a:rPr lang="en-US" sz="1200" dirty="0"/>
-              <a:t>Channel/</a:t>
-            </a:r>
-            <a:r>
-              <a:rPr lang="en-US" sz="1200" dirty="0" err="1"/>
-              <a:t>Orderer</a:t>
-            </a:r>
-            <a:r>
-              <a:rPr lang="en-US" sz="1200" dirty="0"/>
-              <a:t>/</a:t>
-            </a:r>
-            <a:r>
-              <a:rPr lang="en-US" sz="1200" dirty="0" err="1"/>
-              <a:t>OrdererOrg</a:t>
-            </a:r>
-            <a:r>
-              <a:rPr lang="en-US" sz="1200" dirty="0"/>
-              <a:t>/Admins</a:t>
+              <a:rPr lang="ru-Ru" sz="1200" b="0" i="0" u="none" baseline="0"/>
+              <a:t>Channel/Orderer/OrdererOrg/Admins</a:t>
             </a:r>
           </a:p>
         </p:txBody>
@@ -17882,17 +17897,10 @@
           </a:bodyPr>
           <a:lstStyle/>
           <a:p>
+            <a:pPr algn="l" rtl="0"/>
             <a:r>
-              <a:rPr lang="en-US" sz="1200" dirty="0"/>
-              <a:t>n=1  Role = “ADMIN” member of </a:t>
-            </a:r>
-            <a:r>
-              <a:rPr lang="en-US" sz="1200" dirty="0" err="1"/>
-              <a:t>OrdererMSP</a:t>
-            </a:r>
-            <a:r>
-              <a:rPr lang="en-US" sz="1200" dirty="0"/>
-              <a:t>         Type =1</a:t>
+              <a:rPr lang="ru-Ru" sz="1200" b="0" i="0" u="none" baseline="0"/>
+              <a:t>n=1  Role = “ADMIN” member of OrdererMSP         Type =1</a:t>
             </a:r>
           </a:p>
         </p:txBody>
@@ -17958,7 +17966,7 @@
           <a:blip r:embed="rId2">
             <a:extLst>
               <a:ext uri="{837473B0-CC2E-450A-ABE3-18F120FF3D39}">
-                <a1611:picAttrSrcUrl xmlns:a1611="http://schemas.microsoft.com/office/drawing/2016/11/main" r:id="rId3"/>
+                <a1611:picAttrSrcUrl xmlns:a1611="http://schemas.microsoft.com/office/drawing/2016/11/main" xmlns="" r:id="rId3"/>
               </a:ext>
             </a:extLst>
           </a:blip>
@@ -17994,7 +18002,7 @@
           <a:blip r:embed="rId2">
             <a:extLst>
               <a:ext uri="{837473B0-CC2E-450A-ABE3-18F120FF3D39}">
-                <a1611:picAttrSrcUrl xmlns:a1611="http://schemas.microsoft.com/office/drawing/2016/11/main" r:id="rId3"/>
+                <a1611:picAttrSrcUrl xmlns:a1611="http://schemas.microsoft.com/office/drawing/2016/11/main" xmlns="" r:id="rId3"/>
               </a:ext>
             </a:extLst>
           </a:blip>
@@ -18030,7 +18038,7 @@
           <a:blip r:embed="rId2">
             <a:extLst>
               <a:ext uri="{837473B0-CC2E-450A-ABE3-18F120FF3D39}">
-                <a1611:picAttrSrcUrl xmlns:a1611="http://schemas.microsoft.com/office/drawing/2016/11/main" r:id="rId3"/>
+                <a1611:picAttrSrcUrl xmlns:a1611="http://schemas.microsoft.com/office/drawing/2016/11/main" xmlns="" r:id="rId3"/>
               </a:ext>
             </a:extLst>
           </a:blip>
@@ -18066,7 +18074,7 @@
           <a:blip r:embed="rId2">
             <a:extLst>
               <a:ext uri="{837473B0-CC2E-450A-ABE3-18F120FF3D39}">
-                <a1611:picAttrSrcUrl xmlns:a1611="http://schemas.microsoft.com/office/drawing/2016/11/main" r:id="rId3"/>
+                <a1611:picAttrSrcUrl xmlns:a1611="http://schemas.microsoft.com/office/drawing/2016/11/main" xmlns="" r:id="rId3"/>
               </a:ext>
             </a:extLst>
           </a:blip>
@@ -18102,7 +18110,7 @@
           <a:blip r:embed="rId2">
             <a:extLst>
               <a:ext uri="{837473B0-CC2E-450A-ABE3-18F120FF3D39}">
-                <a1611:picAttrSrcUrl xmlns:a1611="http://schemas.microsoft.com/office/drawing/2016/11/main" r:id="rId3"/>
+                <a1611:picAttrSrcUrl xmlns:a1611="http://schemas.microsoft.com/office/drawing/2016/11/main" xmlns="" r:id="rId3"/>
               </a:ext>
             </a:extLst>
           </a:blip>
@@ -18148,15 +18156,17 @@
           </a:bodyPr>
           <a:lstStyle/>
           <a:p>
+            <a:pPr algn="l" rtl="0"/>
             <a:r>
-              <a:rPr lang="en-US" dirty="0"/>
-              <a:t>In order for the Channel/Admins policy to be satisfied, every sub-policy under it in the configuration hierarchy must</a:t>
+              <a:rPr lang="ru-Ru" b="0" i="0" u="none" baseline="0"/>
+              <a:t>Для удовлетворения правила Channel/Admins, каждое правило ниже по иерархии конфигурации должно</a:t>
             </a:r>
           </a:p>
           <a:p>
+            <a:pPr algn="l" rtl="0"/>
             <a:r>
-              <a:rPr lang="en-US" dirty="0"/>
-              <a:t>also be satisfied.</a:t>
+              <a:rPr lang="ru-Ru" b="0" i="0" u="none" baseline="0"/>
+              <a:t>также быть удовлетворено.</a:t>
             </a:r>
           </a:p>
         </p:txBody>
@@ -18204,8 +18214,8 @@
           <a:bodyPr rtlCol="0" anchor="ctr"/>
           <a:lstStyle/>
           <a:p>
-            <a:pPr algn="ctr"/>
-            <a:endParaRPr lang="en-US" dirty="0"/>
+            <a:pPr algn="ctr" rtl="0"/>
+            <a:endParaRPr lang="ru-Ru" dirty="0"/>
           </a:p>
         </p:txBody>
       </p:sp>
@@ -18237,24 +18247,22 @@
           </a:bodyPr>
           <a:lstStyle/>
           <a:p>
+            <a:pPr algn="l" rtl="0"/>
             <a:r>
-              <a:rPr lang="en-US" dirty="0"/>
+              <a:rPr lang="ru-Ru" b="0" i="0" u="none" baseline="0"/>
               <a:t>Type 1 = Signature</a:t>
             </a:r>
           </a:p>
           <a:p>
-            <a:endParaRPr lang="en-US" dirty="0"/>
+            <a:endParaRPr lang="ru-Ru" dirty="0"/>
           </a:p>
           <a:p>
+            <a:pPr algn="l" rtl="0"/>
             <a:r>
-              <a:rPr lang="en-US" dirty="0"/>
-              <a:t>Type 3 = </a:t>
+              <a:rPr lang="ru-Ru" b="0" i="0" u="none" baseline="0"/>
+              <a:t>Type 3 = ImplicitMeta</a:t>
             </a:r>
-            <a:r>
-              <a:rPr lang="en-US" dirty="0" err="1"/>
-              <a:t>ImplicitMeta</a:t>
-            </a:r>
-            <a:endParaRPr lang="en-US" dirty="0"/>
+            <a:endParaRPr lang="ru-Ru" dirty="0"/>
           </a:p>
         </p:txBody>
       </p:sp>
@@ -18329,9 +18337,9 @@
           <a:bodyPr rtlCol="0" anchor="ctr"/>
           <a:lstStyle/>
           <a:p>
-            <a:pPr algn="ctr"/>
+            <a:pPr algn="ctr" rtl="0"/>
             <a:r>
-              <a:rPr lang="en-US" dirty="0"/>
+              <a:rPr lang="ru-Ru" b="0" i="0" u="none" baseline="0"/>
               <a:t>Channel/Admins</a:t>
             </a:r>
           </a:p>
@@ -18365,9 +18373,10 @@
           </a:bodyPr>
           <a:lstStyle/>
           <a:p>
+            <a:pPr algn="l" rtl="0"/>
             <a:r>
-              <a:rPr lang="en-US" dirty="0"/>
-              <a:t>Application Channel</a:t>
+              <a:rPr lang="ru-Ru" b="0" i="0" u="none" baseline="0"/>
+              <a:t>Канал приложения</a:t>
             </a:r>
           </a:p>
         </p:txBody>
@@ -18413,9 +18422,9 @@
           <a:bodyPr rtlCol="0" anchor="ctr"/>
           <a:lstStyle/>
           <a:p>
-            <a:pPr algn="ctr"/>
+            <a:pPr algn="ctr" rtl="0"/>
             <a:r>
-              <a:rPr lang="en-US" dirty="0"/>
+              <a:rPr lang="ru-Ru" b="0" i="0" u="none" baseline="0"/>
               <a:t>Channel/Application/Admins</a:t>
             </a:r>
           </a:p>
@@ -18462,18 +18471,10 @@
           <a:bodyPr rtlCol="0" anchor="ctr"/>
           <a:lstStyle/>
           <a:p>
-            <a:pPr algn="ctr"/>
+            <a:pPr algn="ctr" rtl="0"/>
             <a:r>
-              <a:rPr lang="en-US" dirty="0"/>
-              <a:t>Channel/</a:t>
-            </a:r>
-            <a:r>
-              <a:rPr lang="en-US" dirty="0" err="1"/>
-              <a:t>Orderer</a:t>
-            </a:r>
-            <a:r>
-              <a:rPr lang="en-US" dirty="0"/>
-              <a:t>/Admins</a:t>
+              <a:rPr lang="ru-Ru" b="0" i="0" u="none" baseline="0"/>
+              <a:t>Channel/Orderer/Admins</a:t>
             </a:r>
           </a:p>
         </p:txBody>
@@ -18506,8 +18507,9 @@
           </a:bodyPr>
           <a:lstStyle/>
           <a:p>
+            <a:pPr algn="l" rtl="0"/>
             <a:r>
-              <a:rPr lang="en-US" sz="1200" dirty="0"/>
+              <a:rPr lang="ru-Ru" sz="1200" b="0" i="0" u="none" baseline="0"/>
               <a:t>MAJORITY sub policy: “Admins”                                      Type =3</a:t>
             </a:r>
           </a:p>
@@ -18541,8 +18543,9 @@
           </a:bodyPr>
           <a:lstStyle/>
           <a:p>
+            <a:pPr algn="l" rtl="0"/>
             <a:r>
-              <a:rPr lang="en-US" sz="1200" dirty="0"/>
+              <a:rPr lang="ru-Ru" sz="1200" b="0" i="0" u="none" baseline="0"/>
               <a:t>n=0 (ANY)                                                                            Type =1</a:t>
             </a:r>
           </a:p>
@@ -18589,18 +18592,10 @@
           <a:bodyPr rtlCol="0" anchor="ctr"/>
           <a:lstStyle/>
           <a:p>
-            <a:pPr algn="ctr"/>
+            <a:pPr algn="ctr" rtl="0"/>
             <a:r>
-              <a:rPr lang="en-US" sz="1200" dirty="0"/>
-              <a:t>Channel/Consortium/</a:t>
-            </a:r>
-            <a:r>
-              <a:rPr lang="en-US" sz="1200" dirty="0" err="1"/>
-              <a:t>SampleConsortium</a:t>
-            </a:r>
-            <a:r>
-              <a:rPr lang="en-US" sz="1200" dirty="0"/>
-              <a:t>/Org1MSP/Admins</a:t>
+              <a:rPr lang="ru-Ru" sz="1200" b="0" i="0" u="none" baseline="0"/>
+              <a:t>Channel/Consortium/SampleConsortium/Org1MSP/Admins</a:t>
             </a:r>
           </a:p>
         </p:txBody>
@@ -18633,8 +18628,9 @@
           </a:bodyPr>
           <a:lstStyle/>
           <a:p>
+            <a:pPr algn="l" rtl="0"/>
             <a:r>
-              <a:rPr lang="en-US" sz="1200" dirty="0"/>
+              <a:rPr lang="ru-Ru" sz="1200" b="0" i="0" u="none" baseline="0"/>
               <a:t>n=1  Role = “ADMIN” member of Org1MSP                  Type=1</a:t>
             </a:r>
           </a:p>
@@ -18681,18 +18677,10 @@
           <a:bodyPr rtlCol="0" anchor="ctr"/>
           <a:lstStyle/>
           <a:p>
-            <a:pPr algn="ctr"/>
+            <a:pPr algn="ctr" rtl="0"/>
             <a:r>
-              <a:rPr lang="en-US" sz="1200" dirty="0"/>
-              <a:t>Channel/Consortium/</a:t>
-            </a:r>
-            <a:r>
-              <a:rPr lang="en-US" sz="1200" dirty="0" err="1"/>
-              <a:t>SampleConsortium</a:t>
-            </a:r>
-            <a:r>
-              <a:rPr lang="en-US" sz="1200" dirty="0"/>
-              <a:t>/Org2MSP/Admins</a:t>
+              <a:rPr lang="ru-Ru" sz="1200" b="0" i="0" u="none" baseline="0"/>
+              <a:t>Channel/Consortium/SampleConsortium/Org2MSP/Admins</a:t>
             </a:r>
           </a:p>
         </p:txBody>
@@ -18725,8 +18713,9 @@
           </a:bodyPr>
           <a:lstStyle/>
           <a:p>
+            <a:pPr algn="l" rtl="0"/>
             <a:r>
-              <a:rPr lang="en-US" sz="1200" dirty="0"/>
+              <a:rPr lang="ru-Ru" sz="1200" b="0" i="0" u="none" baseline="0"/>
               <a:t>n=1  Role = “ADMIN” member of Org2MSP                  Type=1</a:t>
             </a:r>
           </a:p>
@@ -18931,8 +18920,9 @@
           </a:bodyPr>
           <a:lstStyle/>
           <a:p>
+            <a:pPr algn="l" rtl="0"/>
             <a:r>
-              <a:rPr lang="en-US" sz="1200" dirty="0"/>
+              <a:rPr lang="ru-Ru" sz="1200" b="0" i="0" u="none" baseline="0"/>
               <a:t>MAJORITY sub policy: “Admins”                                      Type =3</a:t>
             </a:r>
           </a:p>
@@ -18979,26 +18969,10 @@
           <a:bodyPr rtlCol="0" anchor="ctr"/>
           <a:lstStyle/>
           <a:p>
-            <a:pPr algn="ctr"/>
+            <a:pPr algn="ctr" rtl="0"/>
             <a:r>
-              <a:rPr lang="en-US" sz="1200" dirty="0"/>
-              <a:t>Channel/</a:t>
-            </a:r>
-            <a:r>
-              <a:rPr lang="en-US" sz="1200" dirty="0" err="1"/>
-              <a:t>Orderer</a:t>
-            </a:r>
-            <a:r>
-              <a:rPr lang="en-US" sz="1200" dirty="0"/>
-              <a:t>/</a:t>
-            </a:r>
-            <a:r>
-              <a:rPr lang="en-US" sz="1200" dirty="0" err="1"/>
-              <a:t>OrdererOrg</a:t>
-            </a:r>
-            <a:r>
-              <a:rPr lang="en-US" sz="1200" dirty="0"/>
-              <a:t>/Admins</a:t>
+              <a:rPr lang="ru-Ru" sz="1200" b="0" i="0" u="none" baseline="0"/>
+              <a:t>Channel/Orderer/OrdererOrg/Admins</a:t>
             </a:r>
           </a:p>
         </p:txBody>
@@ -19031,17 +19005,10 @@
           </a:bodyPr>
           <a:lstStyle/>
           <a:p>
+            <a:pPr algn="l" rtl="0"/>
             <a:r>
-              <a:rPr lang="en-US" sz="1200" dirty="0"/>
-              <a:t>n=1  Role = “ADMIN” member of </a:t>
-            </a:r>
-            <a:r>
-              <a:rPr lang="en-US" sz="1200" dirty="0" err="1"/>
-              <a:t>OrdererMSP</a:t>
-            </a:r>
-            <a:r>
-              <a:rPr lang="en-US" sz="1200" dirty="0"/>
-              <a:t>            Type=1</a:t>
+              <a:rPr lang="ru-Ru" sz="1200" b="0" i="0" u="none" baseline="0"/>
+              <a:t>n=1  Role = “ADMIN” member of OrdererMSP            Type=1</a:t>
             </a:r>
           </a:p>
         </p:txBody>
@@ -19107,7 +19074,7 @@
           <a:blip r:embed="rId2">
             <a:extLst>
               <a:ext uri="{837473B0-CC2E-450A-ABE3-18F120FF3D39}">
-                <a1611:picAttrSrcUrl xmlns:a1611="http://schemas.microsoft.com/office/drawing/2016/11/main" r:id="rId3"/>
+                <a1611:picAttrSrcUrl xmlns:a1611="http://schemas.microsoft.com/office/drawing/2016/11/main" xmlns="" r:id="rId3"/>
               </a:ext>
             </a:extLst>
           </a:blip>
@@ -19143,7 +19110,7 @@
           <a:blip r:embed="rId2">
             <a:extLst>
               <a:ext uri="{837473B0-CC2E-450A-ABE3-18F120FF3D39}">
-                <a1611:picAttrSrcUrl xmlns:a1611="http://schemas.microsoft.com/office/drawing/2016/11/main" r:id="rId3"/>
+                <a1611:picAttrSrcUrl xmlns:a1611="http://schemas.microsoft.com/office/drawing/2016/11/main" xmlns="" r:id="rId3"/>
               </a:ext>
             </a:extLst>
           </a:blip>
@@ -19179,7 +19146,7 @@
           <a:blip r:embed="rId2">
             <a:extLst>
               <a:ext uri="{837473B0-CC2E-450A-ABE3-18F120FF3D39}">
-                <a1611:picAttrSrcUrl xmlns:a1611="http://schemas.microsoft.com/office/drawing/2016/11/main" r:id="rId3"/>
+                <a1611:picAttrSrcUrl xmlns:a1611="http://schemas.microsoft.com/office/drawing/2016/11/main" xmlns="" r:id="rId3"/>
               </a:ext>
             </a:extLst>
           </a:blip>
@@ -19215,7 +19182,7 @@
           <a:blip r:embed="rId2">
             <a:extLst>
               <a:ext uri="{837473B0-CC2E-450A-ABE3-18F120FF3D39}">
-                <a1611:picAttrSrcUrl xmlns:a1611="http://schemas.microsoft.com/office/drawing/2016/11/main" r:id="rId3"/>
+                <a1611:picAttrSrcUrl xmlns:a1611="http://schemas.microsoft.com/office/drawing/2016/11/main" xmlns="" r:id="rId3"/>
               </a:ext>
             </a:extLst>
           </a:blip>
@@ -19251,7 +19218,7 @@
           <a:blip r:embed="rId2">
             <a:extLst>
               <a:ext uri="{837473B0-CC2E-450A-ABE3-18F120FF3D39}">
-                <a1611:picAttrSrcUrl xmlns:a1611="http://schemas.microsoft.com/office/drawing/2016/11/main" r:id="rId3"/>
+                <a1611:picAttrSrcUrl xmlns:a1611="http://schemas.microsoft.com/office/drawing/2016/11/main" xmlns="" r:id="rId3"/>
               </a:ext>
             </a:extLst>
           </a:blip>
@@ -19297,15 +19264,17 @@
           </a:bodyPr>
           <a:lstStyle/>
           <a:p>
+            <a:pPr algn="l" rtl="0"/>
             <a:r>
-              <a:rPr lang="en-US" dirty="0"/>
-              <a:t>In order for the Channel/Admins policy to be satisfied, every sub-policy under it in the configuration hierarchy must</a:t>
+              <a:rPr lang="ru-Ru" b="0" i="0" u="none" baseline="0"/>
+              <a:t>Для удовлетворения правила Channel/Admins, каждое правило ниже по иерархии конфигурации должно</a:t>
             </a:r>
           </a:p>
           <a:p>
+            <a:pPr algn="l" rtl="0"/>
             <a:r>
-              <a:rPr lang="en-US" dirty="0"/>
-              <a:t>be satisfied.</a:t>
+              <a:rPr lang="ru-Ru" b="0" i="0" u="none" baseline="0"/>
+              <a:t>быть удовлетворено.</a:t>
             </a:r>
           </a:p>
         </p:txBody>

</xml_diff>